<commit_message>
More work on talk
</commit_message>
<xml_diff>
--- a/Talk.pptx
+++ b/Talk.pptx
@@ -6,18 +6,21 @@
     <p:sldMasterId id="2147483661" r:id="rId3"/>
     <p:sldMasterId id="2147483674" r:id="rId4"/>
     <p:sldMasterId id="2147483687" r:id="rId5"/>
+    <p:sldMasterId id="2147483700" r:id="rId6"/>
   </p:sldMasterIdLst>
   <p:sldIdLst>
-    <p:sldId id="256" r:id="rId6"/>
-    <p:sldId id="257" r:id="rId7"/>
-    <p:sldId id="258" r:id="rId8"/>
-    <p:sldId id="259" r:id="rId9"/>
-    <p:sldId id="260" r:id="rId10"/>
-    <p:sldId id="261" r:id="rId11"/>
-    <p:sldId id="262" r:id="rId12"/>
-    <p:sldId id="263" r:id="rId13"/>
-    <p:sldId id="264" r:id="rId14"/>
-    <p:sldId id="265" r:id="rId15"/>
+    <p:sldId id="256" r:id="rId7"/>
+    <p:sldId id="257" r:id="rId8"/>
+    <p:sldId id="258" r:id="rId9"/>
+    <p:sldId id="259" r:id="rId10"/>
+    <p:sldId id="260" r:id="rId11"/>
+    <p:sldId id="261" r:id="rId12"/>
+    <p:sldId id="262" r:id="rId13"/>
+    <p:sldId id="263" r:id="rId14"/>
+    <p:sldId id="264" r:id="rId15"/>
+    <p:sldId id="265" r:id="rId16"/>
+    <p:sldId id="266" r:id="rId17"/>
+    <p:sldId id="267" r:id="rId18"/>
   </p:sldIdLst>
   <p:sldSz cx="12192000" cy="6858000"/>
   <p:notesSz cx="7559675" cy="10691812"/>
@@ -76,7 +79,7 @@
         <p:spPr>
           <a:xfrm>
             <a:off x="609480" y="273600"/>
-            <a:ext cx="10972440" cy="1144800"/>
+            <a:ext cx="10972080" cy="1144800"/>
           </a:xfrm>
           <a:prstGeom prst="rect">
             <a:avLst/>
@@ -211,7 +214,7 @@
         <p:spPr>
           <a:xfrm>
             <a:off x="609480" y="273600"/>
-            <a:ext cx="10972440" cy="1144800"/>
+            <a:ext cx="10972080" cy="1144800"/>
           </a:xfrm>
           <a:prstGeom prst="rect">
             <a:avLst/>
@@ -422,7 +425,7 @@
         <p:spPr>
           <a:xfrm>
             <a:off x="609480" y="273600"/>
-            <a:ext cx="10972440" cy="1144800"/>
+            <a:ext cx="10972080" cy="1144800"/>
           </a:xfrm>
           <a:prstGeom prst="rect">
             <a:avLst/>
@@ -529,13 +532,13 @@
           <p:nvPr/>
         </p:nvPicPr>
         <p:blipFill>
-          <a:blip r:embed="rId2"/>
+          <a:blip r:embed=""/>
           <a:stretch/>
         </p:blipFill>
         <p:spPr>
           <a:xfrm>
-            <a:off x="3602880" y="1604520"/>
-            <a:ext cx="4984920" cy="3977280"/>
+            <a:off x="609480" y="1604520"/>
+            <a:ext cx="10972440" cy="3977280"/>
           </a:xfrm>
           <a:prstGeom prst="rect">
             <a:avLst/>
@@ -552,13 +555,13 @@
           <p:nvPr/>
         </p:nvPicPr>
         <p:blipFill>
-          <a:blip r:embed="rId3"/>
+          <a:blip r:embed=""/>
           <a:stretch/>
         </p:blipFill>
         <p:spPr>
           <a:xfrm>
-            <a:off x="3602880" y="1604520"/>
-            <a:ext cx="4984920" cy="3977280"/>
+            <a:off x="609480" y="1604520"/>
+            <a:ext cx="10972440" cy="3977280"/>
           </a:xfrm>
           <a:prstGeom prst="rect">
             <a:avLst/>
@@ -625,7 +628,7 @@
         <p:spPr>
           <a:xfrm>
             <a:off x="609480" y="273600"/>
-            <a:ext cx="10972440" cy="1144800"/>
+            <a:ext cx="10972080" cy="1144800"/>
           </a:xfrm>
           <a:prstGeom prst="rect">
             <a:avLst/>
@@ -721,7 +724,7 @@
         <p:spPr>
           <a:xfrm>
             <a:off x="609480" y="273600"/>
-            <a:ext cx="10972440" cy="1144800"/>
+            <a:ext cx="10972080" cy="1144800"/>
           </a:xfrm>
           <a:prstGeom prst="rect">
             <a:avLst/>
@@ -818,7 +821,7 @@
         <p:spPr>
           <a:xfrm>
             <a:off x="609480" y="273600"/>
-            <a:ext cx="10972440" cy="1144800"/>
+            <a:ext cx="10972080" cy="1144800"/>
           </a:xfrm>
           <a:prstGeom prst="rect">
             <a:avLst/>
@@ -953,7 +956,7 @@
         <p:spPr>
           <a:xfrm>
             <a:off x="609480" y="273600"/>
-            <a:ext cx="10972440" cy="1144800"/>
+            <a:ext cx="10972080" cy="1144800"/>
           </a:xfrm>
           <a:prstGeom prst="rect">
             <a:avLst/>
@@ -1012,7 +1015,7 @@
         <p:spPr>
           <a:xfrm>
             <a:off x="609480" y="273600"/>
-            <a:ext cx="10972440" cy="5307840"/>
+            <a:ext cx="10972080" cy="5307840"/>
           </a:xfrm>
           <a:prstGeom prst="rect">
             <a:avLst/>
@@ -1071,7 +1074,7 @@
         <p:spPr>
           <a:xfrm>
             <a:off x="609480" y="273600"/>
-            <a:ext cx="10972440" cy="1144800"/>
+            <a:ext cx="10972080" cy="1144800"/>
           </a:xfrm>
           <a:prstGeom prst="rect">
             <a:avLst/>
@@ -1244,7 +1247,7 @@
         <p:spPr>
           <a:xfrm>
             <a:off x="609480" y="273600"/>
-            <a:ext cx="10972440" cy="1144800"/>
+            <a:ext cx="10972080" cy="1144800"/>
           </a:xfrm>
           <a:prstGeom prst="rect">
             <a:avLst/>
@@ -1340,7 +1343,7 @@
         <p:spPr>
           <a:xfrm>
             <a:off x="609480" y="273600"/>
-            <a:ext cx="10972440" cy="1144800"/>
+            <a:ext cx="10972080" cy="1144800"/>
           </a:xfrm>
           <a:prstGeom prst="rect">
             <a:avLst/>
@@ -1513,7 +1516,7 @@
         <p:spPr>
           <a:xfrm>
             <a:off x="609480" y="273600"/>
-            <a:ext cx="10972440" cy="1144800"/>
+            <a:ext cx="10972080" cy="1144800"/>
           </a:xfrm>
           <a:prstGeom prst="rect">
             <a:avLst/>
@@ -1686,7 +1689,7 @@
         <p:spPr>
           <a:xfrm>
             <a:off x="609480" y="273600"/>
-            <a:ext cx="10972440" cy="1144800"/>
+            <a:ext cx="10972080" cy="1144800"/>
           </a:xfrm>
           <a:prstGeom prst="rect">
             <a:avLst/>
@@ -1821,7 +1824,7 @@
         <p:spPr>
           <a:xfrm>
             <a:off x="609480" y="273600"/>
-            <a:ext cx="10972440" cy="1144800"/>
+            <a:ext cx="10972080" cy="1144800"/>
           </a:xfrm>
           <a:prstGeom prst="rect">
             <a:avLst/>
@@ -2032,7 +2035,7 @@
         <p:spPr>
           <a:xfrm>
             <a:off x="609480" y="273600"/>
-            <a:ext cx="10972440" cy="1144800"/>
+            <a:ext cx="10972080" cy="1144800"/>
           </a:xfrm>
           <a:prstGeom prst="rect">
             <a:avLst/>
@@ -2139,13 +2142,13 @@
           <p:nvPr/>
         </p:nvPicPr>
         <p:blipFill>
-          <a:blip r:embed="rId2"/>
+          <a:blip r:embed=""/>
           <a:stretch/>
         </p:blipFill>
         <p:spPr>
           <a:xfrm>
-            <a:off x="3602880" y="1604520"/>
-            <a:ext cx="4984920" cy="3977280"/>
+            <a:off x="609480" y="1604520"/>
+            <a:ext cx="10972440" cy="3977280"/>
           </a:xfrm>
           <a:prstGeom prst="rect">
             <a:avLst/>
@@ -2162,13 +2165,13 @@
           <p:nvPr/>
         </p:nvPicPr>
         <p:blipFill>
-          <a:blip r:embed="rId3"/>
+          <a:blip r:embed=""/>
           <a:stretch/>
         </p:blipFill>
         <p:spPr>
           <a:xfrm>
-            <a:off x="3602880" y="1604520"/>
-            <a:ext cx="4984920" cy="3977280"/>
+            <a:off x="609480" y="1604520"/>
+            <a:ext cx="10972440" cy="3977280"/>
           </a:xfrm>
           <a:prstGeom prst="rect">
             <a:avLst/>
@@ -2235,7 +2238,7 @@
         <p:spPr>
           <a:xfrm>
             <a:off x="609480" y="273600"/>
-            <a:ext cx="10972440" cy="1144800"/>
+            <a:ext cx="10972080" cy="1144800"/>
           </a:xfrm>
           <a:prstGeom prst="rect">
             <a:avLst/>
@@ -2331,7 +2334,7 @@
         <p:spPr>
           <a:xfrm>
             <a:off x="609480" y="273600"/>
-            <a:ext cx="10972440" cy="1144800"/>
+            <a:ext cx="10972080" cy="1144800"/>
           </a:xfrm>
           <a:prstGeom prst="rect">
             <a:avLst/>
@@ -2428,7 +2431,7 @@
         <p:spPr>
           <a:xfrm>
             <a:off x="609480" y="273600"/>
-            <a:ext cx="10972440" cy="1144800"/>
+            <a:ext cx="10972080" cy="1144800"/>
           </a:xfrm>
           <a:prstGeom prst="rect">
             <a:avLst/>
@@ -2563,7 +2566,7 @@
         <p:spPr>
           <a:xfrm>
             <a:off x="609480" y="273600"/>
-            <a:ext cx="10972440" cy="1144800"/>
+            <a:ext cx="10972080" cy="1144800"/>
           </a:xfrm>
           <a:prstGeom prst="rect">
             <a:avLst/>
@@ -2622,7 +2625,7 @@
         <p:spPr>
           <a:xfrm>
             <a:off x="609480" y="273600"/>
-            <a:ext cx="10972440" cy="1144800"/>
+            <a:ext cx="10972080" cy="1144800"/>
           </a:xfrm>
           <a:prstGeom prst="rect">
             <a:avLst/>
@@ -2719,7 +2722,7 @@
         <p:spPr>
           <a:xfrm>
             <a:off x="609480" y="273600"/>
-            <a:ext cx="10972440" cy="5307840"/>
+            <a:ext cx="10972080" cy="5307840"/>
           </a:xfrm>
           <a:prstGeom prst="rect">
             <a:avLst/>
@@ -2778,7 +2781,7 @@
         <p:spPr>
           <a:xfrm>
             <a:off x="609480" y="273600"/>
-            <a:ext cx="10972440" cy="1144800"/>
+            <a:ext cx="10972080" cy="1144800"/>
           </a:xfrm>
           <a:prstGeom prst="rect">
             <a:avLst/>
@@ -2951,7 +2954,7 @@
         <p:spPr>
           <a:xfrm>
             <a:off x="609480" y="273600"/>
-            <a:ext cx="10972440" cy="1144800"/>
+            <a:ext cx="10972080" cy="1144800"/>
           </a:xfrm>
           <a:prstGeom prst="rect">
             <a:avLst/>
@@ -3124,7 +3127,7 @@
         <p:spPr>
           <a:xfrm>
             <a:off x="609480" y="273600"/>
-            <a:ext cx="10972440" cy="1144800"/>
+            <a:ext cx="10972080" cy="1144800"/>
           </a:xfrm>
           <a:prstGeom prst="rect">
             <a:avLst/>
@@ -3297,7 +3300,7 @@
         <p:spPr>
           <a:xfrm>
             <a:off x="609480" y="273600"/>
-            <a:ext cx="10972440" cy="1144800"/>
+            <a:ext cx="10972080" cy="1144800"/>
           </a:xfrm>
           <a:prstGeom prst="rect">
             <a:avLst/>
@@ -3432,7 +3435,7 @@
         <p:spPr>
           <a:xfrm>
             <a:off x="609480" y="273600"/>
-            <a:ext cx="10972440" cy="1144800"/>
+            <a:ext cx="10972080" cy="1144800"/>
           </a:xfrm>
           <a:prstGeom prst="rect">
             <a:avLst/>
@@ -3643,7 +3646,7 @@
         <p:spPr>
           <a:xfrm>
             <a:off x="609480" y="273600"/>
-            <a:ext cx="10972440" cy="1144800"/>
+            <a:ext cx="10972080" cy="1144800"/>
           </a:xfrm>
           <a:prstGeom prst="rect">
             <a:avLst/>
@@ -3750,13 +3753,13 @@
           <p:nvPr/>
         </p:nvPicPr>
         <p:blipFill>
-          <a:blip r:embed="rId2"/>
+          <a:blip r:embed=""/>
           <a:stretch/>
         </p:blipFill>
         <p:spPr>
           <a:xfrm>
-            <a:off x="3602880" y="1604520"/>
-            <a:ext cx="4984920" cy="3977280"/>
+            <a:off x="609480" y="1604520"/>
+            <a:ext cx="10972440" cy="3977280"/>
           </a:xfrm>
           <a:prstGeom prst="rect">
             <a:avLst/>
@@ -3773,13 +3776,13 @@
           <p:nvPr/>
         </p:nvPicPr>
         <p:blipFill>
-          <a:blip r:embed="rId3"/>
+          <a:blip r:embed=""/>
           <a:stretch/>
         </p:blipFill>
         <p:spPr>
           <a:xfrm>
-            <a:off x="3602880" y="1604520"/>
-            <a:ext cx="4984920" cy="3977280"/>
+            <a:off x="609480" y="1604520"/>
+            <a:ext cx="10972440" cy="3977280"/>
           </a:xfrm>
           <a:prstGeom prst="rect">
             <a:avLst/>
@@ -3846,7 +3849,7 @@
         <p:spPr>
           <a:xfrm>
             <a:off x="609480" y="273600"/>
-            <a:ext cx="10972440" cy="1144800"/>
+            <a:ext cx="10972080" cy="1144800"/>
           </a:xfrm>
           <a:prstGeom prst="rect">
             <a:avLst/>
@@ -3942,7 +3945,7 @@
         <p:spPr>
           <a:xfrm>
             <a:off x="609480" y="273600"/>
-            <a:ext cx="10972440" cy="1144800"/>
+            <a:ext cx="10972080" cy="1144800"/>
           </a:xfrm>
           <a:prstGeom prst="rect">
             <a:avLst/>
@@ -4039,7 +4042,7 @@
         <p:spPr>
           <a:xfrm>
             <a:off x="609480" y="273600"/>
-            <a:ext cx="10972440" cy="1144800"/>
+            <a:ext cx="10972080" cy="1144800"/>
           </a:xfrm>
           <a:prstGeom prst="rect">
             <a:avLst/>
@@ -4174,7 +4177,7 @@
         <p:spPr>
           <a:xfrm>
             <a:off x="609480" y="273600"/>
-            <a:ext cx="10972440" cy="1144800"/>
+            <a:ext cx="10972080" cy="1144800"/>
           </a:xfrm>
           <a:prstGeom prst="rect">
             <a:avLst/>
@@ -4309,7 +4312,7 @@
         <p:spPr>
           <a:xfrm>
             <a:off x="609480" y="273600"/>
-            <a:ext cx="10972440" cy="1144800"/>
+            <a:ext cx="10972080" cy="1144800"/>
           </a:xfrm>
           <a:prstGeom prst="rect">
             <a:avLst/>
@@ -4368,7 +4371,7 @@
         <p:spPr>
           <a:xfrm>
             <a:off x="609480" y="273600"/>
-            <a:ext cx="10972440" cy="5307840"/>
+            <a:ext cx="10972080" cy="5307840"/>
           </a:xfrm>
           <a:prstGeom prst="rect">
             <a:avLst/>
@@ -4427,7 +4430,7 @@
         <p:spPr>
           <a:xfrm>
             <a:off x="609480" y="273600"/>
-            <a:ext cx="10972440" cy="1144800"/>
+            <a:ext cx="10972080" cy="1144800"/>
           </a:xfrm>
           <a:prstGeom prst="rect">
             <a:avLst/>
@@ -4600,7 +4603,7 @@
         <p:spPr>
           <a:xfrm>
             <a:off x="609480" y="273600"/>
-            <a:ext cx="10972440" cy="1144800"/>
+            <a:ext cx="10972080" cy="1144800"/>
           </a:xfrm>
           <a:prstGeom prst="rect">
             <a:avLst/>
@@ -4773,7 +4776,7 @@
         <p:spPr>
           <a:xfrm>
             <a:off x="609480" y="273600"/>
-            <a:ext cx="10972440" cy="1144800"/>
+            <a:ext cx="10972080" cy="1144800"/>
           </a:xfrm>
           <a:prstGeom prst="rect">
             <a:avLst/>
@@ -4946,7 +4949,7 @@
         <p:spPr>
           <a:xfrm>
             <a:off x="609480" y="273600"/>
-            <a:ext cx="10972440" cy="1144800"/>
+            <a:ext cx="10972080" cy="1144800"/>
           </a:xfrm>
           <a:prstGeom prst="rect">
             <a:avLst/>
@@ -5081,7 +5084,7 @@
         <p:spPr>
           <a:xfrm>
             <a:off x="609480" y="273600"/>
-            <a:ext cx="10972440" cy="1144800"/>
+            <a:ext cx="10972080" cy="1144800"/>
           </a:xfrm>
           <a:prstGeom prst="rect">
             <a:avLst/>
@@ -5292,7 +5295,7 @@
         <p:spPr>
           <a:xfrm>
             <a:off x="609480" y="273600"/>
-            <a:ext cx="10972440" cy="1144800"/>
+            <a:ext cx="10972080" cy="1144800"/>
           </a:xfrm>
           <a:prstGeom prst="rect">
             <a:avLst/>
@@ -5399,13 +5402,13 @@
           <p:nvPr/>
         </p:nvPicPr>
         <p:blipFill>
-          <a:blip r:embed="rId2"/>
+          <a:blip r:embed=""/>
           <a:stretch/>
         </p:blipFill>
         <p:spPr>
           <a:xfrm>
-            <a:off x="3602880" y="1604520"/>
-            <a:ext cx="4984920" cy="3977280"/>
+            <a:off x="609480" y="1604520"/>
+            <a:ext cx="10972440" cy="3977280"/>
           </a:xfrm>
           <a:prstGeom prst="rect">
             <a:avLst/>
@@ -5422,13 +5425,13 @@
           <p:nvPr/>
         </p:nvPicPr>
         <p:blipFill>
-          <a:blip r:embed="rId3"/>
+          <a:blip r:embed=""/>
           <a:stretch/>
         </p:blipFill>
         <p:spPr>
           <a:xfrm>
-            <a:off x="3602880" y="1604520"/>
-            <a:ext cx="4984920" cy="3977280"/>
+            <a:off x="609480" y="1604520"/>
+            <a:ext cx="10972440" cy="3977280"/>
           </a:xfrm>
           <a:prstGeom prst="rect">
             <a:avLst/>
@@ -5438,6 +5441,28 @@
           </a:ln>
         </p:spPr>
       </p:pic>
+    </p:spTree>
+  </p:cSld>
+</p:sldLayout>
+</file>
+
+<file path=ppt/slideLayouts/slideLayout49.xml><?xml version="1.0" encoding="utf-8"?>
+<p:sldLayout xmlns:a="http://schemas.openxmlformats.org/drawingml/2006/main" xmlns:p="http://schemas.openxmlformats.org/presentationml/2006/main" xmlns:r="http://schemas.openxmlformats.org/officeDocument/2006/relationships" xmlns:p14="http://schemas.microsoft.com/office/powerpoint/2010/main" xmlns:p15="http://schemas.microsoft.com/office/powerpoint/2012/main" xmlns:mc="http://schemas.openxmlformats.org/markup-compatibility/2006" type="blank" preserve="1">
+  <p:cSld name="Blank Slide">
+    <p:spTree>
+      <p:nvGrpSpPr>
+        <p:cNvPr id="1" name=""/>
+        <p:cNvGrpSpPr/>
+        <p:nvPr/>
+      </p:nvGrpSpPr>
+      <p:grpSpPr>
+        <a:xfrm>
+          <a:off x="0" y="0"/>
+          <a:ext cx="0" cy="0"/>
+          <a:chOff x="0" y="0"/>
+          <a:chExt cx="0" cy="0"/>
+        </a:xfrm>
+      </p:grpSpPr>
     </p:spTree>
   </p:cSld>
 </p:sldLayout>
@@ -5473,7 +5498,7 @@
         <p:spPr>
           <a:xfrm>
             <a:off x="609480" y="273600"/>
-            <a:ext cx="10972440" cy="1144800"/>
+            <a:ext cx="10972080" cy="1144800"/>
           </a:xfrm>
           <a:prstGeom prst="rect">
             <a:avLst/>
@@ -5484,6 +5509,1317 @@
           <a:p>
             <a:pPr algn="ctr"/>
             <a:endParaRPr b="0" lang="en-AU" sz="4400" spc="-1" strike="noStrike">
+              <a:solidFill>
+                <a:srgbClr val="000000"/>
+              </a:solidFill>
+              <a:uFill>
+                <a:solidFill>
+                  <a:srgbClr val="ffffff"/>
+                </a:solidFill>
+              </a:uFill>
+              <a:latin typeface="Arial"/>
+            </a:endParaRPr>
+          </a:p>
+        </p:txBody>
+      </p:sp>
+    </p:spTree>
+  </p:cSld>
+</p:sldLayout>
+</file>
+
+<file path=ppt/slideLayouts/slideLayout50.xml><?xml version="1.0" encoding="utf-8"?>
+<p:sldLayout xmlns:a="http://schemas.openxmlformats.org/drawingml/2006/main" xmlns:p="http://schemas.openxmlformats.org/presentationml/2006/main" xmlns:r="http://schemas.openxmlformats.org/officeDocument/2006/relationships" xmlns:p14="http://schemas.microsoft.com/office/powerpoint/2010/main" xmlns:p15="http://schemas.microsoft.com/office/powerpoint/2012/main" xmlns:mc="http://schemas.openxmlformats.org/markup-compatibility/2006" type="tx" preserve="1">
+  <p:cSld name="Title Slide">
+    <p:spTree>
+      <p:nvGrpSpPr>
+        <p:cNvPr id="1" name=""/>
+        <p:cNvGrpSpPr/>
+        <p:nvPr/>
+      </p:nvGrpSpPr>
+      <p:grpSpPr>
+        <a:xfrm>
+          <a:off x="0" y="0"/>
+          <a:ext cx="0" cy="0"/>
+          <a:chOff x="0" y="0"/>
+          <a:chExt cx="0" cy="0"/>
+        </a:xfrm>
+      </p:grpSpPr>
+      <p:sp>
+        <p:nvSpPr>
+          <p:cNvPr id="160" name="PlaceHolder 1"/>
+          <p:cNvSpPr>
+            <a:spLocks noGrp="1"/>
+          </p:cNvSpPr>
+          <p:nvPr>
+            <p:ph type="title"/>
+          </p:nvPr>
+        </p:nvSpPr>
+        <p:spPr>
+          <a:xfrm>
+            <a:off x="609480" y="273600"/>
+            <a:ext cx="10972080" cy="1144800"/>
+          </a:xfrm>
+          <a:prstGeom prst="rect">
+            <a:avLst/>
+          </a:prstGeom>
+        </p:spPr>
+        <p:txBody>
+          <a:bodyPr lIns="0" rIns="0" tIns="0" bIns="0" anchor="ctr"/>
+          <a:p>
+            <a:pPr algn="ctr"/>
+            <a:endParaRPr b="0" lang="en-AU" sz="4400" spc="-1" strike="noStrike">
+              <a:solidFill>
+                <a:srgbClr val="000000"/>
+              </a:solidFill>
+              <a:uFill>
+                <a:solidFill>
+                  <a:srgbClr val="ffffff"/>
+                </a:solidFill>
+              </a:uFill>
+              <a:latin typeface="Arial"/>
+            </a:endParaRPr>
+          </a:p>
+        </p:txBody>
+      </p:sp>
+      <p:sp>
+        <p:nvSpPr>
+          <p:cNvPr id="161" name="PlaceHolder 2"/>
+          <p:cNvSpPr>
+            <a:spLocks noGrp="1"/>
+          </p:cNvSpPr>
+          <p:nvPr>
+            <p:ph type="subTitle"/>
+          </p:nvPr>
+        </p:nvSpPr>
+        <p:spPr>
+          <a:xfrm>
+            <a:off x="609480" y="1604520"/>
+            <a:ext cx="10972440" cy="3977280"/>
+          </a:xfrm>
+          <a:prstGeom prst="rect">
+            <a:avLst/>
+          </a:prstGeom>
+        </p:spPr>
+        <p:txBody>
+          <a:bodyPr lIns="0" rIns="0" tIns="0" bIns="0" anchor="ctr"/>
+          <a:p>
+            <a:pPr algn="ctr"/>
+            <a:endParaRPr b="0" lang="en-AU" sz="3200" spc="-1" strike="noStrike">
+              <a:solidFill>
+                <a:srgbClr val="000000"/>
+              </a:solidFill>
+              <a:uFill>
+                <a:solidFill>
+                  <a:srgbClr val="ffffff"/>
+                </a:solidFill>
+              </a:uFill>
+              <a:latin typeface="Arial"/>
+            </a:endParaRPr>
+          </a:p>
+        </p:txBody>
+      </p:sp>
+    </p:spTree>
+  </p:cSld>
+</p:sldLayout>
+</file>
+
+<file path=ppt/slideLayouts/slideLayout51.xml><?xml version="1.0" encoding="utf-8"?>
+<p:sldLayout xmlns:a="http://schemas.openxmlformats.org/drawingml/2006/main" xmlns:p="http://schemas.openxmlformats.org/presentationml/2006/main" xmlns:r="http://schemas.openxmlformats.org/officeDocument/2006/relationships" xmlns:p14="http://schemas.microsoft.com/office/powerpoint/2010/main" xmlns:p15="http://schemas.microsoft.com/office/powerpoint/2012/main" xmlns:mc="http://schemas.openxmlformats.org/markup-compatibility/2006" type="obj" preserve="1">
+  <p:cSld name="Title, Content">
+    <p:spTree>
+      <p:nvGrpSpPr>
+        <p:cNvPr id="1" name=""/>
+        <p:cNvGrpSpPr/>
+        <p:nvPr/>
+      </p:nvGrpSpPr>
+      <p:grpSpPr>
+        <a:xfrm>
+          <a:off x="0" y="0"/>
+          <a:ext cx="0" cy="0"/>
+          <a:chOff x="0" y="0"/>
+          <a:chExt cx="0" cy="0"/>
+        </a:xfrm>
+      </p:grpSpPr>
+      <p:sp>
+        <p:nvSpPr>
+          <p:cNvPr id="162" name="PlaceHolder 1"/>
+          <p:cNvSpPr>
+            <a:spLocks noGrp="1"/>
+          </p:cNvSpPr>
+          <p:nvPr>
+            <p:ph type="title"/>
+          </p:nvPr>
+        </p:nvSpPr>
+        <p:spPr>
+          <a:xfrm>
+            <a:off x="609480" y="273600"/>
+            <a:ext cx="10972080" cy="1144800"/>
+          </a:xfrm>
+          <a:prstGeom prst="rect">
+            <a:avLst/>
+          </a:prstGeom>
+        </p:spPr>
+        <p:txBody>
+          <a:bodyPr lIns="0" rIns="0" tIns="0" bIns="0" anchor="ctr"/>
+          <a:p>
+            <a:pPr algn="ctr"/>
+            <a:endParaRPr b="0" lang="en-AU" sz="4400" spc="-1" strike="noStrike">
+              <a:solidFill>
+                <a:srgbClr val="000000"/>
+              </a:solidFill>
+              <a:uFill>
+                <a:solidFill>
+                  <a:srgbClr val="ffffff"/>
+                </a:solidFill>
+              </a:uFill>
+              <a:latin typeface="Arial"/>
+            </a:endParaRPr>
+          </a:p>
+        </p:txBody>
+      </p:sp>
+      <p:sp>
+        <p:nvSpPr>
+          <p:cNvPr id="163" name="PlaceHolder 2"/>
+          <p:cNvSpPr>
+            <a:spLocks noGrp="1"/>
+          </p:cNvSpPr>
+          <p:nvPr>
+            <p:ph type="body"/>
+          </p:nvPr>
+        </p:nvSpPr>
+        <p:spPr>
+          <a:xfrm>
+            <a:off x="609480" y="1604520"/>
+            <a:ext cx="10972440" cy="3977280"/>
+          </a:xfrm>
+          <a:prstGeom prst="rect">
+            <a:avLst/>
+          </a:prstGeom>
+        </p:spPr>
+        <p:txBody>
+          <a:bodyPr lIns="0" rIns="0" tIns="0" bIns="0">
+            <a:normAutofit/>
+          </a:bodyPr>
+          <a:p>
+            <a:endParaRPr b="0" lang="en-AU" sz="3200" spc="-1" strike="noStrike">
+              <a:solidFill>
+                <a:srgbClr val="000000"/>
+              </a:solidFill>
+              <a:uFill>
+                <a:solidFill>
+                  <a:srgbClr val="ffffff"/>
+                </a:solidFill>
+              </a:uFill>
+              <a:latin typeface="Arial"/>
+            </a:endParaRPr>
+          </a:p>
+        </p:txBody>
+      </p:sp>
+    </p:spTree>
+  </p:cSld>
+</p:sldLayout>
+</file>
+
+<file path=ppt/slideLayouts/slideLayout52.xml><?xml version="1.0" encoding="utf-8"?>
+<p:sldLayout xmlns:a="http://schemas.openxmlformats.org/drawingml/2006/main" xmlns:p="http://schemas.openxmlformats.org/presentationml/2006/main" xmlns:r="http://schemas.openxmlformats.org/officeDocument/2006/relationships" xmlns:p14="http://schemas.microsoft.com/office/powerpoint/2010/main" xmlns:p15="http://schemas.microsoft.com/office/powerpoint/2012/main" xmlns:mc="http://schemas.openxmlformats.org/markup-compatibility/2006" type="twoObj" preserve="1">
+  <p:cSld name="Title, 2 Content">
+    <p:spTree>
+      <p:nvGrpSpPr>
+        <p:cNvPr id="1" name=""/>
+        <p:cNvGrpSpPr/>
+        <p:nvPr/>
+      </p:nvGrpSpPr>
+      <p:grpSpPr>
+        <a:xfrm>
+          <a:off x="0" y="0"/>
+          <a:ext cx="0" cy="0"/>
+          <a:chOff x="0" y="0"/>
+          <a:chExt cx="0" cy="0"/>
+        </a:xfrm>
+      </p:grpSpPr>
+      <p:sp>
+        <p:nvSpPr>
+          <p:cNvPr id="164" name="PlaceHolder 1"/>
+          <p:cNvSpPr>
+            <a:spLocks noGrp="1"/>
+          </p:cNvSpPr>
+          <p:nvPr>
+            <p:ph type="title"/>
+          </p:nvPr>
+        </p:nvSpPr>
+        <p:spPr>
+          <a:xfrm>
+            <a:off x="609480" y="273600"/>
+            <a:ext cx="10972080" cy="1144800"/>
+          </a:xfrm>
+          <a:prstGeom prst="rect">
+            <a:avLst/>
+          </a:prstGeom>
+        </p:spPr>
+        <p:txBody>
+          <a:bodyPr lIns="0" rIns="0" tIns="0" bIns="0" anchor="ctr"/>
+          <a:p>
+            <a:pPr algn="ctr"/>
+            <a:endParaRPr b="0" lang="en-AU" sz="4400" spc="-1" strike="noStrike">
+              <a:solidFill>
+                <a:srgbClr val="000000"/>
+              </a:solidFill>
+              <a:uFill>
+                <a:solidFill>
+                  <a:srgbClr val="ffffff"/>
+                </a:solidFill>
+              </a:uFill>
+              <a:latin typeface="Arial"/>
+            </a:endParaRPr>
+          </a:p>
+        </p:txBody>
+      </p:sp>
+      <p:sp>
+        <p:nvSpPr>
+          <p:cNvPr id="165" name="PlaceHolder 2"/>
+          <p:cNvSpPr>
+            <a:spLocks noGrp="1"/>
+          </p:cNvSpPr>
+          <p:nvPr>
+            <p:ph type="body"/>
+          </p:nvPr>
+        </p:nvSpPr>
+        <p:spPr>
+          <a:xfrm>
+            <a:off x="609480" y="1604520"/>
+            <a:ext cx="5354280" cy="3977280"/>
+          </a:xfrm>
+          <a:prstGeom prst="rect">
+            <a:avLst/>
+          </a:prstGeom>
+        </p:spPr>
+        <p:txBody>
+          <a:bodyPr lIns="0" rIns="0" tIns="0" bIns="0">
+            <a:normAutofit/>
+          </a:bodyPr>
+          <a:p>
+            <a:endParaRPr b="0" lang="en-AU" sz="3200" spc="-1" strike="noStrike">
+              <a:solidFill>
+                <a:srgbClr val="000000"/>
+              </a:solidFill>
+              <a:uFill>
+                <a:solidFill>
+                  <a:srgbClr val="ffffff"/>
+                </a:solidFill>
+              </a:uFill>
+              <a:latin typeface="Arial"/>
+            </a:endParaRPr>
+          </a:p>
+        </p:txBody>
+      </p:sp>
+      <p:sp>
+        <p:nvSpPr>
+          <p:cNvPr id="166" name="PlaceHolder 3"/>
+          <p:cNvSpPr>
+            <a:spLocks noGrp="1"/>
+          </p:cNvSpPr>
+          <p:nvPr>
+            <p:ph type="body"/>
+          </p:nvPr>
+        </p:nvSpPr>
+        <p:spPr>
+          <a:xfrm>
+            <a:off x="6231960" y="1604520"/>
+            <a:ext cx="5354280" cy="3977280"/>
+          </a:xfrm>
+          <a:prstGeom prst="rect">
+            <a:avLst/>
+          </a:prstGeom>
+        </p:spPr>
+        <p:txBody>
+          <a:bodyPr lIns="0" rIns="0" tIns="0" bIns="0">
+            <a:normAutofit/>
+          </a:bodyPr>
+          <a:p>
+            <a:endParaRPr b="0" lang="en-AU" sz="3200" spc="-1" strike="noStrike">
+              <a:solidFill>
+                <a:srgbClr val="000000"/>
+              </a:solidFill>
+              <a:uFill>
+                <a:solidFill>
+                  <a:srgbClr val="ffffff"/>
+                </a:solidFill>
+              </a:uFill>
+              <a:latin typeface="Arial"/>
+            </a:endParaRPr>
+          </a:p>
+        </p:txBody>
+      </p:sp>
+    </p:spTree>
+  </p:cSld>
+</p:sldLayout>
+</file>
+
+<file path=ppt/slideLayouts/slideLayout53.xml><?xml version="1.0" encoding="utf-8"?>
+<p:sldLayout xmlns:a="http://schemas.openxmlformats.org/drawingml/2006/main" xmlns:p="http://schemas.openxmlformats.org/presentationml/2006/main" xmlns:r="http://schemas.openxmlformats.org/officeDocument/2006/relationships" xmlns:p14="http://schemas.microsoft.com/office/powerpoint/2010/main" xmlns:p15="http://schemas.microsoft.com/office/powerpoint/2012/main" xmlns:mc="http://schemas.openxmlformats.org/markup-compatibility/2006" type="titleOnly" preserve="1">
+  <p:cSld name="Title Only">
+    <p:spTree>
+      <p:nvGrpSpPr>
+        <p:cNvPr id="1" name=""/>
+        <p:cNvGrpSpPr/>
+        <p:nvPr/>
+      </p:nvGrpSpPr>
+      <p:grpSpPr>
+        <a:xfrm>
+          <a:off x="0" y="0"/>
+          <a:ext cx="0" cy="0"/>
+          <a:chOff x="0" y="0"/>
+          <a:chExt cx="0" cy="0"/>
+        </a:xfrm>
+      </p:grpSpPr>
+      <p:sp>
+        <p:nvSpPr>
+          <p:cNvPr id="167" name="PlaceHolder 1"/>
+          <p:cNvSpPr>
+            <a:spLocks noGrp="1"/>
+          </p:cNvSpPr>
+          <p:nvPr>
+            <p:ph type="title"/>
+          </p:nvPr>
+        </p:nvSpPr>
+        <p:spPr>
+          <a:xfrm>
+            <a:off x="609480" y="273600"/>
+            <a:ext cx="10972080" cy="1144800"/>
+          </a:xfrm>
+          <a:prstGeom prst="rect">
+            <a:avLst/>
+          </a:prstGeom>
+        </p:spPr>
+        <p:txBody>
+          <a:bodyPr lIns="0" rIns="0" tIns="0" bIns="0" anchor="ctr"/>
+          <a:p>
+            <a:pPr algn="ctr"/>
+            <a:endParaRPr b="0" lang="en-AU" sz="4400" spc="-1" strike="noStrike">
+              <a:solidFill>
+                <a:srgbClr val="000000"/>
+              </a:solidFill>
+              <a:uFill>
+                <a:solidFill>
+                  <a:srgbClr val="ffffff"/>
+                </a:solidFill>
+              </a:uFill>
+              <a:latin typeface="Arial"/>
+            </a:endParaRPr>
+          </a:p>
+        </p:txBody>
+      </p:sp>
+    </p:spTree>
+  </p:cSld>
+</p:sldLayout>
+</file>
+
+<file path=ppt/slideLayouts/slideLayout54.xml><?xml version="1.0" encoding="utf-8"?>
+<p:sldLayout xmlns:a="http://schemas.openxmlformats.org/drawingml/2006/main" xmlns:p="http://schemas.openxmlformats.org/presentationml/2006/main" xmlns:r="http://schemas.openxmlformats.org/officeDocument/2006/relationships" xmlns:p14="http://schemas.microsoft.com/office/powerpoint/2010/main" xmlns:p15="http://schemas.microsoft.com/office/powerpoint/2012/main" xmlns:mc="http://schemas.openxmlformats.org/markup-compatibility/2006" type="objOnly" preserve="1">
+  <p:cSld name="Centered Text">
+    <p:spTree>
+      <p:nvGrpSpPr>
+        <p:cNvPr id="1" name=""/>
+        <p:cNvGrpSpPr/>
+        <p:nvPr/>
+      </p:nvGrpSpPr>
+      <p:grpSpPr>
+        <a:xfrm>
+          <a:off x="0" y="0"/>
+          <a:ext cx="0" cy="0"/>
+          <a:chOff x="0" y="0"/>
+          <a:chExt cx="0" cy="0"/>
+        </a:xfrm>
+      </p:grpSpPr>
+      <p:sp>
+        <p:nvSpPr>
+          <p:cNvPr id="168" name="PlaceHolder 1"/>
+          <p:cNvSpPr>
+            <a:spLocks noGrp="1"/>
+          </p:cNvSpPr>
+          <p:nvPr>
+            <p:ph type="subTitle"/>
+          </p:nvPr>
+        </p:nvSpPr>
+        <p:spPr>
+          <a:xfrm>
+            <a:off x="609480" y="273600"/>
+            <a:ext cx="10972080" cy="5307840"/>
+          </a:xfrm>
+          <a:prstGeom prst="rect">
+            <a:avLst/>
+          </a:prstGeom>
+        </p:spPr>
+        <p:txBody>
+          <a:bodyPr lIns="0" rIns="0" tIns="0" bIns="0" anchor="ctr"/>
+          <a:p>
+            <a:pPr algn="ctr"/>
+            <a:endParaRPr b="0" lang="en-AU" sz="3200" spc="-1" strike="noStrike">
+              <a:solidFill>
+                <a:srgbClr val="000000"/>
+              </a:solidFill>
+              <a:uFill>
+                <a:solidFill>
+                  <a:srgbClr val="ffffff"/>
+                </a:solidFill>
+              </a:uFill>
+              <a:latin typeface="Arial"/>
+            </a:endParaRPr>
+          </a:p>
+        </p:txBody>
+      </p:sp>
+    </p:spTree>
+  </p:cSld>
+</p:sldLayout>
+</file>
+
+<file path=ppt/slideLayouts/slideLayout55.xml><?xml version="1.0" encoding="utf-8"?>
+<p:sldLayout xmlns:a="http://schemas.openxmlformats.org/drawingml/2006/main" xmlns:p="http://schemas.openxmlformats.org/presentationml/2006/main" xmlns:r="http://schemas.openxmlformats.org/officeDocument/2006/relationships" xmlns:p14="http://schemas.microsoft.com/office/powerpoint/2010/main" xmlns:p15="http://schemas.microsoft.com/office/powerpoint/2012/main" xmlns:mc="http://schemas.openxmlformats.org/markup-compatibility/2006" type="twoObjAndObj" preserve="1">
+  <p:cSld name="Title, 2 Content and Content">
+    <p:spTree>
+      <p:nvGrpSpPr>
+        <p:cNvPr id="1" name=""/>
+        <p:cNvGrpSpPr/>
+        <p:nvPr/>
+      </p:nvGrpSpPr>
+      <p:grpSpPr>
+        <a:xfrm>
+          <a:off x="0" y="0"/>
+          <a:ext cx="0" cy="0"/>
+          <a:chOff x="0" y="0"/>
+          <a:chExt cx="0" cy="0"/>
+        </a:xfrm>
+      </p:grpSpPr>
+      <p:sp>
+        <p:nvSpPr>
+          <p:cNvPr id="169" name="PlaceHolder 1"/>
+          <p:cNvSpPr>
+            <a:spLocks noGrp="1"/>
+          </p:cNvSpPr>
+          <p:nvPr>
+            <p:ph type="title"/>
+          </p:nvPr>
+        </p:nvSpPr>
+        <p:spPr>
+          <a:xfrm>
+            <a:off x="609480" y="273600"/>
+            <a:ext cx="10972080" cy="1144800"/>
+          </a:xfrm>
+          <a:prstGeom prst="rect">
+            <a:avLst/>
+          </a:prstGeom>
+        </p:spPr>
+        <p:txBody>
+          <a:bodyPr lIns="0" rIns="0" tIns="0" bIns="0" anchor="ctr"/>
+          <a:p>
+            <a:pPr algn="ctr"/>
+            <a:endParaRPr b="0" lang="en-AU" sz="4400" spc="-1" strike="noStrike">
+              <a:solidFill>
+                <a:srgbClr val="000000"/>
+              </a:solidFill>
+              <a:uFill>
+                <a:solidFill>
+                  <a:srgbClr val="ffffff"/>
+                </a:solidFill>
+              </a:uFill>
+              <a:latin typeface="Arial"/>
+            </a:endParaRPr>
+          </a:p>
+        </p:txBody>
+      </p:sp>
+      <p:sp>
+        <p:nvSpPr>
+          <p:cNvPr id="170" name="PlaceHolder 2"/>
+          <p:cNvSpPr>
+            <a:spLocks noGrp="1"/>
+          </p:cNvSpPr>
+          <p:nvPr>
+            <p:ph type="body"/>
+          </p:nvPr>
+        </p:nvSpPr>
+        <p:spPr>
+          <a:xfrm>
+            <a:off x="609480" y="1604520"/>
+            <a:ext cx="5354280" cy="1896840"/>
+          </a:xfrm>
+          <a:prstGeom prst="rect">
+            <a:avLst/>
+          </a:prstGeom>
+        </p:spPr>
+        <p:txBody>
+          <a:bodyPr lIns="0" rIns="0" tIns="0" bIns="0">
+            <a:normAutofit/>
+          </a:bodyPr>
+          <a:p>
+            <a:endParaRPr b="0" lang="en-AU" sz="3200" spc="-1" strike="noStrike">
+              <a:solidFill>
+                <a:srgbClr val="000000"/>
+              </a:solidFill>
+              <a:uFill>
+                <a:solidFill>
+                  <a:srgbClr val="ffffff"/>
+                </a:solidFill>
+              </a:uFill>
+              <a:latin typeface="Arial"/>
+            </a:endParaRPr>
+          </a:p>
+        </p:txBody>
+      </p:sp>
+      <p:sp>
+        <p:nvSpPr>
+          <p:cNvPr id="171" name="PlaceHolder 3"/>
+          <p:cNvSpPr>
+            <a:spLocks noGrp="1"/>
+          </p:cNvSpPr>
+          <p:nvPr>
+            <p:ph type="body"/>
+          </p:nvPr>
+        </p:nvSpPr>
+        <p:spPr>
+          <a:xfrm>
+            <a:off x="609480" y="3682080"/>
+            <a:ext cx="5354280" cy="1896840"/>
+          </a:xfrm>
+          <a:prstGeom prst="rect">
+            <a:avLst/>
+          </a:prstGeom>
+        </p:spPr>
+        <p:txBody>
+          <a:bodyPr lIns="0" rIns="0" tIns="0" bIns="0">
+            <a:normAutofit/>
+          </a:bodyPr>
+          <a:p>
+            <a:endParaRPr b="0" lang="en-AU" sz="3200" spc="-1" strike="noStrike">
+              <a:solidFill>
+                <a:srgbClr val="000000"/>
+              </a:solidFill>
+              <a:uFill>
+                <a:solidFill>
+                  <a:srgbClr val="ffffff"/>
+                </a:solidFill>
+              </a:uFill>
+              <a:latin typeface="Arial"/>
+            </a:endParaRPr>
+          </a:p>
+        </p:txBody>
+      </p:sp>
+      <p:sp>
+        <p:nvSpPr>
+          <p:cNvPr id="172" name="PlaceHolder 4"/>
+          <p:cNvSpPr>
+            <a:spLocks noGrp="1"/>
+          </p:cNvSpPr>
+          <p:nvPr>
+            <p:ph type="body"/>
+          </p:nvPr>
+        </p:nvSpPr>
+        <p:spPr>
+          <a:xfrm>
+            <a:off x="6231960" y="1604520"/>
+            <a:ext cx="5354280" cy="3977280"/>
+          </a:xfrm>
+          <a:prstGeom prst="rect">
+            <a:avLst/>
+          </a:prstGeom>
+        </p:spPr>
+        <p:txBody>
+          <a:bodyPr lIns="0" rIns="0" tIns="0" bIns="0">
+            <a:normAutofit/>
+          </a:bodyPr>
+          <a:p>
+            <a:endParaRPr b="0" lang="en-AU" sz="3200" spc="-1" strike="noStrike">
+              <a:solidFill>
+                <a:srgbClr val="000000"/>
+              </a:solidFill>
+              <a:uFill>
+                <a:solidFill>
+                  <a:srgbClr val="ffffff"/>
+                </a:solidFill>
+              </a:uFill>
+              <a:latin typeface="Arial"/>
+            </a:endParaRPr>
+          </a:p>
+        </p:txBody>
+      </p:sp>
+    </p:spTree>
+  </p:cSld>
+</p:sldLayout>
+</file>
+
+<file path=ppt/slideLayouts/slideLayout56.xml><?xml version="1.0" encoding="utf-8"?>
+<p:sldLayout xmlns:a="http://schemas.openxmlformats.org/drawingml/2006/main" xmlns:p="http://schemas.openxmlformats.org/presentationml/2006/main" xmlns:r="http://schemas.openxmlformats.org/officeDocument/2006/relationships" xmlns:p14="http://schemas.microsoft.com/office/powerpoint/2010/main" xmlns:p15="http://schemas.microsoft.com/office/powerpoint/2012/main" xmlns:mc="http://schemas.openxmlformats.org/markup-compatibility/2006" type="objAndTwoObj" preserve="1">
+  <p:cSld name="Title Content and 2 Content">
+    <p:spTree>
+      <p:nvGrpSpPr>
+        <p:cNvPr id="1" name=""/>
+        <p:cNvGrpSpPr/>
+        <p:nvPr/>
+      </p:nvGrpSpPr>
+      <p:grpSpPr>
+        <a:xfrm>
+          <a:off x="0" y="0"/>
+          <a:ext cx="0" cy="0"/>
+          <a:chOff x="0" y="0"/>
+          <a:chExt cx="0" cy="0"/>
+        </a:xfrm>
+      </p:grpSpPr>
+      <p:sp>
+        <p:nvSpPr>
+          <p:cNvPr id="173" name="PlaceHolder 1"/>
+          <p:cNvSpPr>
+            <a:spLocks noGrp="1"/>
+          </p:cNvSpPr>
+          <p:nvPr>
+            <p:ph type="title"/>
+          </p:nvPr>
+        </p:nvSpPr>
+        <p:spPr>
+          <a:xfrm>
+            <a:off x="609480" y="273600"/>
+            <a:ext cx="10972080" cy="1144800"/>
+          </a:xfrm>
+          <a:prstGeom prst="rect">
+            <a:avLst/>
+          </a:prstGeom>
+        </p:spPr>
+        <p:txBody>
+          <a:bodyPr lIns="0" rIns="0" tIns="0" bIns="0" anchor="ctr"/>
+          <a:p>
+            <a:pPr algn="ctr"/>
+            <a:endParaRPr b="0" lang="en-AU" sz="4400" spc="-1" strike="noStrike">
+              <a:solidFill>
+                <a:srgbClr val="000000"/>
+              </a:solidFill>
+              <a:uFill>
+                <a:solidFill>
+                  <a:srgbClr val="ffffff"/>
+                </a:solidFill>
+              </a:uFill>
+              <a:latin typeface="Arial"/>
+            </a:endParaRPr>
+          </a:p>
+        </p:txBody>
+      </p:sp>
+      <p:sp>
+        <p:nvSpPr>
+          <p:cNvPr id="174" name="PlaceHolder 2"/>
+          <p:cNvSpPr>
+            <a:spLocks noGrp="1"/>
+          </p:cNvSpPr>
+          <p:nvPr>
+            <p:ph type="body"/>
+          </p:nvPr>
+        </p:nvSpPr>
+        <p:spPr>
+          <a:xfrm>
+            <a:off x="609480" y="1604520"/>
+            <a:ext cx="5354280" cy="3977280"/>
+          </a:xfrm>
+          <a:prstGeom prst="rect">
+            <a:avLst/>
+          </a:prstGeom>
+        </p:spPr>
+        <p:txBody>
+          <a:bodyPr lIns="0" rIns="0" tIns="0" bIns="0">
+            <a:normAutofit/>
+          </a:bodyPr>
+          <a:p>
+            <a:endParaRPr b="0" lang="en-AU" sz="3200" spc="-1" strike="noStrike">
+              <a:solidFill>
+                <a:srgbClr val="000000"/>
+              </a:solidFill>
+              <a:uFill>
+                <a:solidFill>
+                  <a:srgbClr val="ffffff"/>
+                </a:solidFill>
+              </a:uFill>
+              <a:latin typeface="Arial"/>
+            </a:endParaRPr>
+          </a:p>
+        </p:txBody>
+      </p:sp>
+      <p:sp>
+        <p:nvSpPr>
+          <p:cNvPr id="175" name="PlaceHolder 3"/>
+          <p:cNvSpPr>
+            <a:spLocks noGrp="1"/>
+          </p:cNvSpPr>
+          <p:nvPr>
+            <p:ph type="body"/>
+          </p:nvPr>
+        </p:nvSpPr>
+        <p:spPr>
+          <a:xfrm>
+            <a:off x="6231960" y="1604520"/>
+            <a:ext cx="5354280" cy="1896840"/>
+          </a:xfrm>
+          <a:prstGeom prst="rect">
+            <a:avLst/>
+          </a:prstGeom>
+        </p:spPr>
+        <p:txBody>
+          <a:bodyPr lIns="0" rIns="0" tIns="0" bIns="0">
+            <a:normAutofit/>
+          </a:bodyPr>
+          <a:p>
+            <a:endParaRPr b="0" lang="en-AU" sz="3200" spc="-1" strike="noStrike">
+              <a:solidFill>
+                <a:srgbClr val="000000"/>
+              </a:solidFill>
+              <a:uFill>
+                <a:solidFill>
+                  <a:srgbClr val="ffffff"/>
+                </a:solidFill>
+              </a:uFill>
+              <a:latin typeface="Arial"/>
+            </a:endParaRPr>
+          </a:p>
+        </p:txBody>
+      </p:sp>
+      <p:sp>
+        <p:nvSpPr>
+          <p:cNvPr id="176" name="PlaceHolder 4"/>
+          <p:cNvSpPr>
+            <a:spLocks noGrp="1"/>
+          </p:cNvSpPr>
+          <p:nvPr>
+            <p:ph type="body"/>
+          </p:nvPr>
+        </p:nvSpPr>
+        <p:spPr>
+          <a:xfrm>
+            <a:off x="6231960" y="3682080"/>
+            <a:ext cx="5354280" cy="1896840"/>
+          </a:xfrm>
+          <a:prstGeom prst="rect">
+            <a:avLst/>
+          </a:prstGeom>
+        </p:spPr>
+        <p:txBody>
+          <a:bodyPr lIns="0" rIns="0" tIns="0" bIns="0">
+            <a:normAutofit/>
+          </a:bodyPr>
+          <a:p>
+            <a:endParaRPr b="0" lang="en-AU" sz="3200" spc="-1" strike="noStrike">
+              <a:solidFill>
+                <a:srgbClr val="000000"/>
+              </a:solidFill>
+              <a:uFill>
+                <a:solidFill>
+                  <a:srgbClr val="ffffff"/>
+                </a:solidFill>
+              </a:uFill>
+              <a:latin typeface="Arial"/>
+            </a:endParaRPr>
+          </a:p>
+        </p:txBody>
+      </p:sp>
+    </p:spTree>
+  </p:cSld>
+</p:sldLayout>
+</file>
+
+<file path=ppt/slideLayouts/slideLayout57.xml><?xml version="1.0" encoding="utf-8"?>
+<p:sldLayout xmlns:a="http://schemas.openxmlformats.org/drawingml/2006/main" xmlns:p="http://schemas.openxmlformats.org/presentationml/2006/main" xmlns:r="http://schemas.openxmlformats.org/officeDocument/2006/relationships" xmlns:p14="http://schemas.microsoft.com/office/powerpoint/2010/main" xmlns:p15="http://schemas.microsoft.com/office/powerpoint/2012/main" xmlns:mc="http://schemas.openxmlformats.org/markup-compatibility/2006" type="twoObjOverTx" preserve="1">
+  <p:cSld name="Title, 2 Content over Content">
+    <p:spTree>
+      <p:nvGrpSpPr>
+        <p:cNvPr id="1" name=""/>
+        <p:cNvGrpSpPr/>
+        <p:nvPr/>
+      </p:nvGrpSpPr>
+      <p:grpSpPr>
+        <a:xfrm>
+          <a:off x="0" y="0"/>
+          <a:ext cx="0" cy="0"/>
+          <a:chOff x="0" y="0"/>
+          <a:chExt cx="0" cy="0"/>
+        </a:xfrm>
+      </p:grpSpPr>
+      <p:sp>
+        <p:nvSpPr>
+          <p:cNvPr id="177" name="PlaceHolder 1"/>
+          <p:cNvSpPr>
+            <a:spLocks noGrp="1"/>
+          </p:cNvSpPr>
+          <p:nvPr>
+            <p:ph type="title"/>
+          </p:nvPr>
+        </p:nvSpPr>
+        <p:spPr>
+          <a:xfrm>
+            <a:off x="609480" y="273600"/>
+            <a:ext cx="10972080" cy="1144800"/>
+          </a:xfrm>
+          <a:prstGeom prst="rect">
+            <a:avLst/>
+          </a:prstGeom>
+        </p:spPr>
+        <p:txBody>
+          <a:bodyPr lIns="0" rIns="0" tIns="0" bIns="0" anchor="ctr"/>
+          <a:p>
+            <a:pPr algn="ctr"/>
+            <a:endParaRPr b="0" lang="en-AU" sz="4400" spc="-1" strike="noStrike">
+              <a:solidFill>
+                <a:srgbClr val="000000"/>
+              </a:solidFill>
+              <a:uFill>
+                <a:solidFill>
+                  <a:srgbClr val="ffffff"/>
+                </a:solidFill>
+              </a:uFill>
+              <a:latin typeface="Arial"/>
+            </a:endParaRPr>
+          </a:p>
+        </p:txBody>
+      </p:sp>
+      <p:sp>
+        <p:nvSpPr>
+          <p:cNvPr id="178" name="PlaceHolder 2"/>
+          <p:cNvSpPr>
+            <a:spLocks noGrp="1"/>
+          </p:cNvSpPr>
+          <p:nvPr>
+            <p:ph type="body"/>
+          </p:nvPr>
+        </p:nvSpPr>
+        <p:spPr>
+          <a:xfrm>
+            <a:off x="609480" y="1604520"/>
+            <a:ext cx="5354280" cy="1896840"/>
+          </a:xfrm>
+          <a:prstGeom prst="rect">
+            <a:avLst/>
+          </a:prstGeom>
+        </p:spPr>
+        <p:txBody>
+          <a:bodyPr lIns="0" rIns="0" tIns="0" bIns="0">
+            <a:normAutofit/>
+          </a:bodyPr>
+          <a:p>
+            <a:endParaRPr b="0" lang="en-AU" sz="3200" spc="-1" strike="noStrike">
+              <a:solidFill>
+                <a:srgbClr val="000000"/>
+              </a:solidFill>
+              <a:uFill>
+                <a:solidFill>
+                  <a:srgbClr val="ffffff"/>
+                </a:solidFill>
+              </a:uFill>
+              <a:latin typeface="Arial"/>
+            </a:endParaRPr>
+          </a:p>
+        </p:txBody>
+      </p:sp>
+      <p:sp>
+        <p:nvSpPr>
+          <p:cNvPr id="179" name="PlaceHolder 3"/>
+          <p:cNvSpPr>
+            <a:spLocks noGrp="1"/>
+          </p:cNvSpPr>
+          <p:nvPr>
+            <p:ph type="body"/>
+          </p:nvPr>
+        </p:nvSpPr>
+        <p:spPr>
+          <a:xfrm>
+            <a:off x="6231960" y="1604520"/>
+            <a:ext cx="5354280" cy="1896840"/>
+          </a:xfrm>
+          <a:prstGeom prst="rect">
+            <a:avLst/>
+          </a:prstGeom>
+        </p:spPr>
+        <p:txBody>
+          <a:bodyPr lIns="0" rIns="0" tIns="0" bIns="0">
+            <a:normAutofit/>
+          </a:bodyPr>
+          <a:p>
+            <a:endParaRPr b="0" lang="en-AU" sz="3200" spc="-1" strike="noStrike">
+              <a:solidFill>
+                <a:srgbClr val="000000"/>
+              </a:solidFill>
+              <a:uFill>
+                <a:solidFill>
+                  <a:srgbClr val="ffffff"/>
+                </a:solidFill>
+              </a:uFill>
+              <a:latin typeface="Arial"/>
+            </a:endParaRPr>
+          </a:p>
+        </p:txBody>
+      </p:sp>
+      <p:sp>
+        <p:nvSpPr>
+          <p:cNvPr id="180" name="PlaceHolder 4"/>
+          <p:cNvSpPr>
+            <a:spLocks noGrp="1"/>
+          </p:cNvSpPr>
+          <p:nvPr>
+            <p:ph type="body"/>
+          </p:nvPr>
+        </p:nvSpPr>
+        <p:spPr>
+          <a:xfrm>
+            <a:off x="609480" y="3682080"/>
+            <a:ext cx="10972440" cy="1896840"/>
+          </a:xfrm>
+          <a:prstGeom prst="rect">
+            <a:avLst/>
+          </a:prstGeom>
+        </p:spPr>
+        <p:txBody>
+          <a:bodyPr lIns="0" rIns="0" tIns="0" bIns="0">
+            <a:normAutofit/>
+          </a:bodyPr>
+          <a:p>
+            <a:endParaRPr b="0" lang="en-AU" sz="3200" spc="-1" strike="noStrike">
+              <a:solidFill>
+                <a:srgbClr val="000000"/>
+              </a:solidFill>
+              <a:uFill>
+                <a:solidFill>
+                  <a:srgbClr val="ffffff"/>
+                </a:solidFill>
+              </a:uFill>
+              <a:latin typeface="Arial"/>
+            </a:endParaRPr>
+          </a:p>
+        </p:txBody>
+      </p:sp>
+    </p:spTree>
+  </p:cSld>
+</p:sldLayout>
+</file>
+
+<file path=ppt/slideLayouts/slideLayout58.xml><?xml version="1.0" encoding="utf-8"?>
+<p:sldLayout xmlns:a="http://schemas.openxmlformats.org/drawingml/2006/main" xmlns:p="http://schemas.openxmlformats.org/presentationml/2006/main" xmlns:r="http://schemas.openxmlformats.org/officeDocument/2006/relationships" xmlns:p14="http://schemas.microsoft.com/office/powerpoint/2010/main" xmlns:p15="http://schemas.microsoft.com/office/powerpoint/2012/main" xmlns:mc="http://schemas.openxmlformats.org/markup-compatibility/2006" type="objOverTx" preserve="1">
+  <p:cSld name="Title, Content over Content">
+    <p:spTree>
+      <p:nvGrpSpPr>
+        <p:cNvPr id="1" name=""/>
+        <p:cNvGrpSpPr/>
+        <p:nvPr/>
+      </p:nvGrpSpPr>
+      <p:grpSpPr>
+        <a:xfrm>
+          <a:off x="0" y="0"/>
+          <a:ext cx="0" cy="0"/>
+          <a:chOff x="0" y="0"/>
+          <a:chExt cx="0" cy="0"/>
+        </a:xfrm>
+      </p:grpSpPr>
+      <p:sp>
+        <p:nvSpPr>
+          <p:cNvPr id="181" name="PlaceHolder 1"/>
+          <p:cNvSpPr>
+            <a:spLocks noGrp="1"/>
+          </p:cNvSpPr>
+          <p:nvPr>
+            <p:ph type="title"/>
+          </p:nvPr>
+        </p:nvSpPr>
+        <p:spPr>
+          <a:xfrm>
+            <a:off x="609480" y="273600"/>
+            <a:ext cx="10972080" cy="1144800"/>
+          </a:xfrm>
+          <a:prstGeom prst="rect">
+            <a:avLst/>
+          </a:prstGeom>
+        </p:spPr>
+        <p:txBody>
+          <a:bodyPr lIns="0" rIns="0" tIns="0" bIns="0" anchor="ctr"/>
+          <a:p>
+            <a:pPr algn="ctr"/>
+            <a:endParaRPr b="0" lang="en-AU" sz="4400" spc="-1" strike="noStrike">
+              <a:solidFill>
+                <a:srgbClr val="000000"/>
+              </a:solidFill>
+              <a:uFill>
+                <a:solidFill>
+                  <a:srgbClr val="ffffff"/>
+                </a:solidFill>
+              </a:uFill>
+              <a:latin typeface="Arial"/>
+            </a:endParaRPr>
+          </a:p>
+        </p:txBody>
+      </p:sp>
+      <p:sp>
+        <p:nvSpPr>
+          <p:cNvPr id="182" name="PlaceHolder 2"/>
+          <p:cNvSpPr>
+            <a:spLocks noGrp="1"/>
+          </p:cNvSpPr>
+          <p:nvPr>
+            <p:ph type="body"/>
+          </p:nvPr>
+        </p:nvSpPr>
+        <p:spPr>
+          <a:xfrm>
+            <a:off x="609480" y="1604520"/>
+            <a:ext cx="10972440" cy="1896840"/>
+          </a:xfrm>
+          <a:prstGeom prst="rect">
+            <a:avLst/>
+          </a:prstGeom>
+        </p:spPr>
+        <p:txBody>
+          <a:bodyPr lIns="0" rIns="0" tIns="0" bIns="0">
+            <a:normAutofit/>
+          </a:bodyPr>
+          <a:p>
+            <a:endParaRPr b="0" lang="en-AU" sz="3200" spc="-1" strike="noStrike">
+              <a:solidFill>
+                <a:srgbClr val="000000"/>
+              </a:solidFill>
+              <a:uFill>
+                <a:solidFill>
+                  <a:srgbClr val="ffffff"/>
+                </a:solidFill>
+              </a:uFill>
+              <a:latin typeface="Arial"/>
+            </a:endParaRPr>
+          </a:p>
+        </p:txBody>
+      </p:sp>
+      <p:sp>
+        <p:nvSpPr>
+          <p:cNvPr id="183" name="PlaceHolder 3"/>
+          <p:cNvSpPr>
+            <a:spLocks noGrp="1"/>
+          </p:cNvSpPr>
+          <p:nvPr>
+            <p:ph type="body"/>
+          </p:nvPr>
+        </p:nvSpPr>
+        <p:spPr>
+          <a:xfrm>
+            <a:off x="609480" y="3682080"/>
+            <a:ext cx="10972440" cy="1896840"/>
+          </a:xfrm>
+          <a:prstGeom prst="rect">
+            <a:avLst/>
+          </a:prstGeom>
+        </p:spPr>
+        <p:txBody>
+          <a:bodyPr lIns="0" rIns="0" tIns="0" bIns="0">
+            <a:normAutofit/>
+          </a:bodyPr>
+          <a:p>
+            <a:endParaRPr b="0" lang="en-AU" sz="3200" spc="-1" strike="noStrike">
+              <a:solidFill>
+                <a:srgbClr val="000000"/>
+              </a:solidFill>
+              <a:uFill>
+                <a:solidFill>
+                  <a:srgbClr val="ffffff"/>
+                </a:solidFill>
+              </a:uFill>
+              <a:latin typeface="Arial"/>
+            </a:endParaRPr>
+          </a:p>
+        </p:txBody>
+      </p:sp>
+    </p:spTree>
+  </p:cSld>
+</p:sldLayout>
+</file>
+
+<file path=ppt/slideLayouts/slideLayout59.xml><?xml version="1.0" encoding="utf-8"?>
+<p:sldLayout xmlns:a="http://schemas.openxmlformats.org/drawingml/2006/main" xmlns:p="http://schemas.openxmlformats.org/presentationml/2006/main" xmlns:r="http://schemas.openxmlformats.org/officeDocument/2006/relationships" xmlns:p14="http://schemas.microsoft.com/office/powerpoint/2010/main" xmlns:p15="http://schemas.microsoft.com/office/powerpoint/2012/main" xmlns:mc="http://schemas.openxmlformats.org/markup-compatibility/2006" type="fourObj" preserve="1">
+  <p:cSld name="Title, 4 Content">
+    <p:spTree>
+      <p:nvGrpSpPr>
+        <p:cNvPr id="1" name=""/>
+        <p:cNvGrpSpPr/>
+        <p:nvPr/>
+      </p:nvGrpSpPr>
+      <p:grpSpPr>
+        <a:xfrm>
+          <a:off x="0" y="0"/>
+          <a:ext cx="0" cy="0"/>
+          <a:chOff x="0" y="0"/>
+          <a:chExt cx="0" cy="0"/>
+        </a:xfrm>
+      </p:grpSpPr>
+      <p:sp>
+        <p:nvSpPr>
+          <p:cNvPr id="184" name="PlaceHolder 1"/>
+          <p:cNvSpPr>
+            <a:spLocks noGrp="1"/>
+          </p:cNvSpPr>
+          <p:nvPr>
+            <p:ph type="title"/>
+          </p:nvPr>
+        </p:nvSpPr>
+        <p:spPr>
+          <a:xfrm>
+            <a:off x="609480" y="273600"/>
+            <a:ext cx="10972080" cy="1144800"/>
+          </a:xfrm>
+          <a:prstGeom prst="rect">
+            <a:avLst/>
+          </a:prstGeom>
+        </p:spPr>
+        <p:txBody>
+          <a:bodyPr lIns="0" rIns="0" tIns="0" bIns="0" anchor="ctr"/>
+          <a:p>
+            <a:pPr algn="ctr"/>
+            <a:endParaRPr b="0" lang="en-AU" sz="4400" spc="-1" strike="noStrike">
+              <a:solidFill>
+                <a:srgbClr val="000000"/>
+              </a:solidFill>
+              <a:uFill>
+                <a:solidFill>
+                  <a:srgbClr val="ffffff"/>
+                </a:solidFill>
+              </a:uFill>
+              <a:latin typeface="Arial"/>
+            </a:endParaRPr>
+          </a:p>
+        </p:txBody>
+      </p:sp>
+      <p:sp>
+        <p:nvSpPr>
+          <p:cNvPr id="185" name="PlaceHolder 2"/>
+          <p:cNvSpPr>
+            <a:spLocks noGrp="1"/>
+          </p:cNvSpPr>
+          <p:nvPr>
+            <p:ph type="body"/>
+          </p:nvPr>
+        </p:nvSpPr>
+        <p:spPr>
+          <a:xfrm>
+            <a:off x="609480" y="1604520"/>
+            <a:ext cx="5354280" cy="1896840"/>
+          </a:xfrm>
+          <a:prstGeom prst="rect">
+            <a:avLst/>
+          </a:prstGeom>
+        </p:spPr>
+        <p:txBody>
+          <a:bodyPr lIns="0" rIns="0" tIns="0" bIns="0">
+            <a:normAutofit/>
+          </a:bodyPr>
+          <a:p>
+            <a:endParaRPr b="0" lang="en-AU" sz="3200" spc="-1" strike="noStrike">
+              <a:solidFill>
+                <a:srgbClr val="000000"/>
+              </a:solidFill>
+              <a:uFill>
+                <a:solidFill>
+                  <a:srgbClr val="ffffff"/>
+                </a:solidFill>
+              </a:uFill>
+              <a:latin typeface="Arial"/>
+            </a:endParaRPr>
+          </a:p>
+        </p:txBody>
+      </p:sp>
+      <p:sp>
+        <p:nvSpPr>
+          <p:cNvPr id="186" name="PlaceHolder 3"/>
+          <p:cNvSpPr>
+            <a:spLocks noGrp="1"/>
+          </p:cNvSpPr>
+          <p:nvPr>
+            <p:ph type="body"/>
+          </p:nvPr>
+        </p:nvSpPr>
+        <p:spPr>
+          <a:xfrm>
+            <a:off x="6231960" y="1604520"/>
+            <a:ext cx="5354280" cy="1896840"/>
+          </a:xfrm>
+          <a:prstGeom prst="rect">
+            <a:avLst/>
+          </a:prstGeom>
+        </p:spPr>
+        <p:txBody>
+          <a:bodyPr lIns="0" rIns="0" tIns="0" bIns="0">
+            <a:normAutofit/>
+          </a:bodyPr>
+          <a:p>
+            <a:endParaRPr b="0" lang="en-AU" sz="3200" spc="-1" strike="noStrike">
+              <a:solidFill>
+                <a:srgbClr val="000000"/>
+              </a:solidFill>
+              <a:uFill>
+                <a:solidFill>
+                  <a:srgbClr val="ffffff"/>
+                </a:solidFill>
+              </a:uFill>
+              <a:latin typeface="Arial"/>
+            </a:endParaRPr>
+          </a:p>
+        </p:txBody>
+      </p:sp>
+      <p:sp>
+        <p:nvSpPr>
+          <p:cNvPr id="187" name="PlaceHolder 4"/>
+          <p:cNvSpPr>
+            <a:spLocks noGrp="1"/>
+          </p:cNvSpPr>
+          <p:nvPr>
+            <p:ph type="body"/>
+          </p:nvPr>
+        </p:nvSpPr>
+        <p:spPr>
+          <a:xfrm>
+            <a:off x="6231960" y="3682080"/>
+            <a:ext cx="5354280" cy="1896840"/>
+          </a:xfrm>
+          <a:prstGeom prst="rect">
+            <a:avLst/>
+          </a:prstGeom>
+        </p:spPr>
+        <p:txBody>
+          <a:bodyPr lIns="0" rIns="0" tIns="0" bIns="0">
+            <a:normAutofit/>
+          </a:bodyPr>
+          <a:p>
+            <a:endParaRPr b="0" lang="en-AU" sz="3200" spc="-1" strike="noStrike">
+              <a:solidFill>
+                <a:srgbClr val="000000"/>
+              </a:solidFill>
+              <a:uFill>
+                <a:solidFill>
+                  <a:srgbClr val="ffffff"/>
+                </a:solidFill>
+              </a:uFill>
+              <a:latin typeface="Arial"/>
+            </a:endParaRPr>
+          </a:p>
+        </p:txBody>
+      </p:sp>
+      <p:sp>
+        <p:nvSpPr>
+          <p:cNvPr id="188" name="PlaceHolder 5"/>
+          <p:cNvSpPr>
+            <a:spLocks noGrp="1"/>
+          </p:cNvSpPr>
+          <p:nvPr>
+            <p:ph type="body"/>
+          </p:nvPr>
+        </p:nvSpPr>
+        <p:spPr>
+          <a:xfrm>
+            <a:off x="609480" y="3682080"/>
+            <a:ext cx="5354280" cy="1896840"/>
+          </a:xfrm>
+          <a:prstGeom prst="rect">
+            <a:avLst/>
+          </a:prstGeom>
+        </p:spPr>
+        <p:txBody>
+          <a:bodyPr lIns="0" rIns="0" tIns="0" bIns="0">
+            <a:normAutofit/>
+          </a:bodyPr>
+          <a:p>
+            <a:endParaRPr b="0" lang="en-AU" sz="3200" spc="-1" strike="noStrike">
               <a:solidFill>
                 <a:srgbClr val="000000"/>
               </a:solidFill>
@@ -5532,7 +6868,7 @@
         <p:spPr>
           <a:xfrm>
             <a:off x="609480" y="273600"/>
-            <a:ext cx="10972440" cy="5307840"/>
+            <a:ext cx="10972080" cy="5307840"/>
           </a:xfrm>
           <a:prstGeom prst="rect">
             <a:avLst/>
@@ -5556,6 +6892,187 @@
           </a:p>
         </p:txBody>
       </p:sp>
+    </p:spTree>
+  </p:cSld>
+</p:sldLayout>
+</file>
+
+<file path=ppt/slideLayouts/slideLayout60.xml><?xml version="1.0" encoding="utf-8"?>
+<p:sldLayout xmlns:a="http://schemas.openxmlformats.org/drawingml/2006/main" xmlns:p="http://schemas.openxmlformats.org/presentationml/2006/main" xmlns:r="http://schemas.openxmlformats.org/officeDocument/2006/relationships" xmlns:p14="http://schemas.microsoft.com/office/powerpoint/2010/main" xmlns:p15="http://schemas.microsoft.com/office/powerpoint/2012/main" xmlns:mc="http://schemas.openxmlformats.org/markup-compatibility/2006" type="blank" preserve="1">
+  <p:cSld name="Title, 6 Content">
+    <p:spTree>
+      <p:nvGrpSpPr>
+        <p:cNvPr id="1" name=""/>
+        <p:cNvGrpSpPr/>
+        <p:nvPr/>
+      </p:nvGrpSpPr>
+      <p:grpSpPr>
+        <a:xfrm>
+          <a:off x="0" y="0"/>
+          <a:ext cx="0" cy="0"/>
+          <a:chOff x="0" y="0"/>
+          <a:chExt cx="0" cy="0"/>
+        </a:xfrm>
+      </p:grpSpPr>
+      <p:sp>
+        <p:nvSpPr>
+          <p:cNvPr id="189" name="PlaceHolder 1"/>
+          <p:cNvSpPr>
+            <a:spLocks noGrp="1"/>
+          </p:cNvSpPr>
+          <p:nvPr>
+            <p:ph type="title"/>
+          </p:nvPr>
+        </p:nvSpPr>
+        <p:spPr>
+          <a:xfrm>
+            <a:off x="609480" y="273600"/>
+            <a:ext cx="10972080" cy="1144800"/>
+          </a:xfrm>
+          <a:prstGeom prst="rect">
+            <a:avLst/>
+          </a:prstGeom>
+        </p:spPr>
+        <p:txBody>
+          <a:bodyPr lIns="0" rIns="0" tIns="0" bIns="0" anchor="ctr"/>
+          <a:p>
+            <a:pPr algn="ctr"/>
+            <a:endParaRPr b="0" lang="en-AU" sz="4400" spc="-1" strike="noStrike">
+              <a:solidFill>
+                <a:srgbClr val="000000"/>
+              </a:solidFill>
+              <a:uFill>
+                <a:solidFill>
+                  <a:srgbClr val="ffffff"/>
+                </a:solidFill>
+              </a:uFill>
+              <a:latin typeface="Arial"/>
+            </a:endParaRPr>
+          </a:p>
+        </p:txBody>
+      </p:sp>
+      <p:sp>
+        <p:nvSpPr>
+          <p:cNvPr id="190" name="PlaceHolder 2"/>
+          <p:cNvSpPr>
+            <a:spLocks noGrp="1"/>
+          </p:cNvSpPr>
+          <p:nvPr>
+            <p:ph type="body"/>
+          </p:nvPr>
+        </p:nvSpPr>
+        <p:spPr>
+          <a:xfrm>
+            <a:off x="609480" y="1604520"/>
+            <a:ext cx="10972440" cy="3977280"/>
+          </a:xfrm>
+          <a:prstGeom prst="rect">
+            <a:avLst/>
+          </a:prstGeom>
+        </p:spPr>
+        <p:txBody>
+          <a:bodyPr lIns="0" rIns="0" tIns="0" bIns="0">
+            <a:normAutofit/>
+          </a:bodyPr>
+          <a:p>
+            <a:endParaRPr b="0" lang="en-AU" sz="3200" spc="-1" strike="noStrike">
+              <a:solidFill>
+                <a:srgbClr val="000000"/>
+              </a:solidFill>
+              <a:uFill>
+                <a:solidFill>
+                  <a:srgbClr val="ffffff"/>
+                </a:solidFill>
+              </a:uFill>
+              <a:latin typeface="Arial"/>
+            </a:endParaRPr>
+          </a:p>
+        </p:txBody>
+      </p:sp>
+      <p:sp>
+        <p:nvSpPr>
+          <p:cNvPr id="191" name="PlaceHolder 3"/>
+          <p:cNvSpPr>
+            <a:spLocks noGrp="1"/>
+          </p:cNvSpPr>
+          <p:nvPr>
+            <p:ph type="body"/>
+          </p:nvPr>
+        </p:nvSpPr>
+        <p:spPr>
+          <a:xfrm>
+            <a:off x="609480" y="1604520"/>
+            <a:ext cx="10972440" cy="3977280"/>
+          </a:xfrm>
+          <a:prstGeom prst="rect">
+            <a:avLst/>
+          </a:prstGeom>
+        </p:spPr>
+        <p:txBody>
+          <a:bodyPr lIns="0" rIns="0" tIns="0" bIns="0">
+            <a:normAutofit/>
+          </a:bodyPr>
+          <a:p>
+            <a:endParaRPr b="0" lang="en-AU" sz="3200" spc="-1" strike="noStrike">
+              <a:solidFill>
+                <a:srgbClr val="000000"/>
+              </a:solidFill>
+              <a:uFill>
+                <a:solidFill>
+                  <a:srgbClr val="ffffff"/>
+                </a:solidFill>
+              </a:uFill>
+              <a:latin typeface="Arial"/>
+            </a:endParaRPr>
+          </a:p>
+        </p:txBody>
+      </p:sp>
+      <p:pic>
+        <p:nvPicPr>
+          <p:cNvPr id="192" name="" descr=""/>
+          <p:cNvPicPr/>
+          <p:nvPr/>
+        </p:nvPicPr>
+        <p:blipFill>
+          <a:blip r:embed=""/>
+          <a:stretch/>
+        </p:blipFill>
+        <p:spPr>
+          <a:xfrm>
+            <a:off x="609480" y="1604520"/>
+            <a:ext cx="10972440" cy="3977280"/>
+          </a:xfrm>
+          <a:prstGeom prst="rect">
+            <a:avLst/>
+          </a:prstGeom>
+          <a:ln>
+            <a:noFill/>
+          </a:ln>
+        </p:spPr>
+      </p:pic>
+      <p:pic>
+        <p:nvPicPr>
+          <p:cNvPr id="193" name="" descr=""/>
+          <p:cNvPicPr/>
+          <p:nvPr/>
+        </p:nvPicPr>
+        <p:blipFill>
+          <a:blip r:embed=""/>
+          <a:stretch/>
+        </p:blipFill>
+        <p:spPr>
+          <a:xfrm>
+            <a:off x="609480" y="1604520"/>
+            <a:ext cx="10972440" cy="3977280"/>
+          </a:xfrm>
+          <a:prstGeom prst="rect">
+            <a:avLst/>
+          </a:prstGeom>
+          <a:ln>
+            <a:noFill/>
+          </a:ln>
+        </p:spPr>
+      </p:pic>
     </p:spTree>
   </p:cSld>
 </p:sldLayout>
@@ -5591,7 +7108,7 @@
         <p:spPr>
           <a:xfrm>
             <a:off x="609480" y="273600"/>
-            <a:ext cx="10972440" cy="1144800"/>
+            <a:ext cx="10972080" cy="1144800"/>
           </a:xfrm>
           <a:prstGeom prst="rect">
             <a:avLst/>
@@ -5764,7 +7281,7 @@
         <p:spPr>
           <a:xfrm>
             <a:off x="609480" y="273600"/>
-            <a:ext cx="10972440" cy="1144800"/>
+            <a:ext cx="10972080" cy="1144800"/>
           </a:xfrm>
           <a:prstGeom prst="rect">
             <a:avLst/>
@@ -5937,7 +7454,7 @@
         <p:spPr>
           <a:xfrm>
             <a:off x="609480" y="273600"/>
-            <a:ext cx="10972440" cy="1144800"/>
+            <a:ext cx="10972080" cy="1144800"/>
           </a:xfrm>
           <a:prstGeom prst="rect">
             <a:avLst/>
@@ -6117,7 +7634,7 @@
         <p:spPr>
           <a:xfrm>
             <a:off x="10353600" y="6224760"/>
-            <a:ext cx="1235880" cy="576720"/>
+            <a:ext cx="1235160" cy="576000"/>
           </a:xfrm>
           <a:prstGeom prst="rect">
             <a:avLst/>
@@ -6136,7 +7653,7 @@
         <p:spPr>
           <a:xfrm>
             <a:off x="0" y="4123800"/>
-            <a:ext cx="12189960" cy="1826640"/>
+            <a:ext cx="12189240" cy="1825920"/>
           </a:xfrm>
           <a:prstGeom prst="rect">
             <a:avLst/>
@@ -6168,7 +7685,7 @@
         <p:spPr>
           <a:xfrm>
             <a:off x="609480" y="273600"/>
-            <a:ext cx="10972080" cy="1144800"/>
+            <a:ext cx="10972440" cy="1144800"/>
           </a:xfrm>
           <a:prstGeom prst="rect">
             <a:avLst/>
@@ -6177,8 +7694,9 @@
         <p:txBody>
           <a:bodyPr lIns="0" rIns="0" tIns="0" bIns="0" anchor="ctr"/>
           <a:p>
+            <a:pPr algn="ctr"/>
             <a:r>
-              <a:rPr b="0" lang="en-AU" sz="1800" spc="-1" strike="noStrike">
+              <a:rPr b="0" lang="en-AU" sz="4400" spc="-1" strike="noStrike">
                 <a:solidFill>
                   <a:srgbClr val="000000"/>
                 </a:solidFill>
@@ -6191,7 +7709,7 @@
               </a:rPr>
               <a:t>Click to edit the title text format</a:t>
             </a:r>
-            <a:endParaRPr b="0" lang="en-AU" sz="1800" spc="-1" strike="noStrike">
+            <a:endParaRPr b="0" lang="en-AU" sz="4400" spc="-1" strike="noStrike">
               <a:solidFill>
                 <a:srgbClr val="000000"/>
               </a:solidFill>
@@ -6553,7 +8071,7 @@
         <p:spPr>
           <a:xfrm>
             <a:off x="10353600" y="6224760"/>
-            <a:ext cx="1235880" cy="576720"/>
+            <a:ext cx="1235160" cy="576000"/>
           </a:xfrm>
           <a:prstGeom prst="rect">
             <a:avLst/>
@@ -6572,7 +8090,7 @@
         <p:spPr>
           <a:xfrm>
             <a:off x="991080" y="1184760"/>
-            <a:ext cx="11198880" cy="56520"/>
+            <a:ext cx="11198160" cy="55800"/>
           </a:xfrm>
           <a:prstGeom prst="rect">
             <a:avLst/>
@@ -6600,7 +8118,7 @@
         <p:spPr>
           <a:xfrm>
             <a:off x="0" y="1184760"/>
-            <a:ext cx="1705320" cy="56520"/>
+            <a:ext cx="1704600" cy="55800"/>
           </a:xfrm>
           <a:prstGeom prst="rect">
             <a:avLst/>
@@ -7018,7 +8536,7 @@
         <p:spPr>
           <a:xfrm>
             <a:off x="10353600" y="6224760"/>
-            <a:ext cx="1235880" cy="576720"/>
+            <a:ext cx="1235160" cy="576000"/>
           </a:xfrm>
           <a:prstGeom prst="rect">
             <a:avLst/>
@@ -7037,7 +8555,7 @@
         <p:spPr>
           <a:xfrm>
             <a:off x="991080" y="1184760"/>
-            <a:ext cx="11198880" cy="56520"/>
+            <a:ext cx="11198160" cy="55800"/>
           </a:xfrm>
           <a:prstGeom prst="rect">
             <a:avLst/>
@@ -7065,7 +8583,7 @@
         <p:spPr>
           <a:xfrm>
             <a:off x="0" y="1184760"/>
-            <a:ext cx="1705320" cy="56520"/>
+            <a:ext cx="1704600" cy="55800"/>
           </a:xfrm>
           <a:prstGeom prst="rect">
             <a:avLst/>
@@ -7483,7 +9001,7 @@
         <p:spPr>
           <a:xfrm>
             <a:off x="10353600" y="6224760"/>
-            <a:ext cx="1235880" cy="576720"/>
+            <a:ext cx="1235160" cy="576000"/>
           </a:xfrm>
           <a:prstGeom prst="rect">
             <a:avLst/>
@@ -7502,7 +9020,7 @@
         <p:spPr>
           <a:xfrm>
             <a:off x="991080" y="1184760"/>
-            <a:ext cx="11198880" cy="56520"/>
+            <a:ext cx="11198160" cy="55800"/>
           </a:xfrm>
           <a:prstGeom prst="rect">
             <a:avLst/>
@@ -7530,7 +9048,7 @@
         <p:spPr>
           <a:xfrm>
             <a:off x="0" y="1184760"/>
-            <a:ext cx="1705320" cy="56520"/>
+            <a:ext cx="1704600" cy="55800"/>
           </a:xfrm>
           <a:prstGeom prst="rect">
             <a:avLst/>
@@ -7907,6 +9425,470 @@
     <p:sldLayoutId id="2147483697" r:id="rId12"/>
     <p:sldLayoutId id="2147483698" r:id="rId13"/>
     <p:sldLayoutId id="2147483699" r:id="rId14"/>
+  </p:sldLayoutIdLst>
+</p:sldMaster>
+</file>
+
+<file path=ppt/slideMasters/slideMaster5.xml><?xml version="1.0" encoding="utf-8"?>
+<p:sldMaster xmlns:a="http://schemas.openxmlformats.org/drawingml/2006/main" xmlns:p="http://schemas.openxmlformats.org/presentationml/2006/main" xmlns:r="http://schemas.openxmlformats.org/officeDocument/2006/relationships" xmlns:p14="http://schemas.microsoft.com/office/powerpoint/2010/main" xmlns:p15="http://schemas.microsoft.com/office/powerpoint/2012/main" xmlns:mc="http://schemas.openxmlformats.org/markup-compatibility/2006">
+  <p:cSld>
+    <p:bg>
+      <p:bgPr>
+        <a:solidFill>
+          <a:srgbClr val="ffffff"/>
+        </a:solidFill>
+      </p:bgPr>
+    </p:bg>
+    <p:spTree>
+      <p:nvGrpSpPr>
+        <p:cNvPr id="1" name=""/>
+        <p:cNvGrpSpPr/>
+        <p:nvPr/>
+      </p:nvGrpSpPr>
+      <p:grpSpPr>
+        <a:xfrm>
+          <a:off x="0" y="0"/>
+          <a:ext cx="0" cy="0"/>
+          <a:chOff x="0" y="0"/>
+          <a:chExt cx="0" cy="0"/>
+        </a:xfrm>
+      </p:grpSpPr>
+      <p:pic>
+        <p:nvPicPr>
+          <p:cNvPr id="155" name="Picture 7" descr=""/>
+          <p:cNvPicPr/>
+          <p:nvPr/>
+        </p:nvPicPr>
+        <p:blipFill>
+          <a:blip r:embed="rId2"/>
+          <a:stretch/>
+        </p:blipFill>
+        <p:spPr>
+          <a:xfrm>
+            <a:off x="10353600" y="6224760"/>
+            <a:ext cx="1235160" cy="576000"/>
+          </a:xfrm>
+          <a:prstGeom prst="rect">
+            <a:avLst/>
+          </a:prstGeom>
+          <a:ln>
+            <a:noFill/>
+          </a:ln>
+        </p:spPr>
+      </p:pic>
+      <p:sp>
+        <p:nvSpPr>
+          <p:cNvPr id="156" name="CustomShape 1"/>
+          <p:cNvSpPr/>
+          <p:nvPr/>
+        </p:nvSpPr>
+        <p:spPr>
+          <a:xfrm>
+            <a:off x="991080" y="1184760"/>
+            <a:ext cx="11198160" cy="55800"/>
+          </a:xfrm>
+          <a:prstGeom prst="rect">
+            <a:avLst/>
+          </a:prstGeom>
+          <a:solidFill>
+            <a:srgbClr val="e4002b"/>
+          </a:solidFill>
+          <a:ln>
+            <a:noFill/>
+          </a:ln>
+        </p:spPr>
+        <p:style>
+          <a:lnRef idx="0"/>
+          <a:fillRef idx="0"/>
+          <a:effectRef idx="0"/>
+          <a:fontRef idx="minor"/>
+        </p:style>
+      </p:sp>
+      <p:sp>
+        <p:nvSpPr>
+          <p:cNvPr id="157" name="CustomShape 2"/>
+          <p:cNvSpPr/>
+          <p:nvPr/>
+        </p:nvSpPr>
+        <p:spPr>
+          <a:xfrm>
+            <a:off x="0" y="1184760"/>
+            <a:ext cx="1704600" cy="55800"/>
+          </a:xfrm>
+          <a:prstGeom prst="rect">
+            <a:avLst/>
+          </a:prstGeom>
+          <a:solidFill>
+            <a:srgbClr val="333f48"/>
+          </a:solidFill>
+          <a:ln>
+            <a:noFill/>
+          </a:ln>
+        </p:spPr>
+        <p:style>
+          <a:lnRef idx="0"/>
+          <a:fillRef idx="0"/>
+          <a:effectRef idx="0"/>
+          <a:fontRef idx="minor"/>
+        </p:style>
+      </p:sp>
+      <p:sp>
+        <p:nvSpPr>
+          <p:cNvPr id="158" name="PlaceHolder 3"/>
+          <p:cNvSpPr>
+            <a:spLocks noGrp="1"/>
+          </p:cNvSpPr>
+          <p:nvPr>
+            <p:ph type="title"/>
+          </p:nvPr>
+        </p:nvSpPr>
+        <p:spPr>
+          <a:xfrm>
+            <a:off x="609480" y="273600"/>
+            <a:ext cx="10972080" cy="1144800"/>
+          </a:xfrm>
+          <a:prstGeom prst="rect">
+            <a:avLst/>
+          </a:prstGeom>
+        </p:spPr>
+        <p:txBody>
+          <a:bodyPr lIns="0" rIns="0" tIns="0" bIns="0" anchor="ctr"/>
+          <a:p>
+            <a:r>
+              <a:rPr b="0" lang="en-AU" sz="1800" spc="-1" strike="noStrike">
+                <a:solidFill>
+                  <a:srgbClr val="000000"/>
+                </a:solidFill>
+                <a:uFill>
+                  <a:solidFill>
+                    <a:srgbClr val="ffffff"/>
+                  </a:solidFill>
+                </a:uFill>
+                <a:latin typeface="Arial"/>
+              </a:rPr>
+              <a:t>Click to edit the title text format</a:t>
+            </a:r>
+            <a:endParaRPr b="0" lang="en-AU" sz="1800" spc="-1" strike="noStrike">
+              <a:solidFill>
+                <a:srgbClr val="000000"/>
+              </a:solidFill>
+              <a:uFill>
+                <a:solidFill>
+                  <a:srgbClr val="ffffff"/>
+                </a:solidFill>
+              </a:uFill>
+              <a:latin typeface="Arial"/>
+            </a:endParaRPr>
+          </a:p>
+        </p:txBody>
+      </p:sp>
+      <p:sp>
+        <p:nvSpPr>
+          <p:cNvPr id="159" name="PlaceHolder 4"/>
+          <p:cNvSpPr>
+            <a:spLocks noGrp="1"/>
+          </p:cNvSpPr>
+          <p:nvPr>
+            <p:ph type="body"/>
+          </p:nvPr>
+        </p:nvSpPr>
+        <p:spPr>
+          <a:xfrm>
+            <a:off x="609480" y="1604520"/>
+            <a:ext cx="10972440" cy="3977280"/>
+          </a:xfrm>
+          <a:prstGeom prst="rect">
+            <a:avLst/>
+          </a:prstGeom>
+        </p:spPr>
+        <p:txBody>
+          <a:bodyPr lIns="0" rIns="0" tIns="0" bIns="0">
+            <a:normAutofit/>
+          </a:bodyPr>
+          <a:p>
+            <a:pPr marL="432000" indent="-324000">
+              <a:spcBef>
+                <a:spcPts val="1417"/>
+              </a:spcBef>
+              <a:buClr>
+                <a:srgbClr val="000000"/>
+              </a:buClr>
+              <a:buSzPct val="45000"/>
+              <a:buFont typeface="Wingdings" charset="2"/>
+              <a:buChar char=""/>
+            </a:pPr>
+            <a:r>
+              <a:rPr b="0" lang="en-AU" sz="3200" spc="-1" strike="noStrike">
+                <a:solidFill>
+                  <a:srgbClr val="000000"/>
+                </a:solidFill>
+                <a:uFill>
+                  <a:solidFill>
+                    <a:srgbClr val="ffffff"/>
+                  </a:solidFill>
+                </a:uFill>
+                <a:latin typeface="Arial"/>
+              </a:rPr>
+              <a:t>Click to edit the outline text format</a:t>
+            </a:r>
+            <a:endParaRPr b="0" lang="en-AU" sz="3200" spc="-1" strike="noStrike">
+              <a:solidFill>
+                <a:srgbClr val="000000"/>
+              </a:solidFill>
+              <a:uFill>
+                <a:solidFill>
+                  <a:srgbClr val="ffffff"/>
+                </a:solidFill>
+              </a:uFill>
+              <a:latin typeface="Arial"/>
+            </a:endParaRPr>
+          </a:p>
+          <a:p>
+            <a:pPr lvl="1" marL="864000" indent="-324000">
+              <a:spcBef>
+                <a:spcPts val="1134"/>
+              </a:spcBef>
+              <a:buClr>
+                <a:srgbClr val="000000"/>
+              </a:buClr>
+              <a:buSzPct val="75000"/>
+              <a:buFont typeface="Symbol" charset="2"/>
+              <a:buChar char=""/>
+            </a:pPr>
+            <a:r>
+              <a:rPr b="0" lang="en-AU" sz="2800" spc="-1" strike="noStrike">
+                <a:solidFill>
+                  <a:srgbClr val="000000"/>
+                </a:solidFill>
+                <a:uFill>
+                  <a:solidFill>
+                    <a:srgbClr val="ffffff"/>
+                  </a:solidFill>
+                </a:uFill>
+                <a:latin typeface="Arial"/>
+              </a:rPr>
+              <a:t>Second Outline Level</a:t>
+            </a:r>
+            <a:endParaRPr b="0" lang="en-AU" sz="2800" spc="-1" strike="noStrike">
+              <a:solidFill>
+                <a:srgbClr val="000000"/>
+              </a:solidFill>
+              <a:uFill>
+                <a:solidFill>
+                  <a:srgbClr val="ffffff"/>
+                </a:solidFill>
+              </a:uFill>
+              <a:latin typeface="Arial"/>
+            </a:endParaRPr>
+          </a:p>
+          <a:p>
+            <a:pPr lvl="2" marL="1296000" indent="-288000">
+              <a:spcBef>
+                <a:spcPts val="850"/>
+              </a:spcBef>
+              <a:buClr>
+                <a:srgbClr val="000000"/>
+              </a:buClr>
+              <a:buSzPct val="45000"/>
+              <a:buFont typeface="Wingdings" charset="2"/>
+              <a:buChar char=""/>
+            </a:pPr>
+            <a:r>
+              <a:rPr b="0" lang="en-AU" sz="2400" spc="-1" strike="noStrike">
+                <a:solidFill>
+                  <a:srgbClr val="000000"/>
+                </a:solidFill>
+                <a:uFill>
+                  <a:solidFill>
+                    <a:srgbClr val="ffffff"/>
+                  </a:solidFill>
+                </a:uFill>
+                <a:latin typeface="Arial"/>
+              </a:rPr>
+              <a:t>Third Outline Level</a:t>
+            </a:r>
+            <a:endParaRPr b="0" lang="en-AU" sz="2400" spc="-1" strike="noStrike">
+              <a:solidFill>
+                <a:srgbClr val="000000"/>
+              </a:solidFill>
+              <a:uFill>
+                <a:solidFill>
+                  <a:srgbClr val="ffffff"/>
+                </a:solidFill>
+              </a:uFill>
+              <a:latin typeface="Arial"/>
+            </a:endParaRPr>
+          </a:p>
+          <a:p>
+            <a:pPr lvl="3" marL="1728000" indent="-216000">
+              <a:spcBef>
+                <a:spcPts val="567"/>
+              </a:spcBef>
+              <a:buClr>
+                <a:srgbClr val="000000"/>
+              </a:buClr>
+              <a:buSzPct val="75000"/>
+              <a:buFont typeface="Symbol" charset="2"/>
+              <a:buChar char=""/>
+            </a:pPr>
+            <a:r>
+              <a:rPr b="0" lang="en-AU" sz="2000" spc="-1" strike="noStrike">
+                <a:solidFill>
+                  <a:srgbClr val="000000"/>
+                </a:solidFill>
+                <a:uFill>
+                  <a:solidFill>
+                    <a:srgbClr val="ffffff"/>
+                  </a:solidFill>
+                </a:uFill>
+                <a:latin typeface="Arial"/>
+              </a:rPr>
+              <a:t>Fourth Outline Level</a:t>
+            </a:r>
+            <a:endParaRPr b="0" lang="en-AU" sz="2000" spc="-1" strike="noStrike">
+              <a:solidFill>
+                <a:srgbClr val="000000"/>
+              </a:solidFill>
+              <a:uFill>
+                <a:solidFill>
+                  <a:srgbClr val="ffffff"/>
+                </a:solidFill>
+              </a:uFill>
+              <a:latin typeface="Arial"/>
+            </a:endParaRPr>
+          </a:p>
+          <a:p>
+            <a:pPr lvl="4" marL="2160000" indent="-216000">
+              <a:spcBef>
+                <a:spcPts val="283"/>
+              </a:spcBef>
+              <a:buClr>
+                <a:srgbClr val="000000"/>
+              </a:buClr>
+              <a:buSzPct val="45000"/>
+              <a:buFont typeface="Wingdings" charset="2"/>
+              <a:buChar char=""/>
+            </a:pPr>
+            <a:r>
+              <a:rPr b="0" lang="en-AU" sz="2000" spc="-1" strike="noStrike">
+                <a:solidFill>
+                  <a:srgbClr val="000000"/>
+                </a:solidFill>
+                <a:uFill>
+                  <a:solidFill>
+                    <a:srgbClr val="ffffff"/>
+                  </a:solidFill>
+                </a:uFill>
+                <a:latin typeface="Arial"/>
+              </a:rPr>
+              <a:t>Fifth Outline Level</a:t>
+            </a:r>
+            <a:endParaRPr b="0" lang="en-AU" sz="2000" spc="-1" strike="noStrike">
+              <a:solidFill>
+                <a:srgbClr val="000000"/>
+              </a:solidFill>
+              <a:uFill>
+                <a:solidFill>
+                  <a:srgbClr val="ffffff"/>
+                </a:solidFill>
+              </a:uFill>
+              <a:latin typeface="Arial"/>
+            </a:endParaRPr>
+          </a:p>
+          <a:p>
+            <a:pPr lvl="5" marL="2592000" indent="-216000">
+              <a:spcBef>
+                <a:spcPts val="283"/>
+              </a:spcBef>
+              <a:buClr>
+                <a:srgbClr val="000000"/>
+              </a:buClr>
+              <a:buSzPct val="45000"/>
+              <a:buFont typeface="Wingdings" charset="2"/>
+              <a:buChar char=""/>
+            </a:pPr>
+            <a:r>
+              <a:rPr b="0" lang="en-AU" sz="2000" spc="-1" strike="noStrike">
+                <a:solidFill>
+                  <a:srgbClr val="000000"/>
+                </a:solidFill>
+                <a:uFill>
+                  <a:solidFill>
+                    <a:srgbClr val="ffffff"/>
+                  </a:solidFill>
+                </a:uFill>
+                <a:latin typeface="Arial"/>
+              </a:rPr>
+              <a:t>Sixth Outline Level</a:t>
+            </a:r>
+            <a:endParaRPr b="0" lang="en-AU" sz="2000" spc="-1" strike="noStrike">
+              <a:solidFill>
+                <a:srgbClr val="000000"/>
+              </a:solidFill>
+              <a:uFill>
+                <a:solidFill>
+                  <a:srgbClr val="ffffff"/>
+                </a:solidFill>
+              </a:uFill>
+              <a:latin typeface="Arial"/>
+            </a:endParaRPr>
+          </a:p>
+          <a:p>
+            <a:pPr lvl="6" marL="3024000" indent="-216000">
+              <a:spcBef>
+                <a:spcPts val="283"/>
+              </a:spcBef>
+              <a:buClr>
+                <a:srgbClr val="000000"/>
+              </a:buClr>
+              <a:buSzPct val="45000"/>
+              <a:buFont typeface="Wingdings" charset="2"/>
+              <a:buChar char=""/>
+            </a:pPr>
+            <a:r>
+              <a:rPr b="0" lang="en-AU" sz="2000" spc="-1" strike="noStrike">
+                <a:solidFill>
+                  <a:srgbClr val="000000"/>
+                </a:solidFill>
+                <a:uFill>
+                  <a:solidFill>
+                    <a:srgbClr val="ffffff"/>
+                  </a:solidFill>
+                </a:uFill>
+                <a:latin typeface="Arial"/>
+              </a:rPr>
+              <a:t>Seventh Outline Level</a:t>
+            </a:r>
+            <a:endParaRPr b="0" lang="en-AU" sz="2000" spc="-1" strike="noStrike">
+              <a:solidFill>
+                <a:srgbClr val="000000"/>
+              </a:solidFill>
+              <a:uFill>
+                <a:solidFill>
+                  <a:srgbClr val="ffffff"/>
+                </a:solidFill>
+              </a:uFill>
+              <a:latin typeface="Arial"/>
+            </a:endParaRPr>
+          </a:p>
+        </p:txBody>
+      </p:sp>
+    </p:spTree>
+  </p:cSld>
+  <p:clrMap bg1="lt1" bg2="lt2" tx1="dk1" tx2="dk2" accent1="accent1" accent2="accent2" accent3="accent3" accent4="accent4" accent5="accent5" accent6="accent6" hlink="hlink" folHlink="folHlink"/>
+  <p:sldLayoutIdLst>
+    <p:sldLayoutId id="2147483701" r:id="rId3"/>
+    <p:sldLayoutId id="2147483702" r:id="rId4"/>
+    <p:sldLayoutId id="2147483703" r:id="rId5"/>
+    <p:sldLayoutId id="2147483704" r:id="rId6"/>
+    <p:sldLayoutId id="2147483705" r:id="rId7"/>
+    <p:sldLayoutId id="2147483706" r:id="rId8"/>
+    <p:sldLayoutId id="2147483707" r:id="rId9"/>
+    <p:sldLayoutId id="2147483708" r:id="rId10"/>
+    <p:sldLayoutId id="2147483709" r:id="rId11"/>
+    <p:sldLayoutId id="2147483710" r:id="rId12"/>
+    <p:sldLayoutId id="2147483711" r:id="rId13"/>
+    <p:sldLayoutId id="2147483712" r:id="rId14"/>
   </p:sldLayoutIdLst>
 </p:sldMaster>
 </file>
@@ -7930,14 +9912,14 @@
       </p:grpSpPr>
       <p:sp>
         <p:nvSpPr>
-          <p:cNvPr id="155" name="CustomShape 1"/>
+          <p:cNvPr id="194" name="CustomShape 1"/>
           <p:cNvSpPr/>
           <p:nvPr/>
         </p:nvSpPr>
         <p:spPr>
           <a:xfrm>
             <a:off x="504000" y="936000"/>
-            <a:ext cx="10726560" cy="1509480"/>
+            <a:ext cx="10725840" cy="1508760"/>
           </a:xfrm>
           <a:prstGeom prst="rect">
             <a:avLst/>
@@ -7987,14 +9969,14 @@
       </p:sp>
       <p:sp>
         <p:nvSpPr>
-          <p:cNvPr id="156" name="CustomShape 2"/>
+          <p:cNvPr id="195" name="CustomShape 2"/>
           <p:cNvSpPr/>
           <p:nvPr/>
         </p:nvSpPr>
         <p:spPr>
           <a:xfrm>
             <a:off x="576000" y="2076480"/>
-            <a:ext cx="9657000" cy="514080"/>
+            <a:ext cx="9656280" cy="513360"/>
           </a:xfrm>
           <a:prstGeom prst="rect">
             <a:avLst/>
@@ -8044,14 +10026,14 @@
       </p:sp>
       <p:sp>
         <p:nvSpPr>
-          <p:cNvPr id="157" name="CustomShape 3"/>
+          <p:cNvPr id="196" name="CustomShape 3"/>
           <p:cNvSpPr/>
           <p:nvPr/>
         </p:nvSpPr>
         <p:spPr>
           <a:xfrm>
             <a:off x="720000" y="4394160"/>
-            <a:ext cx="11518560" cy="1364400"/>
+            <a:ext cx="11517840" cy="1363680"/>
           </a:xfrm>
           <a:prstGeom prst="rect">
             <a:avLst/>
@@ -8236,6 +10218,272 @@
 </p:sld>
 </file>
 
+<file path=ppt/slides/slide11.xml><?xml version="1.0" encoding="utf-8"?>
+<p:sld xmlns:a="http://schemas.openxmlformats.org/drawingml/2006/main" xmlns:p="http://schemas.openxmlformats.org/presentationml/2006/main" xmlns:r="http://schemas.openxmlformats.org/officeDocument/2006/relationships" xmlns:p14="http://schemas.microsoft.com/office/powerpoint/2010/main" xmlns:p15="http://schemas.microsoft.com/office/powerpoint/2012/main" xmlns:mc="http://schemas.openxmlformats.org/markup-compatibility/2006">
+  <p:cSld>
+    <p:spTree>
+      <p:nvGrpSpPr>
+        <p:cNvPr id="1" name=""/>
+        <p:cNvGrpSpPr/>
+        <p:nvPr/>
+      </p:nvGrpSpPr>
+      <p:grpSpPr>
+        <a:xfrm>
+          <a:off x="0" y="0"/>
+          <a:ext cx="0" cy="0"/>
+          <a:chOff x="0" y="0"/>
+          <a:chExt cx="0" cy="0"/>
+        </a:xfrm>
+      </p:grpSpPr>
+      <p:pic>
+        <p:nvPicPr>
+          <p:cNvPr id="227" name="" descr=""/>
+          <p:cNvPicPr/>
+          <p:nvPr/>
+        </p:nvPicPr>
+        <p:blipFill>
+          <a:blip r:embed="rId1"/>
+          <a:stretch/>
+        </p:blipFill>
+        <p:spPr>
+          <a:xfrm>
+            <a:off x="457920" y="1548000"/>
+            <a:ext cx="11350440" cy="3814560"/>
+          </a:xfrm>
+          <a:prstGeom prst="rect">
+            <a:avLst/>
+          </a:prstGeom>
+          <a:ln>
+            <a:noFill/>
+          </a:ln>
+        </p:spPr>
+      </p:pic>
+      <p:sp>
+        <p:nvSpPr>
+          <p:cNvPr id="228" name="CustomShape 1"/>
+          <p:cNvSpPr/>
+          <p:nvPr/>
+        </p:nvSpPr>
+        <p:spPr>
+          <a:xfrm>
+            <a:off x="609480" y="273600"/>
+            <a:ext cx="10972080" cy="1144440"/>
+          </a:xfrm>
+          <a:prstGeom prst="rect">
+            <a:avLst/>
+          </a:prstGeom>
+          <a:noFill/>
+          <a:ln>
+            <a:noFill/>
+          </a:ln>
+        </p:spPr>
+        <p:style>
+          <a:lnRef idx="0"/>
+          <a:fillRef idx="0"/>
+          <a:effectRef idx="0"/>
+          <a:fontRef idx="minor"/>
+        </p:style>
+        <p:txBody>
+          <a:bodyPr wrap="none" lIns="0" rIns="0" tIns="0" bIns="0" anchor="ctr"/>
+          <a:p>
+            <a:pPr algn="ctr">
+              <a:lnSpc>
+                <a:spcPct val="100000"/>
+              </a:lnSpc>
+            </a:pPr>
+            <a:r>
+              <a:rPr b="0" lang="en-AU" sz="1800" spc="-1" strike="noStrike">
+                <a:solidFill>
+                  <a:srgbClr val="000000"/>
+                </a:solidFill>
+                <a:uFill>
+                  <a:solidFill>
+                    <a:srgbClr val="ffffff"/>
+                  </a:solidFill>
+                </a:uFill>
+                <a:latin typeface="Arial"/>
+              </a:rPr>
+              <a:t>Haskell Web Application Interface</a:t>
+            </a:r>
+            <a:endParaRPr b="0" lang="en-AU" sz="1800" spc="-1" strike="noStrike">
+              <a:solidFill>
+                <a:srgbClr val="000000"/>
+              </a:solidFill>
+              <a:uFill>
+                <a:solidFill>
+                  <a:srgbClr val="ffffff"/>
+                </a:solidFill>
+              </a:uFill>
+              <a:latin typeface="Arial"/>
+            </a:endParaRPr>
+          </a:p>
+        </p:txBody>
+      </p:sp>
+    </p:spTree>
+  </p:cSld>
+  <p:timing>
+    <p:tnLst>
+      <p:par>
+        <p:cTn id="35" dur="indefinite" restart="never" nodeType="tmRoot">
+          <p:childTnLst>
+            <p:seq>
+              <p:cTn id="36" nodeType="mainSeq"/>
+              <p:prevCondLst>
+                <p:cond delay="0" evt="onPrev">
+                  <p:tgtEl>
+                    <p:sldTgt/>
+                  </p:tgtEl>
+                </p:cond>
+              </p:prevCondLst>
+              <p:nextCondLst>
+                <p:cond delay="0" evt="onNext">
+                  <p:tgtEl>
+                    <p:sldTgt/>
+                  </p:tgtEl>
+                </p:cond>
+              </p:nextCondLst>
+            </p:seq>
+          </p:childTnLst>
+        </p:cTn>
+      </p:par>
+    </p:tnLst>
+  </p:timing>
+</p:sld>
+</file>
+
+<file path=ppt/slides/slide12.xml><?xml version="1.0" encoding="utf-8"?>
+<p:sld xmlns:a="http://schemas.openxmlformats.org/drawingml/2006/main" xmlns:p="http://schemas.openxmlformats.org/presentationml/2006/main" xmlns:r="http://schemas.openxmlformats.org/officeDocument/2006/relationships" xmlns:p14="http://schemas.microsoft.com/office/powerpoint/2010/main" xmlns:p15="http://schemas.microsoft.com/office/powerpoint/2012/main" xmlns:mc="http://schemas.openxmlformats.org/markup-compatibility/2006">
+  <p:cSld>
+    <p:spTree>
+      <p:nvGrpSpPr>
+        <p:cNvPr id="1" name=""/>
+        <p:cNvGrpSpPr/>
+        <p:nvPr/>
+      </p:nvGrpSpPr>
+      <p:grpSpPr>
+        <a:xfrm>
+          <a:off x="0" y="0"/>
+          <a:ext cx="0" cy="0"/>
+          <a:chOff x="0" y="0"/>
+          <a:chExt cx="0" cy="0"/>
+        </a:xfrm>
+      </p:grpSpPr>
+      <p:sp>
+        <p:nvSpPr>
+          <p:cNvPr id="229" name="CustomShape 1"/>
+          <p:cNvSpPr/>
+          <p:nvPr/>
+        </p:nvSpPr>
+        <p:spPr>
+          <a:xfrm>
+            <a:off x="609480" y="273600"/>
+            <a:ext cx="10972080" cy="1144440"/>
+          </a:xfrm>
+          <a:prstGeom prst="rect">
+            <a:avLst/>
+          </a:prstGeom>
+          <a:noFill/>
+          <a:ln>
+            <a:noFill/>
+          </a:ln>
+        </p:spPr>
+        <p:style>
+          <a:lnRef idx="0"/>
+          <a:fillRef idx="0"/>
+          <a:effectRef idx="0"/>
+          <a:fontRef idx="minor"/>
+        </p:style>
+        <p:txBody>
+          <a:bodyPr wrap="none" lIns="0" rIns="0" tIns="0" bIns="0" anchor="ctr"/>
+          <a:p>
+            <a:pPr algn="ctr">
+              <a:lnSpc>
+                <a:spcPct val="100000"/>
+              </a:lnSpc>
+            </a:pPr>
+            <a:r>
+              <a:rPr b="0" lang="en-AU" sz="1800" spc="-1" strike="noStrike">
+                <a:solidFill>
+                  <a:srgbClr val="000000"/>
+                </a:solidFill>
+                <a:uFill>
+                  <a:solidFill>
+                    <a:srgbClr val="ffffff"/>
+                  </a:solidFill>
+                </a:uFill>
+                <a:latin typeface="Arial"/>
+              </a:rPr>
+              <a:t>http4idris HttpEngine</a:t>
+            </a:r>
+            <a:endParaRPr b="0" lang="en-AU" sz="1800" spc="-1" strike="noStrike">
+              <a:solidFill>
+                <a:srgbClr val="000000"/>
+              </a:solidFill>
+              <a:uFill>
+                <a:solidFill>
+                  <a:srgbClr val="ffffff"/>
+                </a:solidFill>
+              </a:uFill>
+              <a:latin typeface="Arial"/>
+            </a:endParaRPr>
+          </a:p>
+        </p:txBody>
+      </p:sp>
+      <p:pic>
+        <p:nvPicPr>
+          <p:cNvPr id="230" name="" descr=""/>
+          <p:cNvPicPr/>
+          <p:nvPr/>
+        </p:nvPicPr>
+        <p:blipFill>
+          <a:blip r:embed="rId1"/>
+          <a:stretch/>
+        </p:blipFill>
+        <p:spPr>
+          <a:xfrm>
+            <a:off x="711000" y="1418400"/>
+            <a:ext cx="9721440" cy="5065200"/>
+          </a:xfrm>
+          <a:prstGeom prst="rect">
+            <a:avLst/>
+          </a:prstGeom>
+          <a:ln>
+            <a:noFill/>
+          </a:ln>
+        </p:spPr>
+      </p:pic>
+    </p:spTree>
+  </p:cSld>
+  <p:timing>
+    <p:tnLst>
+      <p:par>
+        <p:cTn id="37" dur="indefinite" restart="never" nodeType="tmRoot">
+          <p:childTnLst>
+            <p:seq>
+              <p:cTn id="38" nodeType="mainSeq"/>
+              <p:prevCondLst>
+                <p:cond delay="0" evt="onPrev">
+                  <p:tgtEl>
+                    <p:sldTgt/>
+                  </p:tgtEl>
+                </p:cond>
+              </p:prevCondLst>
+              <p:nextCondLst>
+                <p:cond delay="0" evt="onNext">
+                  <p:tgtEl>
+                    <p:sldTgt/>
+                  </p:tgtEl>
+                </p:cond>
+              </p:nextCondLst>
+            </p:seq>
+          </p:childTnLst>
+        </p:cTn>
+      </p:par>
+    </p:tnLst>
+  </p:timing>
+</p:sld>
+</file>
+
 <file path=ppt/slides/slide2.xml><?xml version="1.0" encoding="utf-8"?>
 <p:sld xmlns:a="http://schemas.openxmlformats.org/drawingml/2006/main" xmlns:p="http://schemas.openxmlformats.org/presentationml/2006/main" xmlns:r="http://schemas.openxmlformats.org/officeDocument/2006/relationships" xmlns:p14="http://schemas.microsoft.com/office/powerpoint/2010/main" xmlns:p15="http://schemas.microsoft.com/office/powerpoint/2012/main" xmlns:mc="http://schemas.openxmlformats.org/markup-compatibility/2006">
   <p:cSld>
@@ -8255,14 +10503,14 @@
       </p:grpSpPr>
       <p:sp>
         <p:nvSpPr>
-          <p:cNvPr id="158" name="CustomShape 1"/>
+          <p:cNvPr id="197" name="CustomShape 1"/>
           <p:cNvSpPr/>
           <p:nvPr/>
         </p:nvSpPr>
         <p:spPr>
           <a:xfrm>
             <a:off x="609480" y="273600"/>
-            <a:ext cx="10971000" cy="1143360"/>
+            <a:ext cx="10970280" cy="1142640"/>
           </a:xfrm>
           <a:prstGeom prst="rect">
             <a:avLst/>
@@ -8317,14 +10565,14 @@
       </p:sp>
       <p:sp>
         <p:nvSpPr>
-          <p:cNvPr id="159" name="CustomShape 2"/>
+          <p:cNvPr id="198" name="CustomShape 2"/>
           <p:cNvSpPr/>
           <p:nvPr/>
         </p:nvSpPr>
         <p:spPr>
           <a:xfrm>
             <a:off x="609480" y="1604520"/>
-            <a:ext cx="10971000" cy="1274040"/>
+            <a:ext cx="10970280" cy="1273320"/>
           </a:xfrm>
           <a:prstGeom prst="rect">
             <a:avLst/>
@@ -8374,14 +10622,14 @@
       </p:sp>
       <p:sp>
         <p:nvSpPr>
-          <p:cNvPr id="160" name="CustomShape 3"/>
+          <p:cNvPr id="199" name="CustomShape 3"/>
           <p:cNvSpPr/>
           <p:nvPr/>
         </p:nvSpPr>
         <p:spPr>
           <a:xfrm>
             <a:off x="576000" y="2088000"/>
-            <a:ext cx="10971000" cy="1274040"/>
+            <a:ext cx="10970280" cy="1273320"/>
           </a:xfrm>
           <a:prstGeom prst="rect">
             <a:avLst/>
@@ -8431,14 +10679,14 @@
       </p:sp>
       <p:sp>
         <p:nvSpPr>
-          <p:cNvPr id="161" name="CustomShape 4"/>
+          <p:cNvPr id="200" name="CustomShape 4"/>
           <p:cNvSpPr/>
           <p:nvPr/>
         </p:nvSpPr>
         <p:spPr>
           <a:xfrm>
             <a:off x="619560" y="2952000"/>
-            <a:ext cx="10971000" cy="1274040"/>
+            <a:ext cx="10970280" cy="1273320"/>
           </a:xfrm>
           <a:prstGeom prst="rect">
             <a:avLst/>
@@ -8488,14 +10736,14 @@
       </p:sp>
       <p:sp>
         <p:nvSpPr>
-          <p:cNvPr id="162" name="CustomShape 5"/>
+          <p:cNvPr id="201" name="CustomShape 5"/>
           <p:cNvSpPr/>
           <p:nvPr/>
         </p:nvSpPr>
         <p:spPr>
           <a:xfrm>
             <a:off x="576000" y="4052520"/>
-            <a:ext cx="10971000" cy="1274040"/>
+            <a:ext cx="10970280" cy="1273320"/>
           </a:xfrm>
           <a:prstGeom prst="rect">
             <a:avLst/>
@@ -8607,7 +10855,7 @@
                                           </p:stCondLst>
                                         </p:cTn>
                                         <p:tgtEl>
-                                          <p:spTgt spid="160">
+                                          <p:spTgt spid="199">
                                             <p:txEl>
                                               <p:pRg st="0" end="34"/>
                                             </p:txEl>
@@ -8656,7 +10904,7 @@
                                           </p:stCondLst>
                                         </p:cTn>
                                         <p:tgtEl>
-                                          <p:spTgt spid="161">
+                                          <p:spTgt spid="200">
                                             <p:txEl>
                                               <p:pRg st="0" end="54"/>
                                             </p:txEl>
@@ -8705,7 +10953,7 @@
                                           </p:stCondLst>
                                         </p:cTn>
                                         <p:tgtEl>
-                                          <p:spTgt spid="162">
+                                          <p:spTgt spid="201">
                                             <p:txEl>
                                               <p:pRg st="0" end="18"/>
                                             </p:txEl>
@@ -8796,14 +11044,14 @@
       </p:grpSpPr>
       <p:sp>
         <p:nvSpPr>
-          <p:cNvPr id="163" name="CustomShape 1"/>
+          <p:cNvPr id="202" name="CustomShape 1"/>
           <p:cNvSpPr/>
           <p:nvPr/>
         </p:nvSpPr>
         <p:spPr>
           <a:xfrm>
             <a:off x="609480" y="273600"/>
-            <a:ext cx="10971360" cy="1143720"/>
+            <a:ext cx="10970640" cy="1143000"/>
           </a:xfrm>
           <a:prstGeom prst="rect">
             <a:avLst/>
@@ -8838,6 +11086,7 @@
                   </a:solidFill>
                 </a:uFill>
                 <a:latin typeface="Arial"/>
+                <a:ea typeface="DejaVu Sans"/>
               </a:rPr>
               <a:t>Formal Verification and Certified Software</a:t>
             </a:r>
@@ -8857,14 +11106,14 @@
       </p:sp>
       <p:sp>
         <p:nvSpPr>
-          <p:cNvPr id="164" name="CustomShape 2"/>
+          <p:cNvPr id="203" name="CustomShape 2"/>
           <p:cNvSpPr/>
           <p:nvPr/>
         </p:nvSpPr>
         <p:spPr>
           <a:xfrm>
             <a:off x="609480" y="1604520"/>
-            <a:ext cx="10971360" cy="3976200"/>
+            <a:ext cx="10970640" cy="3975480"/>
           </a:xfrm>
           <a:prstGeom prst="rect">
             <a:avLst/>
@@ -8899,6 +11148,7 @@
                   </a:solidFill>
                 </a:uFill>
                 <a:latin typeface="Arial"/>
+                <a:ea typeface="DejaVu Sans"/>
               </a:rPr>
               <a:t>forall a in Nat, a &gt; 0, b in Nat, b &gt; 0, c in Nat, c &gt; 0, n in Nat,  n &gt; 2: an + bn </a:t>
             </a:r>
@@ -9048,14 +11298,14 @@
       </p:grpSpPr>
       <p:sp>
         <p:nvSpPr>
-          <p:cNvPr id="165" name="CustomShape 1"/>
+          <p:cNvPr id="204" name="CustomShape 1"/>
           <p:cNvSpPr/>
           <p:nvPr/>
         </p:nvSpPr>
         <p:spPr>
           <a:xfrm>
             <a:off x="609480" y="273600"/>
-            <a:ext cx="10971360" cy="1143720"/>
+            <a:ext cx="10970640" cy="1143000"/>
           </a:xfrm>
           <a:prstGeom prst="rect">
             <a:avLst/>
@@ -9090,6 +11340,7 @@
                   </a:solidFill>
                 </a:uFill>
                 <a:latin typeface="Arial"/>
+                <a:ea typeface="DejaVu Sans"/>
               </a:rPr>
               <a:t>Curry-Howard Correspondence</a:t>
             </a:r>
@@ -9109,7 +11360,7 @@
       </p:sp>
       <p:pic>
         <p:nvPicPr>
-          <p:cNvPr id="166" name="" descr=""/>
+          <p:cNvPr id="205" name="" descr=""/>
           <p:cNvPicPr/>
           <p:nvPr/>
         </p:nvPicPr>
@@ -9120,7 +11371,7 @@
         <p:spPr>
           <a:xfrm>
             <a:off x="4002120" y="1418400"/>
-            <a:ext cx="3340800" cy="4107240"/>
+            <a:ext cx="3340080" cy="4106520"/>
           </a:xfrm>
           <a:prstGeom prst="rect">
             <a:avLst/>
@@ -9132,14 +11383,14 @@
       </p:pic>
       <p:sp>
         <p:nvSpPr>
-          <p:cNvPr id="167" name="CustomShape 2"/>
+          <p:cNvPr id="206" name="CustomShape 2"/>
           <p:cNvSpPr/>
           <p:nvPr/>
         </p:nvSpPr>
         <p:spPr>
           <a:xfrm>
             <a:off x="2016000" y="5616000"/>
-            <a:ext cx="7488720" cy="512640"/>
+            <a:ext cx="7488000" cy="511920"/>
           </a:xfrm>
           <a:prstGeom prst="rect">
             <a:avLst/>
@@ -9174,6 +11425,7 @@
                   </a:solidFill>
                 </a:uFill>
                 <a:latin typeface="Arial"/>
+                <a:ea typeface="DejaVu Sans"/>
               </a:rPr>
               <a:t>Photograph of Haskell Curry</a:t>
             </a:r>
@@ -9206,6 +11458,7 @@
                   </a:solidFill>
                 </a:uFill>
                 <a:latin typeface="Arial"/>
+                <a:ea typeface="DejaVu Sans"/>
               </a:rPr>
               <a:t>Image credit: Gleb Svechnikov. Licensed under Creative Commons – By – Share Alike</a:t>
             </a:r>
@@ -9274,14 +11527,14 @@
       </p:grpSpPr>
       <p:sp>
         <p:nvSpPr>
-          <p:cNvPr id="168" name="CustomShape 1"/>
+          <p:cNvPr id="207" name="CustomShape 1"/>
           <p:cNvSpPr/>
           <p:nvPr/>
         </p:nvSpPr>
         <p:spPr>
           <a:xfrm>
             <a:off x="609480" y="273600"/>
-            <a:ext cx="10971360" cy="1143720"/>
+            <a:ext cx="10970640" cy="1143000"/>
           </a:xfrm>
           <a:prstGeom prst="rect">
             <a:avLst/>
@@ -9316,6 +11569,7 @@
                   </a:solidFill>
                 </a:uFill>
                 <a:latin typeface="Arial"/>
+                <a:ea typeface="DejaVu Sans"/>
               </a:rPr>
               <a:t>Curry-Howard Correspondence</a:t>
             </a:r>
@@ -9335,14 +11589,14 @@
       </p:sp>
       <p:sp>
         <p:nvSpPr>
-          <p:cNvPr id="169" name="CustomShape 2"/>
+          <p:cNvPr id="208" name="CustomShape 2"/>
           <p:cNvSpPr/>
           <p:nvPr/>
         </p:nvSpPr>
         <p:spPr>
           <a:xfrm>
             <a:off x="609480" y="1604520"/>
-            <a:ext cx="10971360" cy="3976200"/>
+            <a:ext cx="10970640" cy="3975480"/>
           </a:xfrm>
           <a:prstGeom prst="rect">
             <a:avLst/>
@@ -9361,13 +11615,13 @@
       </p:sp>
       <p:graphicFrame>
         <p:nvGraphicFramePr>
-          <p:cNvPr id="170" name="Table 3"/>
+          <p:cNvPr id="209" name="Table 3"/>
           <p:cNvGraphicFramePr/>
           <p:nvPr/>
         </p:nvGraphicFramePr>
         <p:xfrm>
           <a:off x="864000" y="2364480"/>
-          <a:ext cx="10150560" cy="2299680"/>
+          <a:ext cx="10149840" cy="2298600"/>
         </p:xfrm>
         <a:graphic>
           <a:graphicData uri="http://schemas.openxmlformats.org/drawingml/2006/table">
@@ -9376,9 +11630,9 @@
               <a:tblGrid>
                 <a:gridCol w="3382920"/>
                 <a:gridCol w="3382920"/>
-                <a:gridCol w="3385080"/>
+                <a:gridCol w="3384360"/>
               </a:tblGrid>
-              <a:tr h="720000">
+              <a:tr h="719640">
                 <a:tc>
                   <a:txBody>
                     <a:bodyPr/>
@@ -9500,7 +11754,7 @@
                   </a:tcPr>
                 </a:tc>
               </a:tr>
-              <a:tr h="720000">
+              <a:tr h="719640">
                 <a:tc>
                   <a:txBody>
                     <a:bodyPr/>
@@ -9607,7 +11861,7 @@
                   </a:tcPr>
                 </a:tc>
               </a:tr>
-              <a:tr h="860040">
+              <a:tr h="859680">
                 <a:tc>
                   <a:txBody>
                     <a:bodyPr/>
@@ -9769,14 +12023,14 @@
       </p:grpSpPr>
       <p:sp>
         <p:nvSpPr>
-          <p:cNvPr id="171" name="CustomShape 1"/>
+          <p:cNvPr id="210" name="CustomShape 1"/>
           <p:cNvSpPr/>
           <p:nvPr/>
         </p:nvSpPr>
         <p:spPr>
           <a:xfrm>
             <a:off x="609480" y="273600"/>
-            <a:ext cx="10971360" cy="1143720"/>
+            <a:ext cx="10970640" cy="1143000"/>
           </a:xfrm>
           <a:prstGeom prst="rect">
             <a:avLst/>
@@ -9811,6 +12065,7 @@
                   </a:solidFill>
                 </a:uFill>
                 <a:latin typeface="Arial"/>
+                <a:ea typeface="DejaVu Sans"/>
               </a:rPr>
               <a:t>Traditional type systems</a:t>
             </a:r>
@@ -9830,14 +12085,14 @@
       </p:sp>
       <p:sp>
         <p:nvSpPr>
-          <p:cNvPr id="172" name="CustomShape 2"/>
+          <p:cNvPr id="211" name="CustomShape 2"/>
           <p:cNvSpPr/>
           <p:nvPr/>
         </p:nvSpPr>
         <p:spPr>
           <a:xfrm>
             <a:off x="609480" y="1604520"/>
-            <a:ext cx="10971360" cy="3976200"/>
+            <a:ext cx="10970640" cy="3975480"/>
           </a:xfrm>
           <a:prstGeom prst="rect">
             <a:avLst/>
@@ -9895,14 +12150,14 @@
       </p:sp>
       <p:sp>
         <p:nvSpPr>
-          <p:cNvPr id="173" name="CustomShape 3"/>
+          <p:cNvPr id="212" name="CustomShape 3"/>
           <p:cNvSpPr/>
           <p:nvPr/>
         </p:nvSpPr>
         <p:spPr>
           <a:xfrm>
             <a:off x="864000" y="1800000"/>
-            <a:ext cx="10716840" cy="934920"/>
+            <a:ext cx="10716120" cy="934200"/>
           </a:xfrm>
           <a:prstGeom prst="rect">
             <a:avLst/>
@@ -9925,14 +12180,14 @@
       </p:sp>
       <p:sp>
         <p:nvSpPr>
-          <p:cNvPr id="174" name="CustomShape 4"/>
+          <p:cNvPr id="213" name="CustomShape 4"/>
           <p:cNvSpPr/>
           <p:nvPr/>
         </p:nvSpPr>
         <p:spPr>
           <a:xfrm>
             <a:off x="5040000" y="1934640"/>
-            <a:ext cx="3958920" cy="656280"/>
+            <a:ext cx="3958200" cy="655560"/>
           </a:xfrm>
           <a:prstGeom prst="rect">
             <a:avLst/>
@@ -9962,6 +12217,7 @@
                   </a:solidFill>
                 </a:uFill>
                 <a:latin typeface="Arial"/>
+                <a:ea typeface="DejaVu Sans"/>
               </a:rPr>
               <a:t>Types</a:t>
             </a:r>
@@ -9981,14 +12237,14 @@
       </p:sp>
       <p:sp>
         <p:nvSpPr>
-          <p:cNvPr id="175" name="CustomShape 5"/>
+          <p:cNvPr id="214" name="CustomShape 5"/>
           <p:cNvSpPr/>
           <p:nvPr/>
         </p:nvSpPr>
         <p:spPr>
           <a:xfrm>
             <a:off x="802080" y="4032000"/>
-            <a:ext cx="10716840" cy="934920"/>
+            <a:ext cx="10716120" cy="934200"/>
           </a:xfrm>
           <a:prstGeom prst="rect">
             <a:avLst/>
@@ -10011,14 +12267,14 @@
       </p:sp>
       <p:sp>
         <p:nvSpPr>
-          <p:cNvPr id="176" name="CustomShape 6"/>
+          <p:cNvPr id="215" name="CustomShape 6"/>
           <p:cNvSpPr/>
           <p:nvPr/>
         </p:nvSpPr>
         <p:spPr>
           <a:xfrm>
             <a:off x="4968000" y="4176000"/>
-            <a:ext cx="3958920" cy="656280"/>
+            <a:ext cx="3958200" cy="655560"/>
           </a:xfrm>
           <a:prstGeom prst="rect">
             <a:avLst/>
@@ -10048,6 +12304,7 @@
                   </a:solidFill>
                 </a:uFill>
                 <a:latin typeface="Arial"/>
+                <a:ea typeface="DejaVu Sans"/>
               </a:rPr>
               <a:t>Values</a:t>
             </a:r>
@@ -10067,7 +12324,7 @@
       </p:sp>
       <p:sp>
         <p:nvSpPr>
-          <p:cNvPr id="177" name="Line 7"/>
+          <p:cNvPr id="216" name="Line 7"/>
           <p:cNvSpPr/>
           <p:nvPr/>
         </p:nvSpPr>
@@ -10145,14 +12402,14 @@
       </p:grpSpPr>
       <p:sp>
         <p:nvSpPr>
-          <p:cNvPr id="178" name="CustomShape 1"/>
+          <p:cNvPr id="217" name="CustomShape 1"/>
           <p:cNvSpPr/>
           <p:nvPr/>
         </p:nvSpPr>
         <p:spPr>
           <a:xfrm>
             <a:off x="609480" y="273600"/>
-            <a:ext cx="10971360" cy="1143720"/>
+            <a:ext cx="10970640" cy="1143000"/>
           </a:xfrm>
           <a:prstGeom prst="rect">
             <a:avLst/>
@@ -10187,6 +12444,7 @@
                   </a:solidFill>
                 </a:uFill>
                 <a:latin typeface="Arial"/>
+                <a:ea typeface="DejaVu Sans"/>
               </a:rPr>
               <a:t>Dependent types in Idris</a:t>
             </a:r>
@@ -10206,14 +12464,14 @@
       </p:sp>
       <p:sp>
         <p:nvSpPr>
-          <p:cNvPr id="179" name="CustomShape 2"/>
+          <p:cNvPr id="218" name="CustomShape 2"/>
           <p:cNvSpPr/>
           <p:nvPr/>
         </p:nvSpPr>
         <p:spPr>
           <a:xfrm>
             <a:off x="5040000" y="1934640"/>
-            <a:ext cx="3958920" cy="656280"/>
+            <a:ext cx="3958200" cy="655560"/>
           </a:xfrm>
           <a:prstGeom prst="rect">
             <a:avLst/>
@@ -10243,6 +12501,7 @@
                   </a:solidFill>
                 </a:uFill>
                 <a:latin typeface="Arial"/>
+                <a:ea typeface="DejaVu Sans"/>
               </a:rPr>
               <a:t>Types</a:t>
             </a:r>
@@ -10262,14 +12521,14 @@
       </p:sp>
       <p:sp>
         <p:nvSpPr>
-          <p:cNvPr id="180" name="CustomShape 3"/>
+          <p:cNvPr id="219" name="CustomShape 3"/>
           <p:cNvSpPr/>
           <p:nvPr/>
         </p:nvSpPr>
         <p:spPr>
           <a:xfrm>
             <a:off x="4968000" y="4176000"/>
-            <a:ext cx="3958920" cy="656280"/>
+            <a:ext cx="3958200" cy="655560"/>
           </a:xfrm>
           <a:prstGeom prst="rect">
             <a:avLst/>
@@ -10299,6 +12558,7 @@
                   </a:solidFill>
                 </a:uFill>
                 <a:latin typeface="Arial"/>
+                <a:ea typeface="DejaVu Sans"/>
               </a:rPr>
               <a:t>Values</a:t>
             </a:r>
@@ -10318,14 +12578,14 @@
       </p:sp>
       <p:sp>
         <p:nvSpPr>
-          <p:cNvPr id="181" name="CustomShape 4"/>
+          <p:cNvPr id="220" name="CustomShape 4"/>
           <p:cNvSpPr/>
           <p:nvPr/>
         </p:nvSpPr>
         <p:spPr>
           <a:xfrm>
             <a:off x="609480" y="1604520"/>
-            <a:ext cx="10971360" cy="3976200"/>
+            <a:ext cx="10970640" cy="3975480"/>
           </a:xfrm>
           <a:prstGeom prst="rect">
             <a:avLst/>
@@ -10383,14 +12643,14 @@
       </p:sp>
       <p:sp>
         <p:nvSpPr>
-          <p:cNvPr id="182" name="CustomShape 5"/>
+          <p:cNvPr id="221" name="CustomShape 5"/>
           <p:cNvSpPr/>
           <p:nvPr/>
         </p:nvSpPr>
         <p:spPr>
           <a:xfrm>
             <a:off x="648000" y="1584000"/>
-            <a:ext cx="11086920" cy="2924280"/>
+            <a:ext cx="11086200" cy="2923560"/>
           </a:xfrm>
           <a:prstGeom prst="rect">
             <a:avLst/>
@@ -10420,6 +12680,7 @@
                   </a:solidFill>
                 </a:uFill>
                 <a:latin typeface="Arial"/>
+                <a:ea typeface="DejaVu Sans"/>
               </a:rPr>
               <a:t>data Vec : Nat -&gt; Type -&gt; Type where</a:t>
             </a:r>
@@ -10447,6 +12708,7 @@
                   </a:solidFill>
                 </a:uFill>
                 <a:latin typeface="Arial"/>
+                <a:ea typeface="DejaVu Sans"/>
               </a:rPr>
               <a:t>  </a:t>
             </a:r>
@@ -10461,6 +12723,7 @@
                   </a:solidFill>
                 </a:uFill>
                 <a:latin typeface="Arial"/>
+                <a:ea typeface="DejaVu Sans"/>
               </a:rPr>
               <a:t>MkVec : (l : List a) -&gt; Vec (length l) a</a:t>
             </a:r>
@@ -10501,6 +12764,7 @@
                   </a:solidFill>
                 </a:uFill>
                 <a:latin typeface="Arial"/>
+                <a:ea typeface="DejaVu Sans"/>
               </a:rPr>
               <a:t>myVec : Vec 5 Nat</a:t>
             </a:r>
@@ -10528,6 +12792,7 @@
                   </a:solidFill>
                 </a:uFill>
                 <a:latin typeface="Arial"/>
+                <a:ea typeface="DejaVu Sans"/>
               </a:rPr>
               <a:t>myVec = MkVec [1, 2, 3, 4, 5]</a:t>
             </a:r>
@@ -10596,14 +12861,14 @@
       </p:grpSpPr>
       <p:sp>
         <p:nvSpPr>
-          <p:cNvPr id="183" name="CustomShape 1"/>
+          <p:cNvPr id="222" name="CustomShape 1"/>
           <p:cNvSpPr/>
           <p:nvPr/>
         </p:nvSpPr>
         <p:spPr>
           <a:xfrm>
             <a:off x="609480" y="273600"/>
-            <a:ext cx="10971360" cy="1143720"/>
+            <a:ext cx="10970640" cy="1143000"/>
           </a:xfrm>
           <a:prstGeom prst="rect">
             <a:avLst/>
@@ -10638,6 +12903,7 @@
                   </a:solidFill>
                 </a:uFill>
                 <a:latin typeface="Arial"/>
+                <a:ea typeface="DejaVu Sans"/>
               </a:rPr>
               <a:t>Minesweeper as an example problem</a:t>
             </a:r>
@@ -10657,14 +12923,14 @@
       </p:sp>
       <p:sp>
         <p:nvSpPr>
-          <p:cNvPr id="184" name="CustomShape 2"/>
+          <p:cNvPr id="223" name="CustomShape 2"/>
           <p:cNvSpPr/>
           <p:nvPr/>
         </p:nvSpPr>
         <p:spPr>
           <a:xfrm>
             <a:off x="609480" y="1604520"/>
-            <a:ext cx="10971360" cy="3976200"/>
+            <a:ext cx="10970640" cy="3975480"/>
           </a:xfrm>
           <a:prstGeom prst="rect">
             <a:avLst/>
@@ -10722,7 +12988,7 @@
       </p:sp>
       <p:pic>
         <p:nvPicPr>
-          <p:cNvPr id="185" name="" descr=""/>
+          <p:cNvPr id="224" name="" descr=""/>
           <p:cNvPicPr/>
           <p:nvPr/>
         </p:nvPicPr>
@@ -10733,7 +12999,7 @@
         <p:spPr>
           <a:xfrm>
             <a:off x="2534040" y="1339200"/>
-            <a:ext cx="7208640" cy="4879800"/>
+            <a:ext cx="7207920" cy="4879080"/>
           </a:xfrm>
           <a:prstGeom prst="rect">
             <a:avLst/>
@@ -10794,7 +13060,7 @@
       </p:grpSpPr>
       <p:pic>
         <p:nvPicPr>
-          <p:cNvPr id="186" name="" descr=""/>
+          <p:cNvPr id="225" name="" descr=""/>
           <p:cNvPicPr/>
           <p:nvPr/>
         </p:nvPicPr>
@@ -10805,7 +13071,7 @@
         <p:spPr>
           <a:xfrm>
             <a:off x="187200" y="115200"/>
-            <a:ext cx="11489040" cy="5946120"/>
+            <a:ext cx="11488320" cy="5945400"/>
           </a:xfrm>
           <a:prstGeom prst="rect">
             <a:avLst/>
@@ -10817,14 +13083,14 @@
       </p:pic>
       <p:sp>
         <p:nvSpPr>
-          <p:cNvPr id="187" name="CustomShape 1"/>
+          <p:cNvPr id="226" name="CustomShape 1"/>
           <p:cNvSpPr/>
           <p:nvPr/>
         </p:nvSpPr>
         <p:spPr>
           <a:xfrm>
             <a:off x="504000" y="6191280"/>
-            <a:ext cx="8220600" cy="429840"/>
+            <a:ext cx="8219880" cy="429120"/>
           </a:xfrm>
           <a:prstGeom prst="rect">
             <a:avLst/>
@@ -10854,6 +13120,7 @@
                   </a:solidFill>
                 </a:uFill>
                 <a:latin typeface="Arial"/>
+                <a:ea typeface="DejaVu Sans"/>
               </a:rPr>
               <a:t>https://github.com/A1kmm/proofsweeper</a:t>
             </a:r>
@@ -11793,4 +14060,227 @@
     </a:fmtScheme>
   </a:themeElements>
 </a:theme>
+</file>
+
+<file path=ppt/theme/theme5.xml><?xml version="1.0" encoding="utf-8"?>
+<a:theme xmlns:a="http://schemas.openxmlformats.org/drawingml/2006/main" name="Office Theme">
+  <a:themeElements>
+    <a:clrScheme name="Office">
+      <a:dk1>
+        <a:sysClr val="windowText" lastClr="000000"/>
+      </a:dk1>
+      <a:lt1>
+        <a:sysClr val="window" lastClr="FFFFFF"/>
+      </a:lt1>
+      <a:dk2>
+        <a:srgbClr val="1F497D"/>
+      </a:dk2>
+      <a:lt2>
+        <a:srgbClr val="EEECE1"/>
+      </a:lt2>
+      <a:accent1>
+        <a:srgbClr val="4F81BD"/>
+      </a:accent1>
+      <a:accent2>
+        <a:srgbClr val="C0504D"/>
+      </a:accent2>
+      <a:accent3>
+        <a:srgbClr val="9BBB59"/>
+      </a:accent3>
+      <a:accent4>
+        <a:srgbClr val="8064A2"/>
+      </a:accent4>
+      <a:accent5>
+        <a:srgbClr val="4BACC6"/>
+      </a:accent5>
+      <a:accent6>
+        <a:srgbClr val="F79646"/>
+      </a:accent6>
+      <a:hlink>
+        <a:srgbClr val="0000FF"/>
+      </a:hlink>
+      <a:folHlink>
+        <a:srgbClr val="800080"/>
+      </a:folHlink>
+    </a:clrScheme>
+    <a:fontScheme name="Office">
+      <a:majorFont>
+        <a:latin typeface="Arial"/>
+        <a:ea typeface="DejaVu Sans"/>
+        <a:cs typeface="DejaVu Sans"/>
+      </a:majorFont>
+      <a:minorFont>
+        <a:latin typeface="Arial"/>
+        <a:ea typeface="DejaVu Sans"/>
+        <a:cs typeface="DejaVu Sans"/>
+      </a:minorFont>
+    </a:fontScheme>
+    <a:fmtScheme name="Office">
+      <a:fillStyleLst>
+        <a:solidFill>
+          <a:schemeClr val="phClr"/>
+        </a:solidFill>
+        <a:gradFill rotWithShape="1">
+          <a:gsLst>
+            <a:gs pos="0">
+              <a:schemeClr val="phClr">
+                <a:tint val="50000"/>
+                <a:satMod val="300000"/>
+              </a:schemeClr>
+            </a:gs>
+            <a:gs pos="35000">
+              <a:schemeClr val="phClr">
+                <a:tint val="37000"/>
+                <a:satMod val="300000"/>
+              </a:schemeClr>
+            </a:gs>
+            <a:gs pos="100000">
+              <a:schemeClr val="phClr">
+                <a:tint val="15000"/>
+                <a:satMod val="350000"/>
+              </a:schemeClr>
+            </a:gs>
+          </a:gsLst>
+          <a:lin ang="16200000" scaled="1"/>
+        </a:gradFill>
+        <a:gradFill rotWithShape="1">
+          <a:gsLst>
+            <a:gs pos="0">
+              <a:schemeClr val="phClr">
+                <a:shade val="51000"/>
+                <a:satMod val="130000"/>
+              </a:schemeClr>
+            </a:gs>
+            <a:gs pos="80000">
+              <a:schemeClr val="phClr">
+                <a:shade val="93000"/>
+                <a:satMod val="130000"/>
+              </a:schemeClr>
+            </a:gs>
+            <a:gs pos="100000">
+              <a:schemeClr val="phClr">
+                <a:shade val="94000"/>
+                <a:satMod val="135000"/>
+              </a:schemeClr>
+            </a:gs>
+          </a:gsLst>
+          <a:lin ang="16200000" scaled="0"/>
+        </a:gradFill>
+      </a:fillStyleLst>
+      <a:lnStyleLst>
+        <a:ln w="9525" cap="flat" cmpd="sng" algn="ctr">
+          <a:solidFill>
+            <a:schemeClr val="phClr">
+              <a:shade val="95000"/>
+              <a:satMod val="105000"/>
+            </a:schemeClr>
+          </a:solidFill>
+          <a:prstDash val="solid"/>
+        </a:ln>
+        <a:ln w="25400" cap="flat" cmpd="sng" algn="ctr">
+          <a:solidFill>
+            <a:schemeClr val="phClr"/>
+          </a:solidFill>
+          <a:prstDash val="solid"/>
+        </a:ln>
+        <a:ln w="38100" cap="flat" cmpd="sng" algn="ctr">
+          <a:solidFill>
+            <a:schemeClr val="phClr"/>
+          </a:solidFill>
+          <a:prstDash val="solid"/>
+        </a:ln>
+      </a:lnStyleLst>
+      <a:effectStyleLst>
+        <a:effectStyle>
+          <a:effectLst>
+            <a:outerShdw blurRad="40000" dist="20000" dir="5400000" rotWithShape="0">
+              <a:srgbClr val="000000">
+                <a:alpha val="38000"/>
+              </a:srgbClr>
+            </a:outerShdw>
+          </a:effectLst>
+        </a:effectStyle>
+        <a:effectStyle>
+          <a:effectLst>
+            <a:outerShdw blurRad="40000" dist="23000" dir="5400000" rotWithShape="0">
+              <a:srgbClr val="000000">
+                <a:alpha val="35000"/>
+              </a:srgbClr>
+            </a:outerShdw>
+          </a:effectLst>
+        </a:effectStyle>
+        <a:effectStyle>
+          <a:effectLst>
+            <a:outerShdw blurRad="40000" dist="23000" dir="5400000" rotWithShape="0">
+              <a:srgbClr val="000000">
+                <a:alpha val="35000"/>
+              </a:srgbClr>
+            </a:outerShdw>
+          </a:effectLst>
+          <a:scene3d>
+            <a:camera prst="orthographicFront">
+              <a:rot lat="0" lon="0" rev="0"/>
+            </a:camera>
+            <a:lightRig rig="threePt" dir="t">
+              <a:rot lat="0" lon="0" rev="1200000"/>
+            </a:lightRig>
+          </a:scene3d>
+          <a:sp3d>
+            <a:bevelT w="63500" h="25400"/>
+          </a:sp3d>
+        </a:effectStyle>
+      </a:effectStyleLst>
+      <a:bgFillStyleLst>
+        <a:solidFill>
+          <a:schemeClr val="phClr"/>
+        </a:solidFill>
+        <a:gradFill rotWithShape="1">
+          <a:gsLst>
+            <a:gs pos="0">
+              <a:schemeClr val="phClr">
+                <a:tint val="40000"/>
+                <a:satMod val="350000"/>
+              </a:schemeClr>
+            </a:gs>
+            <a:gs pos="40000">
+              <a:schemeClr val="phClr">
+                <a:tint val="45000"/>
+                <a:shade val="99000"/>
+                <a:satMod val="350000"/>
+              </a:schemeClr>
+            </a:gs>
+            <a:gs pos="100000">
+              <a:schemeClr val="phClr">
+                <a:shade val="20000"/>
+                <a:satMod val="255000"/>
+              </a:schemeClr>
+            </a:gs>
+          </a:gsLst>
+          <a:path path="circle">
+            <a:fillToRect l="50000" t="-80000" r="50000" b="180000"/>
+          </a:path>
+        </a:gradFill>
+        <a:gradFill rotWithShape="1">
+          <a:gsLst>
+            <a:gs pos="0">
+              <a:schemeClr val="phClr">
+                <a:tint val="80000"/>
+                <a:satMod val="300000"/>
+              </a:schemeClr>
+            </a:gs>
+            <a:gs pos="100000">
+              <a:schemeClr val="phClr">
+                <a:shade val="30000"/>
+                <a:satMod val="200000"/>
+              </a:schemeClr>
+            </a:gs>
+          </a:gsLst>
+          <a:path path="circle">
+            <a:fillToRect l="50000" t="50000" r="50000" b="50000"/>
+          </a:path>
+        </a:gradFill>
+      </a:bgFillStyleLst>
+    </a:fmtScheme>
+  </a:themeElements>
+</a:theme>
 </file>
</xml_diff>

<commit_message>
More updates to notes and slides
</commit_message>
<xml_diff>
--- a/Talk.pptx
+++ b/Talk.pptx
@@ -21,6 +21,8 @@
     <p:sldId id="265" r:id="rId16"/>
     <p:sldId id="266" r:id="rId17"/>
     <p:sldId id="267" r:id="rId18"/>
+    <p:sldId id="268" r:id="rId19"/>
+    <p:sldId id="269" r:id="rId20"/>
   </p:sldIdLst>
   <p:sldSz cx="12192000" cy="6858000"/>
   <p:notesSz cx="7559675" cy="10691812"/>
@@ -79,7 +81,7 @@
         <p:spPr>
           <a:xfrm>
             <a:off x="609480" y="273600"/>
-            <a:ext cx="10972080" cy="1144800"/>
+            <a:ext cx="10971720" cy="1144440"/>
           </a:xfrm>
           <a:prstGeom prst="rect">
             <a:avLst/>
@@ -214,7 +216,7 @@
         <p:spPr>
           <a:xfrm>
             <a:off x="609480" y="273600"/>
-            <a:ext cx="10972080" cy="1144800"/>
+            <a:ext cx="10971720" cy="1144440"/>
           </a:xfrm>
           <a:prstGeom prst="rect">
             <a:avLst/>
@@ -425,7 +427,7 @@
         <p:spPr>
           <a:xfrm>
             <a:off x="609480" y="273600"/>
-            <a:ext cx="10972080" cy="1144800"/>
+            <a:ext cx="10971720" cy="1144440"/>
           </a:xfrm>
           <a:prstGeom prst="rect">
             <a:avLst/>
@@ -532,13 +534,13 @@
           <p:nvPr/>
         </p:nvPicPr>
         <p:blipFill>
-          <a:blip r:embed=""/>
+          <a:blip r:embed="rId2"/>
           <a:stretch/>
         </p:blipFill>
         <p:spPr>
           <a:xfrm>
-            <a:off x="609480" y="1604520"/>
-            <a:ext cx="10972440" cy="3977280"/>
+            <a:off x="3602880" y="1604520"/>
+            <a:ext cx="4984920" cy="3977280"/>
           </a:xfrm>
           <a:prstGeom prst="rect">
             <a:avLst/>
@@ -555,13 +557,13 @@
           <p:nvPr/>
         </p:nvPicPr>
         <p:blipFill>
-          <a:blip r:embed=""/>
+          <a:blip r:embed="rId3"/>
           <a:stretch/>
         </p:blipFill>
         <p:spPr>
           <a:xfrm>
-            <a:off x="609480" y="1604520"/>
-            <a:ext cx="10972440" cy="3977280"/>
+            <a:off x="3602880" y="1604520"/>
+            <a:ext cx="4984920" cy="3977280"/>
           </a:xfrm>
           <a:prstGeom prst="rect">
             <a:avLst/>
@@ -628,7 +630,7 @@
         <p:spPr>
           <a:xfrm>
             <a:off x="609480" y="273600"/>
-            <a:ext cx="10972080" cy="1144800"/>
+            <a:ext cx="10971720" cy="1144440"/>
           </a:xfrm>
           <a:prstGeom prst="rect">
             <a:avLst/>
@@ -724,7 +726,7 @@
         <p:spPr>
           <a:xfrm>
             <a:off x="609480" y="273600"/>
-            <a:ext cx="10972080" cy="1144800"/>
+            <a:ext cx="10971720" cy="1144440"/>
           </a:xfrm>
           <a:prstGeom prst="rect">
             <a:avLst/>
@@ -821,7 +823,7 @@
         <p:spPr>
           <a:xfrm>
             <a:off x="609480" y="273600"/>
-            <a:ext cx="10972080" cy="1144800"/>
+            <a:ext cx="10971720" cy="1144440"/>
           </a:xfrm>
           <a:prstGeom prst="rect">
             <a:avLst/>
@@ -956,7 +958,7 @@
         <p:spPr>
           <a:xfrm>
             <a:off x="609480" y="273600"/>
-            <a:ext cx="10972080" cy="1144800"/>
+            <a:ext cx="10971720" cy="1144440"/>
           </a:xfrm>
           <a:prstGeom prst="rect">
             <a:avLst/>
@@ -1015,7 +1017,7 @@
         <p:spPr>
           <a:xfrm>
             <a:off x="609480" y="273600"/>
-            <a:ext cx="10972080" cy="5307840"/>
+            <a:ext cx="10971720" cy="5306400"/>
           </a:xfrm>
           <a:prstGeom prst="rect">
             <a:avLst/>
@@ -1074,7 +1076,7 @@
         <p:spPr>
           <a:xfrm>
             <a:off x="609480" y="273600"/>
-            <a:ext cx="10972080" cy="1144800"/>
+            <a:ext cx="10971720" cy="1144440"/>
           </a:xfrm>
           <a:prstGeom prst="rect">
             <a:avLst/>
@@ -1247,7 +1249,7 @@
         <p:spPr>
           <a:xfrm>
             <a:off x="609480" y="273600"/>
-            <a:ext cx="10972080" cy="1144800"/>
+            <a:ext cx="10971720" cy="1144440"/>
           </a:xfrm>
           <a:prstGeom prst="rect">
             <a:avLst/>
@@ -1343,7 +1345,7 @@
         <p:spPr>
           <a:xfrm>
             <a:off x="609480" y="273600"/>
-            <a:ext cx="10972080" cy="1144800"/>
+            <a:ext cx="10971720" cy="1144440"/>
           </a:xfrm>
           <a:prstGeom prst="rect">
             <a:avLst/>
@@ -1516,7 +1518,7 @@
         <p:spPr>
           <a:xfrm>
             <a:off x="609480" y="273600"/>
-            <a:ext cx="10972080" cy="1144800"/>
+            <a:ext cx="10971720" cy="1144440"/>
           </a:xfrm>
           <a:prstGeom prst="rect">
             <a:avLst/>
@@ -1689,7 +1691,7 @@
         <p:spPr>
           <a:xfrm>
             <a:off x="609480" y="273600"/>
-            <a:ext cx="10972080" cy="1144800"/>
+            <a:ext cx="10971720" cy="1144440"/>
           </a:xfrm>
           <a:prstGeom prst="rect">
             <a:avLst/>
@@ -1824,7 +1826,7 @@
         <p:spPr>
           <a:xfrm>
             <a:off x="609480" y="273600"/>
-            <a:ext cx="10972080" cy="1144800"/>
+            <a:ext cx="10971720" cy="1144440"/>
           </a:xfrm>
           <a:prstGeom prst="rect">
             <a:avLst/>
@@ -2035,7 +2037,7 @@
         <p:spPr>
           <a:xfrm>
             <a:off x="609480" y="273600"/>
-            <a:ext cx="10972080" cy="1144800"/>
+            <a:ext cx="10971720" cy="1144440"/>
           </a:xfrm>
           <a:prstGeom prst="rect">
             <a:avLst/>
@@ -2142,13 +2144,13 @@
           <p:nvPr/>
         </p:nvPicPr>
         <p:blipFill>
-          <a:blip r:embed=""/>
+          <a:blip r:embed="rId2"/>
           <a:stretch/>
         </p:blipFill>
         <p:spPr>
           <a:xfrm>
-            <a:off x="609480" y="1604520"/>
-            <a:ext cx="10972440" cy="3977280"/>
+            <a:off x="3602880" y="1604520"/>
+            <a:ext cx="4984920" cy="3977280"/>
           </a:xfrm>
           <a:prstGeom prst="rect">
             <a:avLst/>
@@ -2165,13 +2167,13 @@
           <p:nvPr/>
         </p:nvPicPr>
         <p:blipFill>
-          <a:blip r:embed=""/>
+          <a:blip r:embed="rId3"/>
           <a:stretch/>
         </p:blipFill>
         <p:spPr>
           <a:xfrm>
-            <a:off x="609480" y="1604520"/>
-            <a:ext cx="10972440" cy="3977280"/>
+            <a:off x="3602880" y="1604520"/>
+            <a:ext cx="4984920" cy="3977280"/>
           </a:xfrm>
           <a:prstGeom prst="rect">
             <a:avLst/>
@@ -2238,7 +2240,7 @@
         <p:spPr>
           <a:xfrm>
             <a:off x="609480" y="273600"/>
-            <a:ext cx="10972080" cy="1144800"/>
+            <a:ext cx="10971720" cy="1144440"/>
           </a:xfrm>
           <a:prstGeom prst="rect">
             <a:avLst/>
@@ -2334,7 +2336,7 @@
         <p:spPr>
           <a:xfrm>
             <a:off x="609480" y="273600"/>
-            <a:ext cx="10972080" cy="1144800"/>
+            <a:ext cx="10971720" cy="1144440"/>
           </a:xfrm>
           <a:prstGeom prst="rect">
             <a:avLst/>
@@ -2431,7 +2433,7 @@
         <p:spPr>
           <a:xfrm>
             <a:off x="609480" y="273600"/>
-            <a:ext cx="10972080" cy="1144800"/>
+            <a:ext cx="10971720" cy="1144440"/>
           </a:xfrm>
           <a:prstGeom prst="rect">
             <a:avLst/>
@@ -2566,7 +2568,7 @@
         <p:spPr>
           <a:xfrm>
             <a:off x="609480" y="273600"/>
-            <a:ext cx="10972080" cy="1144800"/>
+            <a:ext cx="10971720" cy="1144440"/>
           </a:xfrm>
           <a:prstGeom prst="rect">
             <a:avLst/>
@@ -2625,7 +2627,7 @@
         <p:spPr>
           <a:xfrm>
             <a:off x="609480" y="273600"/>
-            <a:ext cx="10972080" cy="1144800"/>
+            <a:ext cx="10971720" cy="1144440"/>
           </a:xfrm>
           <a:prstGeom prst="rect">
             <a:avLst/>
@@ -2722,7 +2724,7 @@
         <p:spPr>
           <a:xfrm>
             <a:off x="609480" y="273600"/>
-            <a:ext cx="10972080" cy="5307840"/>
+            <a:ext cx="10971720" cy="5306400"/>
           </a:xfrm>
           <a:prstGeom prst="rect">
             <a:avLst/>
@@ -2781,7 +2783,7 @@
         <p:spPr>
           <a:xfrm>
             <a:off x="609480" y="273600"/>
-            <a:ext cx="10972080" cy="1144800"/>
+            <a:ext cx="10971720" cy="1144440"/>
           </a:xfrm>
           <a:prstGeom prst="rect">
             <a:avLst/>
@@ -2954,7 +2956,7 @@
         <p:spPr>
           <a:xfrm>
             <a:off x="609480" y="273600"/>
-            <a:ext cx="10972080" cy="1144800"/>
+            <a:ext cx="10971720" cy="1144440"/>
           </a:xfrm>
           <a:prstGeom prst="rect">
             <a:avLst/>
@@ -3127,7 +3129,7 @@
         <p:spPr>
           <a:xfrm>
             <a:off x="609480" y="273600"/>
-            <a:ext cx="10972080" cy="1144800"/>
+            <a:ext cx="10971720" cy="1144440"/>
           </a:xfrm>
           <a:prstGeom prst="rect">
             <a:avLst/>
@@ -3300,7 +3302,7 @@
         <p:spPr>
           <a:xfrm>
             <a:off x="609480" y="273600"/>
-            <a:ext cx="10972080" cy="1144800"/>
+            <a:ext cx="10971720" cy="1144440"/>
           </a:xfrm>
           <a:prstGeom prst="rect">
             <a:avLst/>
@@ -3435,7 +3437,7 @@
         <p:spPr>
           <a:xfrm>
             <a:off x="609480" y="273600"/>
-            <a:ext cx="10972080" cy="1144800"/>
+            <a:ext cx="10971720" cy="1144440"/>
           </a:xfrm>
           <a:prstGeom prst="rect">
             <a:avLst/>
@@ -3646,7 +3648,7 @@
         <p:spPr>
           <a:xfrm>
             <a:off x="609480" y="273600"/>
-            <a:ext cx="10972080" cy="1144800"/>
+            <a:ext cx="10971720" cy="1144440"/>
           </a:xfrm>
           <a:prstGeom prst="rect">
             <a:avLst/>
@@ -3753,13 +3755,13 @@
           <p:nvPr/>
         </p:nvPicPr>
         <p:blipFill>
-          <a:blip r:embed=""/>
+          <a:blip r:embed="rId2"/>
           <a:stretch/>
         </p:blipFill>
         <p:spPr>
           <a:xfrm>
-            <a:off x="609480" y="1604520"/>
-            <a:ext cx="10972440" cy="3977280"/>
+            <a:off x="3602880" y="1604520"/>
+            <a:ext cx="4984920" cy="3977280"/>
           </a:xfrm>
           <a:prstGeom prst="rect">
             <a:avLst/>
@@ -3776,13 +3778,13 @@
           <p:nvPr/>
         </p:nvPicPr>
         <p:blipFill>
-          <a:blip r:embed=""/>
+          <a:blip r:embed="rId3"/>
           <a:stretch/>
         </p:blipFill>
         <p:spPr>
           <a:xfrm>
-            <a:off x="609480" y="1604520"/>
-            <a:ext cx="10972440" cy="3977280"/>
+            <a:off x="3602880" y="1604520"/>
+            <a:ext cx="4984920" cy="3977280"/>
           </a:xfrm>
           <a:prstGeom prst="rect">
             <a:avLst/>
@@ -3849,7 +3851,7 @@
         <p:spPr>
           <a:xfrm>
             <a:off x="609480" y="273600"/>
-            <a:ext cx="10972080" cy="1144800"/>
+            <a:ext cx="10971720" cy="1144440"/>
           </a:xfrm>
           <a:prstGeom prst="rect">
             <a:avLst/>
@@ -3945,7 +3947,7 @@
         <p:spPr>
           <a:xfrm>
             <a:off x="609480" y="273600"/>
-            <a:ext cx="10972080" cy="1144800"/>
+            <a:ext cx="10971720" cy="1144440"/>
           </a:xfrm>
           <a:prstGeom prst="rect">
             <a:avLst/>
@@ -4042,7 +4044,7 @@
         <p:spPr>
           <a:xfrm>
             <a:off x="609480" y="273600"/>
-            <a:ext cx="10972080" cy="1144800"/>
+            <a:ext cx="10971720" cy="1144440"/>
           </a:xfrm>
           <a:prstGeom prst="rect">
             <a:avLst/>
@@ -4177,7 +4179,7 @@
         <p:spPr>
           <a:xfrm>
             <a:off x="609480" y="273600"/>
-            <a:ext cx="10972080" cy="1144800"/>
+            <a:ext cx="10971720" cy="1144440"/>
           </a:xfrm>
           <a:prstGeom prst="rect">
             <a:avLst/>
@@ -4312,7 +4314,7 @@
         <p:spPr>
           <a:xfrm>
             <a:off x="609480" y="273600"/>
-            <a:ext cx="10972080" cy="1144800"/>
+            <a:ext cx="10971720" cy="1144440"/>
           </a:xfrm>
           <a:prstGeom prst="rect">
             <a:avLst/>
@@ -4371,7 +4373,7 @@
         <p:spPr>
           <a:xfrm>
             <a:off x="609480" y="273600"/>
-            <a:ext cx="10972080" cy="5307840"/>
+            <a:ext cx="10971720" cy="5306400"/>
           </a:xfrm>
           <a:prstGeom prst="rect">
             <a:avLst/>
@@ -4430,7 +4432,7 @@
         <p:spPr>
           <a:xfrm>
             <a:off x="609480" y="273600"/>
-            <a:ext cx="10972080" cy="1144800"/>
+            <a:ext cx="10971720" cy="1144440"/>
           </a:xfrm>
           <a:prstGeom prst="rect">
             <a:avLst/>
@@ -4603,7 +4605,7 @@
         <p:spPr>
           <a:xfrm>
             <a:off x="609480" y="273600"/>
-            <a:ext cx="10972080" cy="1144800"/>
+            <a:ext cx="10971720" cy="1144440"/>
           </a:xfrm>
           <a:prstGeom prst="rect">
             <a:avLst/>
@@ -4776,7 +4778,7 @@
         <p:spPr>
           <a:xfrm>
             <a:off x="609480" y="273600"/>
-            <a:ext cx="10972080" cy="1144800"/>
+            <a:ext cx="10971720" cy="1144440"/>
           </a:xfrm>
           <a:prstGeom prst="rect">
             <a:avLst/>
@@ -4949,7 +4951,7 @@
         <p:spPr>
           <a:xfrm>
             <a:off x="609480" y="273600"/>
-            <a:ext cx="10972080" cy="1144800"/>
+            <a:ext cx="10971720" cy="1144440"/>
           </a:xfrm>
           <a:prstGeom prst="rect">
             <a:avLst/>
@@ -5084,7 +5086,7 @@
         <p:spPr>
           <a:xfrm>
             <a:off x="609480" y="273600"/>
-            <a:ext cx="10972080" cy="1144800"/>
+            <a:ext cx="10971720" cy="1144440"/>
           </a:xfrm>
           <a:prstGeom prst="rect">
             <a:avLst/>
@@ -5295,7 +5297,7 @@
         <p:spPr>
           <a:xfrm>
             <a:off x="609480" y="273600"/>
-            <a:ext cx="10972080" cy="1144800"/>
+            <a:ext cx="10971720" cy="1144440"/>
           </a:xfrm>
           <a:prstGeom prst="rect">
             <a:avLst/>
@@ -5402,13 +5404,13 @@
           <p:nvPr/>
         </p:nvPicPr>
         <p:blipFill>
-          <a:blip r:embed=""/>
+          <a:blip r:embed="rId2"/>
           <a:stretch/>
         </p:blipFill>
         <p:spPr>
           <a:xfrm>
-            <a:off x="609480" y="1604520"/>
-            <a:ext cx="10972440" cy="3977280"/>
+            <a:off x="3602880" y="1604520"/>
+            <a:ext cx="4984920" cy="3977280"/>
           </a:xfrm>
           <a:prstGeom prst="rect">
             <a:avLst/>
@@ -5425,13 +5427,13 @@
           <p:nvPr/>
         </p:nvPicPr>
         <p:blipFill>
-          <a:blip r:embed=""/>
+          <a:blip r:embed="rId3"/>
           <a:stretch/>
         </p:blipFill>
         <p:spPr>
           <a:xfrm>
-            <a:off x="609480" y="1604520"/>
-            <a:ext cx="10972440" cy="3977280"/>
+            <a:off x="3602880" y="1604520"/>
+            <a:ext cx="4984920" cy="3977280"/>
           </a:xfrm>
           <a:prstGeom prst="rect">
             <a:avLst/>
@@ -5498,7 +5500,7 @@
         <p:spPr>
           <a:xfrm>
             <a:off x="609480" y="273600"/>
-            <a:ext cx="10972080" cy="1144800"/>
+            <a:ext cx="10971720" cy="1144440"/>
           </a:xfrm>
           <a:prstGeom prst="rect">
             <a:avLst/>
@@ -5557,7 +5559,7 @@
         <p:spPr>
           <a:xfrm>
             <a:off x="609480" y="273600"/>
-            <a:ext cx="10972080" cy="1144800"/>
+            <a:ext cx="10971720" cy="1144440"/>
           </a:xfrm>
           <a:prstGeom prst="rect">
             <a:avLst/>
@@ -5653,7 +5655,7 @@
         <p:spPr>
           <a:xfrm>
             <a:off x="609480" y="273600"/>
-            <a:ext cx="10972080" cy="1144800"/>
+            <a:ext cx="10971720" cy="1144440"/>
           </a:xfrm>
           <a:prstGeom prst="rect">
             <a:avLst/>
@@ -5750,7 +5752,7 @@
         <p:spPr>
           <a:xfrm>
             <a:off x="609480" y="273600"/>
-            <a:ext cx="10972080" cy="1144800"/>
+            <a:ext cx="10971720" cy="1144440"/>
           </a:xfrm>
           <a:prstGeom prst="rect">
             <a:avLst/>
@@ -5885,7 +5887,7 @@
         <p:spPr>
           <a:xfrm>
             <a:off x="609480" y="273600"/>
-            <a:ext cx="10972080" cy="1144800"/>
+            <a:ext cx="10971720" cy="1144440"/>
           </a:xfrm>
           <a:prstGeom prst="rect">
             <a:avLst/>
@@ -5944,7 +5946,7 @@
         <p:spPr>
           <a:xfrm>
             <a:off x="609480" y="273600"/>
-            <a:ext cx="10972080" cy="5307840"/>
+            <a:ext cx="10971720" cy="5306400"/>
           </a:xfrm>
           <a:prstGeom prst="rect">
             <a:avLst/>
@@ -6003,7 +6005,7 @@
         <p:spPr>
           <a:xfrm>
             <a:off x="609480" y="273600"/>
-            <a:ext cx="10972080" cy="1144800"/>
+            <a:ext cx="10971720" cy="1144440"/>
           </a:xfrm>
           <a:prstGeom prst="rect">
             <a:avLst/>
@@ -6176,7 +6178,7 @@
         <p:spPr>
           <a:xfrm>
             <a:off x="609480" y="273600"/>
-            <a:ext cx="10972080" cy="1144800"/>
+            <a:ext cx="10971720" cy="1144440"/>
           </a:xfrm>
           <a:prstGeom prst="rect">
             <a:avLst/>
@@ -6349,7 +6351,7 @@
         <p:spPr>
           <a:xfrm>
             <a:off x="609480" y="273600"/>
-            <a:ext cx="10972080" cy="1144800"/>
+            <a:ext cx="10971720" cy="1144440"/>
           </a:xfrm>
           <a:prstGeom prst="rect">
             <a:avLst/>
@@ -6522,7 +6524,7 @@
         <p:spPr>
           <a:xfrm>
             <a:off x="609480" y="273600"/>
-            <a:ext cx="10972080" cy="1144800"/>
+            <a:ext cx="10971720" cy="1144440"/>
           </a:xfrm>
           <a:prstGeom prst="rect">
             <a:avLst/>
@@ -6657,7 +6659,7 @@
         <p:spPr>
           <a:xfrm>
             <a:off x="609480" y="273600"/>
-            <a:ext cx="10972080" cy="1144800"/>
+            <a:ext cx="10971720" cy="1144440"/>
           </a:xfrm>
           <a:prstGeom prst="rect">
             <a:avLst/>
@@ -6868,7 +6870,7 @@
         <p:spPr>
           <a:xfrm>
             <a:off x="609480" y="273600"/>
-            <a:ext cx="10972080" cy="5307840"/>
+            <a:ext cx="10971720" cy="5306400"/>
           </a:xfrm>
           <a:prstGeom prst="rect">
             <a:avLst/>
@@ -6927,7 +6929,7 @@
         <p:spPr>
           <a:xfrm>
             <a:off x="609480" y="273600"/>
-            <a:ext cx="10972080" cy="1144800"/>
+            <a:ext cx="10971720" cy="1144440"/>
           </a:xfrm>
           <a:prstGeom prst="rect">
             <a:avLst/>
@@ -7034,13 +7036,13 @@
           <p:nvPr/>
         </p:nvPicPr>
         <p:blipFill>
-          <a:blip r:embed=""/>
+          <a:blip r:embed="rId2"/>
           <a:stretch/>
         </p:blipFill>
         <p:spPr>
           <a:xfrm>
-            <a:off x="609480" y="1604520"/>
-            <a:ext cx="10972440" cy="3977280"/>
+            <a:off x="3602880" y="1604520"/>
+            <a:ext cx="4984920" cy="3977280"/>
           </a:xfrm>
           <a:prstGeom prst="rect">
             <a:avLst/>
@@ -7057,13 +7059,13 @@
           <p:nvPr/>
         </p:nvPicPr>
         <p:blipFill>
-          <a:blip r:embed=""/>
+          <a:blip r:embed="rId3"/>
           <a:stretch/>
         </p:blipFill>
         <p:spPr>
           <a:xfrm>
-            <a:off x="609480" y="1604520"/>
-            <a:ext cx="10972440" cy="3977280"/>
+            <a:off x="3602880" y="1604520"/>
+            <a:ext cx="4984920" cy="3977280"/>
           </a:xfrm>
           <a:prstGeom prst="rect">
             <a:avLst/>
@@ -7108,7 +7110,7 @@
         <p:spPr>
           <a:xfrm>
             <a:off x="609480" y="273600"/>
-            <a:ext cx="10972080" cy="1144800"/>
+            <a:ext cx="10971720" cy="1144440"/>
           </a:xfrm>
           <a:prstGeom prst="rect">
             <a:avLst/>
@@ -7281,7 +7283,7 @@
         <p:spPr>
           <a:xfrm>
             <a:off x="609480" y="273600"/>
-            <a:ext cx="10972080" cy="1144800"/>
+            <a:ext cx="10971720" cy="1144440"/>
           </a:xfrm>
           <a:prstGeom prst="rect">
             <a:avLst/>
@@ -7454,7 +7456,7 @@
         <p:spPr>
           <a:xfrm>
             <a:off x="609480" y="273600"/>
-            <a:ext cx="10972080" cy="1144800"/>
+            <a:ext cx="10971720" cy="1144440"/>
           </a:xfrm>
           <a:prstGeom prst="rect">
             <a:avLst/>
@@ -7634,7 +7636,7 @@
         <p:spPr>
           <a:xfrm>
             <a:off x="10353600" y="6224760"/>
-            <a:ext cx="1235160" cy="576000"/>
+            <a:ext cx="1234800" cy="575640"/>
           </a:xfrm>
           <a:prstGeom prst="rect">
             <a:avLst/>
@@ -7653,7 +7655,7 @@
         <p:spPr>
           <a:xfrm>
             <a:off x="0" y="4123800"/>
-            <a:ext cx="12189240" cy="1825920"/>
+            <a:ext cx="12188880" cy="1825560"/>
           </a:xfrm>
           <a:prstGeom prst="rect">
             <a:avLst/>
@@ -8071,7 +8073,7 @@
         <p:spPr>
           <a:xfrm>
             <a:off x="10353600" y="6224760"/>
-            <a:ext cx="1235160" cy="576000"/>
+            <a:ext cx="1234800" cy="575640"/>
           </a:xfrm>
           <a:prstGeom prst="rect">
             <a:avLst/>
@@ -8090,7 +8092,7 @@
         <p:spPr>
           <a:xfrm>
             <a:off x="991080" y="1184760"/>
-            <a:ext cx="11198160" cy="55800"/>
+            <a:ext cx="11197800" cy="55440"/>
           </a:xfrm>
           <a:prstGeom prst="rect">
             <a:avLst/>
@@ -8118,7 +8120,7 @@
         <p:spPr>
           <a:xfrm>
             <a:off x="0" y="1184760"/>
-            <a:ext cx="1704600" cy="55800"/>
+            <a:ext cx="1704240" cy="55440"/>
           </a:xfrm>
           <a:prstGeom prst="rect">
             <a:avLst/>
@@ -8536,7 +8538,7 @@
         <p:spPr>
           <a:xfrm>
             <a:off x="10353600" y="6224760"/>
-            <a:ext cx="1235160" cy="576000"/>
+            <a:ext cx="1234800" cy="575640"/>
           </a:xfrm>
           <a:prstGeom prst="rect">
             <a:avLst/>
@@ -8555,7 +8557,7 @@
         <p:spPr>
           <a:xfrm>
             <a:off x="991080" y="1184760"/>
-            <a:ext cx="11198160" cy="55800"/>
+            <a:ext cx="11197800" cy="55440"/>
           </a:xfrm>
           <a:prstGeom prst="rect">
             <a:avLst/>
@@ -8583,7 +8585,7 @@
         <p:spPr>
           <a:xfrm>
             <a:off x="0" y="1184760"/>
-            <a:ext cx="1704600" cy="55800"/>
+            <a:ext cx="1704240" cy="55440"/>
           </a:xfrm>
           <a:prstGeom prst="rect">
             <a:avLst/>
@@ -9001,7 +9003,7 @@
         <p:spPr>
           <a:xfrm>
             <a:off x="10353600" y="6224760"/>
-            <a:ext cx="1235160" cy="576000"/>
+            <a:ext cx="1234800" cy="575640"/>
           </a:xfrm>
           <a:prstGeom prst="rect">
             <a:avLst/>
@@ -9020,7 +9022,7 @@
         <p:spPr>
           <a:xfrm>
             <a:off x="991080" y="1184760"/>
-            <a:ext cx="11198160" cy="55800"/>
+            <a:ext cx="11197800" cy="55440"/>
           </a:xfrm>
           <a:prstGeom prst="rect">
             <a:avLst/>
@@ -9048,7 +9050,7 @@
         <p:spPr>
           <a:xfrm>
             <a:off x="0" y="1184760"/>
-            <a:ext cx="1704600" cy="55800"/>
+            <a:ext cx="1704240" cy="55440"/>
           </a:xfrm>
           <a:prstGeom prst="rect">
             <a:avLst/>
@@ -9466,7 +9468,7 @@
         <p:spPr>
           <a:xfrm>
             <a:off x="10353600" y="6224760"/>
-            <a:ext cx="1235160" cy="576000"/>
+            <a:ext cx="1234800" cy="575640"/>
           </a:xfrm>
           <a:prstGeom prst="rect">
             <a:avLst/>
@@ -9485,7 +9487,7 @@
         <p:spPr>
           <a:xfrm>
             <a:off x="991080" y="1184760"/>
-            <a:ext cx="11198160" cy="55800"/>
+            <a:ext cx="11197800" cy="55440"/>
           </a:xfrm>
           <a:prstGeom prst="rect">
             <a:avLst/>
@@ -9513,7 +9515,7 @@
         <p:spPr>
           <a:xfrm>
             <a:off x="0" y="1184760"/>
-            <a:ext cx="1704600" cy="55800"/>
+            <a:ext cx="1704240" cy="55440"/>
           </a:xfrm>
           <a:prstGeom prst="rect">
             <a:avLst/>
@@ -9545,7 +9547,7 @@
         <p:spPr>
           <a:xfrm>
             <a:off x="609480" y="273600"/>
-            <a:ext cx="10972080" cy="1144800"/>
+            <a:ext cx="10971720" cy="1144440"/>
           </a:xfrm>
           <a:prstGeom prst="rect">
             <a:avLst/>
@@ -9919,7 +9921,7 @@
         <p:spPr>
           <a:xfrm>
             <a:off x="504000" y="936000"/>
-            <a:ext cx="10725840" cy="1508760"/>
+            <a:ext cx="10725480" cy="1508400"/>
           </a:xfrm>
           <a:prstGeom prst="rect">
             <a:avLst/>
@@ -9976,7 +9978,7 @@
         <p:spPr>
           <a:xfrm>
             <a:off x="576000" y="2076480"/>
-            <a:ext cx="9656280" cy="513360"/>
+            <a:ext cx="9655920" cy="513000"/>
           </a:xfrm>
           <a:prstGeom prst="rect">
             <a:avLst/>
@@ -10033,7 +10035,7 @@
         <p:spPr>
           <a:xfrm>
             <a:off x="720000" y="4394160"/>
-            <a:ext cx="11517840" cy="1363680"/>
+            <a:ext cx="11517480" cy="1363320"/>
           </a:xfrm>
           <a:prstGeom prst="rect">
             <a:avLst/>
@@ -10248,7 +10250,7 @@
         <p:spPr>
           <a:xfrm>
             <a:off x="457920" y="1548000"/>
-            <a:ext cx="11350440" cy="3814560"/>
+            <a:ext cx="11350080" cy="3814200"/>
           </a:xfrm>
           <a:prstGeom prst="rect">
             <a:avLst/>
@@ -10267,7 +10269,7 @@
         <p:spPr>
           <a:xfrm>
             <a:off x="609480" y="273600"/>
-            <a:ext cx="10972080" cy="1144440"/>
+            <a:ext cx="10971720" cy="1144080"/>
           </a:xfrm>
           <a:prstGeom prst="rect">
             <a:avLst/>
@@ -10302,6 +10304,7 @@
                   </a:solidFill>
                 </a:uFill>
                 <a:latin typeface="Arial"/>
+                <a:ea typeface="DejaVu Sans"/>
               </a:rPr>
               <a:t>Haskell Web Application Interface</a:t>
             </a:r>
@@ -10377,7 +10380,7 @@
         <p:spPr>
           <a:xfrm>
             <a:off x="609480" y="273600"/>
-            <a:ext cx="10972080" cy="1144440"/>
+            <a:ext cx="10971720" cy="1144080"/>
           </a:xfrm>
           <a:prstGeom prst="rect">
             <a:avLst/>
@@ -10412,6 +10415,7 @@
                   </a:solidFill>
                 </a:uFill>
                 <a:latin typeface="Arial"/>
+                <a:ea typeface="DejaVu Sans"/>
               </a:rPr>
               <a:t>http4idris HttpEngine</a:t>
             </a:r>
@@ -10442,7 +10446,7 @@
         <p:spPr>
           <a:xfrm>
             <a:off x="711000" y="1418400"/>
-            <a:ext cx="9721440" cy="5065200"/>
+            <a:ext cx="9721080" cy="5064840"/>
           </a:xfrm>
           <a:prstGeom prst="rect">
             <a:avLst/>
@@ -10461,6 +10465,480 @@
           <p:childTnLst>
             <p:seq>
               <p:cTn id="38" nodeType="mainSeq"/>
+              <p:prevCondLst>
+                <p:cond delay="0" evt="onPrev">
+                  <p:tgtEl>
+                    <p:sldTgt/>
+                  </p:tgtEl>
+                </p:cond>
+              </p:prevCondLst>
+              <p:nextCondLst>
+                <p:cond delay="0" evt="onNext">
+                  <p:tgtEl>
+                    <p:sldTgt/>
+                  </p:tgtEl>
+                </p:cond>
+              </p:nextCondLst>
+            </p:seq>
+          </p:childTnLst>
+        </p:cTn>
+      </p:par>
+    </p:tnLst>
+  </p:timing>
+</p:sld>
+</file>
+
+<file path=ppt/slides/slide13.xml><?xml version="1.0" encoding="utf-8"?>
+<p:sld xmlns:a="http://schemas.openxmlformats.org/drawingml/2006/main" xmlns:p="http://schemas.openxmlformats.org/presentationml/2006/main" xmlns:r="http://schemas.openxmlformats.org/officeDocument/2006/relationships" xmlns:p14="http://schemas.microsoft.com/office/powerpoint/2010/main" xmlns:p15="http://schemas.microsoft.com/office/powerpoint/2012/main" xmlns:mc="http://schemas.openxmlformats.org/markup-compatibility/2006">
+  <p:cSld>
+    <p:spTree>
+      <p:nvGrpSpPr>
+        <p:cNvPr id="1" name=""/>
+        <p:cNvGrpSpPr/>
+        <p:nvPr/>
+      </p:nvGrpSpPr>
+      <p:grpSpPr>
+        <a:xfrm>
+          <a:off x="0" y="0"/>
+          <a:ext cx="0" cy="0"/>
+          <a:chOff x="0" y="0"/>
+          <a:chExt cx="0" cy="0"/>
+        </a:xfrm>
+      </p:grpSpPr>
+      <p:sp>
+        <p:nvSpPr>
+          <p:cNvPr id="231" name="CustomShape 1"/>
+          <p:cNvSpPr/>
+          <p:nvPr/>
+        </p:nvSpPr>
+        <p:spPr>
+          <a:xfrm>
+            <a:off x="609480" y="273600"/>
+            <a:ext cx="10971720" cy="1144080"/>
+          </a:xfrm>
+          <a:prstGeom prst="rect">
+            <a:avLst/>
+          </a:prstGeom>
+          <a:noFill/>
+          <a:ln>
+            <a:noFill/>
+          </a:ln>
+        </p:spPr>
+        <p:style>
+          <a:lnRef idx="0"/>
+          <a:fillRef idx="0"/>
+          <a:effectRef idx="0"/>
+          <a:fontRef idx="minor"/>
+        </p:style>
+        <p:txBody>
+          <a:bodyPr wrap="none" lIns="0" rIns="0" tIns="0" bIns="0" anchor="ctr"/>
+          <a:p>
+            <a:pPr algn="ctr">
+              <a:lnSpc>
+                <a:spcPct val="100000"/>
+              </a:lnSpc>
+            </a:pPr>
+            <a:r>
+              <a:rPr b="0" lang="en-AU" sz="1800" spc="-1" strike="noStrike">
+                <a:solidFill>
+                  <a:srgbClr val="000000"/>
+                </a:solidFill>
+                <a:uFill>
+                  <a:solidFill>
+                    <a:srgbClr val="ffffff"/>
+                  </a:solidFill>
+                </a:uFill>
+                <a:latin typeface="Arial"/>
+                <a:ea typeface="DejaVu Sans"/>
+              </a:rPr>
+              <a:t>http4idris HttpEngine</a:t>
+            </a:r>
+            <a:endParaRPr b="0" lang="en-AU" sz="1800" spc="-1" strike="noStrike">
+              <a:solidFill>
+                <a:srgbClr val="000000"/>
+              </a:solidFill>
+              <a:uFill>
+                <a:solidFill>
+                  <a:srgbClr val="ffffff"/>
+                </a:solidFill>
+              </a:uFill>
+              <a:latin typeface="Arial"/>
+            </a:endParaRPr>
+          </a:p>
+        </p:txBody>
+      </p:sp>
+      <p:pic>
+        <p:nvPicPr>
+          <p:cNvPr id="232" name="" descr=""/>
+          <p:cNvPicPr/>
+          <p:nvPr/>
+        </p:nvPicPr>
+        <p:blipFill>
+          <a:blip r:embed="rId1"/>
+          <a:stretch/>
+        </p:blipFill>
+        <p:spPr>
+          <a:xfrm>
+            <a:off x="504000" y="2347560"/>
+            <a:ext cx="11048760" cy="1828440"/>
+          </a:xfrm>
+          <a:prstGeom prst="rect">
+            <a:avLst/>
+          </a:prstGeom>
+          <a:ln>
+            <a:noFill/>
+          </a:ln>
+        </p:spPr>
+      </p:pic>
+    </p:spTree>
+  </p:cSld>
+  <p:timing>
+    <p:tnLst>
+      <p:par>
+        <p:cTn id="39" dur="indefinite" restart="never" nodeType="tmRoot">
+          <p:childTnLst>
+            <p:seq>
+              <p:cTn id="40" nodeType="mainSeq"/>
+              <p:prevCondLst>
+                <p:cond delay="0" evt="onPrev">
+                  <p:tgtEl>
+                    <p:sldTgt/>
+                  </p:tgtEl>
+                </p:cond>
+              </p:prevCondLst>
+              <p:nextCondLst>
+                <p:cond delay="0" evt="onNext">
+                  <p:tgtEl>
+                    <p:sldTgt/>
+                  </p:tgtEl>
+                </p:cond>
+              </p:nextCondLst>
+            </p:seq>
+          </p:childTnLst>
+        </p:cTn>
+      </p:par>
+    </p:tnLst>
+  </p:timing>
+</p:sld>
+</file>
+
+<file path=ppt/slides/slide14.xml><?xml version="1.0" encoding="utf-8"?>
+<p:sld xmlns:a="http://schemas.openxmlformats.org/drawingml/2006/main" xmlns:p="http://schemas.openxmlformats.org/presentationml/2006/main" xmlns:r="http://schemas.openxmlformats.org/officeDocument/2006/relationships" xmlns:p14="http://schemas.microsoft.com/office/powerpoint/2010/main" xmlns:p15="http://schemas.microsoft.com/office/powerpoint/2012/main" xmlns:mc="http://schemas.openxmlformats.org/markup-compatibility/2006">
+  <p:cSld>
+    <p:spTree>
+      <p:nvGrpSpPr>
+        <p:cNvPr id="1" name=""/>
+        <p:cNvGrpSpPr/>
+        <p:nvPr/>
+      </p:nvGrpSpPr>
+      <p:grpSpPr>
+        <a:xfrm>
+          <a:off x="0" y="0"/>
+          <a:ext cx="0" cy="0"/>
+          <a:chOff x="0" y="0"/>
+          <a:chExt cx="0" cy="0"/>
+        </a:xfrm>
+      </p:grpSpPr>
+      <p:sp>
+        <p:nvSpPr>
+          <p:cNvPr id="233" name="TextShape 1"/>
+          <p:cNvSpPr txBox="1"/>
+          <p:nvPr/>
+        </p:nvSpPr>
+        <p:spPr>
+          <a:xfrm>
+            <a:off x="609480" y="273600"/>
+            <a:ext cx="10971720" cy="1144440"/>
+          </a:xfrm>
+          <a:prstGeom prst="rect">
+            <a:avLst/>
+          </a:prstGeom>
+          <a:noFill/>
+          <a:ln>
+            <a:noFill/>
+          </a:ln>
+        </p:spPr>
+        <p:txBody>
+          <a:bodyPr lIns="0" rIns="0" tIns="0" bIns="0" anchor="ctr"/>
+          <a:p>
+            <a:pPr algn="ctr"/>
+            <a:r>
+              <a:rPr b="0" lang="en-AU" sz="4400" spc="-1" strike="noStrike">
+                <a:solidFill>
+                  <a:srgbClr val="000000"/>
+                </a:solidFill>
+                <a:uFill>
+                  <a:solidFill>
+                    <a:srgbClr val="ffffff"/>
+                  </a:solidFill>
+                </a:uFill>
+                <a:latin typeface="Arial"/>
+              </a:rPr>
+              <a:t>Questions?</a:t>
+            </a:r>
+            <a:endParaRPr b="0" lang="en-AU" sz="4400" spc="-1" strike="noStrike">
+              <a:solidFill>
+                <a:srgbClr val="000000"/>
+              </a:solidFill>
+              <a:uFill>
+                <a:solidFill>
+                  <a:srgbClr val="ffffff"/>
+                </a:solidFill>
+              </a:uFill>
+              <a:latin typeface="Arial"/>
+            </a:endParaRPr>
+          </a:p>
+        </p:txBody>
+      </p:sp>
+      <p:sp>
+        <p:nvSpPr>
+          <p:cNvPr id="234" name="TextShape 2"/>
+          <p:cNvSpPr txBox="1"/>
+          <p:nvPr/>
+        </p:nvSpPr>
+        <p:spPr>
+          <a:xfrm>
+            <a:off x="936000" y="1584000"/>
+            <a:ext cx="10224000" cy="2385360"/>
+          </a:xfrm>
+          <a:prstGeom prst="rect">
+            <a:avLst/>
+          </a:prstGeom>
+          <a:noFill/>
+          <a:ln>
+            <a:noFill/>
+          </a:ln>
+        </p:spPr>
+        <p:txBody>
+          <a:bodyPr lIns="90000" rIns="90000" tIns="45000" bIns="45000"/>
+          <a:p>
+            <a:r>
+              <a:rPr b="0" lang="en-AU" sz="2400" spc="-1" strike="noStrike">
+                <a:solidFill>
+                  <a:srgbClr val="000000"/>
+                </a:solidFill>
+                <a:uFill>
+                  <a:solidFill>
+                    <a:srgbClr val="ffffff"/>
+                  </a:solidFill>
+                </a:uFill>
+                <a:latin typeface="Arial"/>
+              </a:rPr>
+              <a:t>Get in touch: andrew.miller@rea-group.com</a:t>
+            </a:r>
+            <a:endParaRPr b="0" lang="en-AU" sz="2400" spc="-1" strike="noStrike">
+              <a:solidFill>
+                <a:srgbClr val="000000"/>
+              </a:solidFill>
+              <a:uFill>
+                <a:solidFill>
+                  <a:srgbClr val="ffffff"/>
+                </a:solidFill>
+              </a:uFill>
+              <a:latin typeface="Arial"/>
+            </a:endParaRPr>
+          </a:p>
+          <a:p>
+            <a:endParaRPr b="0" lang="en-AU" sz="2400" spc="-1" strike="noStrike">
+              <a:solidFill>
+                <a:srgbClr val="000000"/>
+              </a:solidFill>
+              <a:uFill>
+                <a:solidFill>
+                  <a:srgbClr val="ffffff"/>
+                </a:solidFill>
+              </a:uFill>
+              <a:latin typeface="Arial"/>
+            </a:endParaRPr>
+          </a:p>
+          <a:p>
+            <a:r>
+              <a:rPr b="0" lang="en-AU" sz="2400" spc="-1" strike="noStrike">
+                <a:solidFill>
+                  <a:srgbClr val="000000"/>
+                </a:solidFill>
+                <a:uFill>
+                  <a:solidFill>
+                    <a:srgbClr val="ffffff"/>
+                  </a:solidFill>
+                </a:uFill>
+                <a:latin typeface="Arial"/>
+              </a:rPr>
+              <a:t>ProofSweeper:</a:t>
+            </a:r>
+            <a:r>
+              <a:rPr b="0" lang="en-AU" sz="1800" spc="-1" strike="noStrike">
+                <a:solidFill>
+                  <a:srgbClr val="000000"/>
+                </a:solidFill>
+                <a:uFill>
+                  <a:solidFill>
+                    <a:srgbClr val="ffffff"/>
+                  </a:solidFill>
+                </a:uFill>
+                <a:latin typeface="Arial"/>
+              </a:rPr>
+              <a:t> </a:t>
+            </a:r>
+            <a:r>
+              <a:rPr b="0" lang="en-AU" sz="2400" spc="-1" strike="noStrike">
+                <a:solidFill>
+                  <a:srgbClr val="000000"/>
+                </a:solidFill>
+                <a:uFill>
+                  <a:solidFill>
+                    <a:srgbClr val="ffffff"/>
+                  </a:solidFill>
+                </a:uFill>
+                <a:latin typeface="Arial"/>
+              </a:rPr>
+              <a:t>https://github.com/A1kmm/proofsweeper</a:t>
+            </a:r>
+            <a:endParaRPr b="0" lang="en-AU" sz="2400" spc="-1" strike="noStrike">
+              <a:solidFill>
+                <a:srgbClr val="000000"/>
+              </a:solidFill>
+              <a:uFill>
+                <a:solidFill>
+                  <a:srgbClr val="ffffff"/>
+                </a:solidFill>
+              </a:uFill>
+              <a:latin typeface="Arial"/>
+            </a:endParaRPr>
+          </a:p>
+          <a:p>
+            <a:r>
+              <a:rPr b="0" lang="en-AU" sz="2400" spc="-1" strike="noStrike">
+                <a:solidFill>
+                  <a:srgbClr val="000000"/>
+                </a:solidFill>
+                <a:uFill>
+                  <a:solidFill>
+                    <a:srgbClr val="ffffff"/>
+                  </a:solidFill>
+                </a:uFill>
+                <a:latin typeface="Arial"/>
+              </a:rPr>
+              <a:t>http4idris:</a:t>
+            </a:r>
+            <a:r>
+              <a:rPr b="0" lang="en-AU" sz="1800" spc="-1" strike="noStrike">
+                <a:solidFill>
+                  <a:srgbClr val="000000"/>
+                </a:solidFill>
+                <a:uFill>
+                  <a:solidFill>
+                    <a:srgbClr val="ffffff"/>
+                  </a:solidFill>
+                </a:uFill>
+                <a:latin typeface="Arial"/>
+              </a:rPr>
+              <a:t> </a:t>
+            </a:r>
+            <a:r>
+              <a:rPr b="0" lang="en-AU" sz="2400" spc="-1" strike="noStrike">
+                <a:solidFill>
+                  <a:srgbClr val="000000"/>
+                </a:solidFill>
+                <a:uFill>
+                  <a:solidFill>
+                    <a:srgbClr val="ffffff"/>
+                  </a:solidFill>
+                </a:uFill>
+                <a:latin typeface="Arial"/>
+              </a:rPr>
+              <a:t>https://github.com/A1kmm/http4idris</a:t>
+            </a:r>
+            <a:endParaRPr b="0" lang="en-AU" sz="2400" spc="-1" strike="noStrike">
+              <a:solidFill>
+                <a:srgbClr val="000000"/>
+              </a:solidFill>
+              <a:uFill>
+                <a:solidFill>
+                  <a:srgbClr val="ffffff"/>
+                </a:solidFill>
+              </a:uFill>
+              <a:latin typeface="Arial"/>
+            </a:endParaRPr>
+          </a:p>
+          <a:p>
+            <a:endParaRPr b="0" lang="en-AU" sz="2400" spc="-1" strike="noStrike">
+              <a:solidFill>
+                <a:srgbClr val="000000"/>
+              </a:solidFill>
+              <a:uFill>
+                <a:solidFill>
+                  <a:srgbClr val="ffffff"/>
+                </a:solidFill>
+              </a:uFill>
+              <a:latin typeface="Arial"/>
+            </a:endParaRPr>
+          </a:p>
+          <a:p>
+            <a:r>
+              <a:rPr b="0" lang="en-AU" sz="2400" spc="-1" strike="noStrike">
+                <a:solidFill>
+                  <a:srgbClr val="000000"/>
+                </a:solidFill>
+                <a:uFill>
+                  <a:solidFill>
+                    <a:srgbClr val="ffffff"/>
+                  </a:solidFill>
+                </a:uFill>
+                <a:latin typeface="Arial"/>
+              </a:rPr>
+              <a:t>REA Tech blog: https://rea.to/techblog</a:t>
+            </a:r>
+            <a:endParaRPr b="0" lang="en-AU" sz="2400" spc="-1" strike="noStrike">
+              <a:solidFill>
+                <a:srgbClr val="000000"/>
+              </a:solidFill>
+              <a:uFill>
+                <a:solidFill>
+                  <a:srgbClr val="ffffff"/>
+                </a:solidFill>
+              </a:uFill>
+              <a:latin typeface="Arial"/>
+            </a:endParaRPr>
+          </a:p>
+          <a:p>
+            <a:r>
+              <a:rPr b="0" lang="en-AU" sz="2400" spc="-1" strike="noStrike">
+                <a:solidFill>
+                  <a:srgbClr val="000000"/>
+                </a:solidFill>
+                <a:uFill>
+                  <a:solidFill>
+                    <a:srgbClr val="ffffff"/>
+                  </a:solidFill>
+                </a:uFill>
+                <a:latin typeface="Arial"/>
+              </a:rPr>
+              <a:t>Find out about working at REA: https://rea.to/careers</a:t>
+            </a:r>
+            <a:endParaRPr b="0" lang="en-AU" sz="2400" spc="-1" strike="noStrike">
+              <a:solidFill>
+                <a:srgbClr val="000000"/>
+              </a:solidFill>
+              <a:uFill>
+                <a:solidFill>
+                  <a:srgbClr val="ffffff"/>
+                </a:solidFill>
+              </a:uFill>
+              <a:latin typeface="Arial"/>
+            </a:endParaRPr>
+          </a:p>
+        </p:txBody>
+      </p:sp>
+    </p:spTree>
+  </p:cSld>
+  <p:timing>
+    <p:tnLst>
+      <p:par>
+        <p:cTn id="41" dur="indefinite" restart="never" nodeType="tmRoot">
+          <p:childTnLst>
+            <p:seq>
+              <p:cTn id="42" nodeType="mainSeq"/>
               <p:prevCondLst>
                 <p:cond delay="0" evt="onPrev">
                   <p:tgtEl>
@@ -10510,7 +10988,7 @@
         <p:spPr>
           <a:xfrm>
             <a:off x="609480" y="273600"/>
-            <a:ext cx="10970280" cy="1142640"/>
+            <a:ext cx="10969920" cy="1142280"/>
           </a:xfrm>
           <a:prstGeom prst="rect">
             <a:avLst/>
@@ -10572,7 +11050,7 @@
         <p:spPr>
           <a:xfrm>
             <a:off x="609480" y="1604520"/>
-            <a:ext cx="10970280" cy="1273320"/>
+            <a:ext cx="10969920" cy="1272960"/>
           </a:xfrm>
           <a:prstGeom prst="rect">
             <a:avLst/>
@@ -10629,7 +11107,7 @@
         <p:spPr>
           <a:xfrm>
             <a:off x="576000" y="2088000"/>
-            <a:ext cx="10970280" cy="1273320"/>
+            <a:ext cx="10969920" cy="1272960"/>
           </a:xfrm>
           <a:prstGeom prst="rect">
             <a:avLst/>
@@ -10686,7 +11164,7 @@
         <p:spPr>
           <a:xfrm>
             <a:off x="619560" y="2952000"/>
-            <a:ext cx="10970280" cy="1273320"/>
+            <a:ext cx="10969920" cy="1272960"/>
           </a:xfrm>
           <a:prstGeom prst="rect">
             <a:avLst/>
@@ -10743,7 +11221,7 @@
         <p:spPr>
           <a:xfrm>
             <a:off x="576000" y="4052520"/>
-            <a:ext cx="10970280" cy="1273320"/>
+            <a:ext cx="10969920" cy="1272960"/>
           </a:xfrm>
           <a:prstGeom prst="rect">
             <a:avLst/>
@@ -11051,7 +11529,7 @@
         <p:spPr>
           <a:xfrm>
             <a:off x="609480" y="273600"/>
-            <a:ext cx="10970640" cy="1143000"/>
+            <a:ext cx="10970280" cy="1142640"/>
           </a:xfrm>
           <a:prstGeom prst="rect">
             <a:avLst/>
@@ -11113,7 +11591,7 @@
         <p:spPr>
           <a:xfrm>
             <a:off x="609480" y="1604520"/>
-            <a:ext cx="10970640" cy="3975480"/>
+            <a:ext cx="10970280" cy="3975120"/>
           </a:xfrm>
           <a:prstGeom prst="rect">
             <a:avLst/>
@@ -11305,7 +11783,7 @@
         <p:spPr>
           <a:xfrm>
             <a:off x="609480" y="273600"/>
-            <a:ext cx="10970640" cy="1143000"/>
+            <a:ext cx="10970280" cy="1142640"/>
           </a:xfrm>
           <a:prstGeom prst="rect">
             <a:avLst/>
@@ -11371,7 +11849,7 @@
         <p:spPr>
           <a:xfrm>
             <a:off x="4002120" y="1418400"/>
-            <a:ext cx="3340080" cy="4106520"/>
+            <a:ext cx="3339720" cy="4106160"/>
           </a:xfrm>
           <a:prstGeom prst="rect">
             <a:avLst/>
@@ -11390,7 +11868,7 @@
         <p:spPr>
           <a:xfrm>
             <a:off x="2016000" y="5616000"/>
-            <a:ext cx="7488000" cy="511920"/>
+            <a:ext cx="7487640" cy="511560"/>
           </a:xfrm>
           <a:prstGeom prst="rect">
             <a:avLst/>
@@ -11534,7 +12012,7 @@
         <p:spPr>
           <a:xfrm>
             <a:off x="609480" y="273600"/>
-            <a:ext cx="10970640" cy="1143000"/>
+            <a:ext cx="10970280" cy="1142640"/>
           </a:xfrm>
           <a:prstGeom prst="rect">
             <a:avLst/>
@@ -11596,7 +12074,7 @@
         <p:spPr>
           <a:xfrm>
             <a:off x="609480" y="1604520"/>
-            <a:ext cx="10970640" cy="3975480"/>
+            <a:ext cx="10970280" cy="3975120"/>
           </a:xfrm>
           <a:prstGeom prst="rect">
             <a:avLst/>
@@ -12030,7 +12508,7 @@
         <p:spPr>
           <a:xfrm>
             <a:off x="609480" y="273600"/>
-            <a:ext cx="10970640" cy="1143000"/>
+            <a:ext cx="10970280" cy="1142640"/>
           </a:xfrm>
           <a:prstGeom prst="rect">
             <a:avLst/>
@@ -12092,7 +12570,7 @@
         <p:spPr>
           <a:xfrm>
             <a:off x="609480" y="1604520"/>
-            <a:ext cx="10970640" cy="3975480"/>
+            <a:ext cx="10970280" cy="3975120"/>
           </a:xfrm>
           <a:prstGeom prst="rect">
             <a:avLst/>
@@ -12157,7 +12635,7 @@
         <p:spPr>
           <a:xfrm>
             <a:off x="864000" y="1800000"/>
-            <a:ext cx="10716120" cy="934200"/>
+            <a:ext cx="10715760" cy="933840"/>
           </a:xfrm>
           <a:prstGeom prst="rect">
             <a:avLst/>
@@ -12187,7 +12665,7 @@
         <p:spPr>
           <a:xfrm>
             <a:off x="5040000" y="1934640"/>
-            <a:ext cx="3958200" cy="655560"/>
+            <a:ext cx="3957840" cy="655200"/>
           </a:xfrm>
           <a:prstGeom prst="rect">
             <a:avLst/>
@@ -12244,7 +12722,7 @@
         <p:spPr>
           <a:xfrm>
             <a:off x="802080" y="4032000"/>
-            <a:ext cx="10716120" cy="934200"/>
+            <a:ext cx="10715760" cy="933840"/>
           </a:xfrm>
           <a:prstGeom prst="rect">
             <a:avLst/>
@@ -12274,7 +12752,7 @@
         <p:spPr>
           <a:xfrm>
             <a:off x="4968000" y="4176000"/>
-            <a:ext cx="3958200" cy="655560"/>
+            <a:ext cx="3957840" cy="655200"/>
           </a:xfrm>
           <a:prstGeom prst="rect">
             <a:avLst/>
@@ -12409,7 +12887,7 @@
         <p:spPr>
           <a:xfrm>
             <a:off x="609480" y="273600"/>
-            <a:ext cx="10970640" cy="1143000"/>
+            <a:ext cx="10970280" cy="1142640"/>
           </a:xfrm>
           <a:prstGeom prst="rect">
             <a:avLst/>
@@ -12471,7 +12949,7 @@
         <p:spPr>
           <a:xfrm>
             <a:off x="5040000" y="1934640"/>
-            <a:ext cx="3958200" cy="655560"/>
+            <a:ext cx="3957840" cy="655200"/>
           </a:xfrm>
           <a:prstGeom prst="rect">
             <a:avLst/>
@@ -12528,7 +13006,7 @@
         <p:spPr>
           <a:xfrm>
             <a:off x="4968000" y="4176000"/>
-            <a:ext cx="3958200" cy="655560"/>
+            <a:ext cx="3957840" cy="655200"/>
           </a:xfrm>
           <a:prstGeom prst="rect">
             <a:avLst/>
@@ -12585,7 +13063,7 @@
         <p:spPr>
           <a:xfrm>
             <a:off x="609480" y="1604520"/>
-            <a:ext cx="10970640" cy="3975480"/>
+            <a:ext cx="10970280" cy="3975120"/>
           </a:xfrm>
           <a:prstGeom prst="rect">
             <a:avLst/>
@@ -12650,7 +13128,7 @@
         <p:spPr>
           <a:xfrm>
             <a:off x="648000" y="1584000"/>
-            <a:ext cx="11086200" cy="2923560"/>
+            <a:ext cx="11085840" cy="2923200"/>
           </a:xfrm>
           <a:prstGeom prst="rect">
             <a:avLst/>
@@ -12868,7 +13346,7 @@
         <p:spPr>
           <a:xfrm>
             <a:off x="609480" y="273600"/>
-            <a:ext cx="10970640" cy="1143000"/>
+            <a:ext cx="10970280" cy="1142640"/>
           </a:xfrm>
           <a:prstGeom prst="rect">
             <a:avLst/>
@@ -12930,7 +13408,7 @@
         <p:spPr>
           <a:xfrm>
             <a:off x="609480" y="1604520"/>
-            <a:ext cx="10970640" cy="3975480"/>
+            <a:ext cx="10970280" cy="3975120"/>
           </a:xfrm>
           <a:prstGeom prst="rect">
             <a:avLst/>
@@ -12999,7 +13477,7 @@
         <p:spPr>
           <a:xfrm>
             <a:off x="2534040" y="1339200"/>
-            <a:ext cx="7207920" cy="4879080"/>
+            <a:ext cx="7207560" cy="4878720"/>
           </a:xfrm>
           <a:prstGeom prst="rect">
             <a:avLst/>
@@ -13071,7 +13549,7 @@
         <p:spPr>
           <a:xfrm>
             <a:off x="187200" y="115200"/>
-            <a:ext cx="11488320" cy="5945400"/>
+            <a:ext cx="11487960" cy="5945040"/>
           </a:xfrm>
           <a:prstGeom prst="rect">
             <a:avLst/>
@@ -13090,7 +13568,7 @@
         <p:spPr>
           <a:xfrm>
             <a:off x="504000" y="6191280"/>
-            <a:ext cx="8219880" cy="429120"/>
+            <a:ext cx="8219520" cy="428760"/>
           </a:xfrm>
           <a:prstGeom prst="rect">
             <a:avLst/>

</xml_diff>